<commit_message>
codes used for first draft of paper
</commit_message>
<xml_diff>
--- a/document/EEGScaler.pptx
+++ b/document/EEGScaler.pptx
@@ -5,7 +5,7 @@
     <p:sldMasterId id="2147483648" r:id="rId1"/>
   </p:sldMasterIdLst>
   <p:notesMasterIdLst>
-    <p:notesMasterId r:id="rId10"/>
+    <p:notesMasterId r:id="rId12"/>
   </p:notesMasterIdLst>
   <p:sldIdLst>
     <p:sldId id="256" r:id="rId2"/>
@@ -16,6 +16,8 @@
     <p:sldId id="264" r:id="rId7"/>
     <p:sldId id="263" r:id="rId8"/>
     <p:sldId id="257" r:id="rId9"/>
+    <p:sldId id="266" r:id="rId10"/>
+    <p:sldId id="265" r:id="rId11"/>
   </p:sldIdLst>
   <p:sldSz cx="12192000" cy="6858000"/>
   <p:notesSz cx="6858000" cy="9144000"/>
@@ -114,7 +116,1265 @@
       </a:defRPr>
     </a:lvl9pPr>
   </p:defaultTextStyle>
+  <p:extLst>
+    <p:ext uri="{EFAFB233-063F-42B5-8137-9DF3F51BA10A}">
+      <p15:sldGuideLst xmlns:p15="http://schemas.microsoft.com/office/powerpoint/2012/main"/>
+    </p:ext>
+  </p:extLst>
 </p:presentation>
+</file>
+
+<file path=ppt/charts/chart1.xml><?xml version="1.0" encoding="utf-8"?>
+<c:chartSpace xmlns:c="http://schemas.openxmlformats.org/drawingml/2006/chart" xmlns:a="http://schemas.openxmlformats.org/drawingml/2006/main" xmlns:r="http://schemas.openxmlformats.org/officeDocument/2006/relationships" xmlns:c16r2="http://schemas.microsoft.com/office/drawing/2015/06/chart">
+  <c:date1904 val="0"/>
+  <c:lang val="en-US"/>
+  <c:roundedCorners val="0"/>
+  <mc:AlternateContent xmlns:mc="http://schemas.openxmlformats.org/markup-compatibility/2006">
+    <mc:Choice xmlns:c14="http://schemas.microsoft.com/office/drawing/2007/8/2/chart" Requires="c14">
+      <c14:style val="102"/>
+    </mc:Choice>
+    <mc:Fallback>
+      <c:style val="2"/>
+    </mc:Fallback>
+  </mc:AlternateContent>
+  <c:chart>
+    <c:autoTitleDeleted val="1"/>
+    <c:plotArea>
+      <c:layout>
+        <c:manualLayout>
+          <c:layoutTarget val="inner"/>
+          <c:xMode val="edge"/>
+          <c:yMode val="edge"/>
+          <c:x val="4.786480822961646E-2"/>
+          <c:y val="3.3152501506931886E-2"/>
+          <c:w val="0.93869433155532966"/>
+          <c:h val="0.91224150778621027"/>
+        </c:manualLayout>
+      </c:layout>
+      <c:barChart>
+        <c:barDir val="col"/>
+        <c:grouping val="clustered"/>
+        <c:varyColors val="0"/>
+        <c:ser>
+          <c:idx val="0"/>
+          <c:order val="0"/>
+          <c:spPr>
+            <a:solidFill>
+              <a:schemeClr val="accent2"/>
+            </a:solidFill>
+            <a:ln>
+              <a:noFill/>
+            </a:ln>
+            <a:effectLst/>
+          </c:spPr>
+          <c:invertIfNegative val="0"/>
+          <c:cat>
+            <c:strRef>
+              <c:f>Sheet3!$A$2:$A$15</c:f>
+              <c:strCache>
+                <c:ptCount val="14"/>
+                <c:pt idx="0">
+                  <c:v>S01</c:v>
+                </c:pt>
+                <c:pt idx="1">
+                  <c:v>S02</c:v>
+                </c:pt>
+                <c:pt idx="2">
+                  <c:v>S03</c:v>
+                </c:pt>
+                <c:pt idx="3">
+                  <c:v>S04</c:v>
+                </c:pt>
+                <c:pt idx="4">
+                  <c:v>S05</c:v>
+                </c:pt>
+                <c:pt idx="5">
+                  <c:v>S06</c:v>
+                </c:pt>
+                <c:pt idx="6">
+                  <c:v>S07</c:v>
+                </c:pt>
+                <c:pt idx="7">
+                  <c:v>S08</c:v>
+                </c:pt>
+                <c:pt idx="8">
+                  <c:v>S09</c:v>
+                </c:pt>
+                <c:pt idx="9">
+                  <c:v>S10</c:v>
+                </c:pt>
+                <c:pt idx="10">
+                  <c:v>S11</c:v>
+                </c:pt>
+                <c:pt idx="11">
+                  <c:v>S12</c:v>
+                </c:pt>
+                <c:pt idx="12">
+                  <c:v>S13</c:v>
+                </c:pt>
+                <c:pt idx="13">
+                  <c:v>S14</c:v>
+                </c:pt>
+              </c:strCache>
+            </c:strRef>
+          </c:cat>
+          <c:val>
+            <c:numRef>
+              <c:f>Sheet3!$B$2:$B$15</c:f>
+              <c:numCache>
+                <c:formatCode>General</c:formatCode>
+                <c:ptCount val="14"/>
+                <c:pt idx="0">
+                  <c:v>54.17</c:v>
+                </c:pt>
+                <c:pt idx="1">
+                  <c:v>52.08</c:v>
+                </c:pt>
+                <c:pt idx="2">
+                  <c:v>64.58</c:v>
+                </c:pt>
+                <c:pt idx="3">
+                  <c:v>60.42</c:v>
+                </c:pt>
+                <c:pt idx="4">
+                  <c:v>66.67</c:v>
+                </c:pt>
+                <c:pt idx="5">
+                  <c:v>58.33</c:v>
+                </c:pt>
+                <c:pt idx="6">
+                  <c:v>52.08</c:v>
+                </c:pt>
+                <c:pt idx="7">
+                  <c:v>56.25</c:v>
+                </c:pt>
+                <c:pt idx="8">
+                  <c:v>58.33</c:v>
+                </c:pt>
+                <c:pt idx="9">
+                  <c:v>60.42</c:v>
+                </c:pt>
+                <c:pt idx="10">
+                  <c:v>68.75</c:v>
+                </c:pt>
+                <c:pt idx="11">
+                  <c:v>60.42</c:v>
+                </c:pt>
+                <c:pt idx="12">
+                  <c:v>54.17</c:v>
+                </c:pt>
+                <c:pt idx="13">
+                  <c:v>66.67</c:v>
+                </c:pt>
+              </c:numCache>
+            </c:numRef>
+          </c:val>
+          <c:extLst>
+            <c:ext xmlns:c16="http://schemas.microsoft.com/office/drawing/2014/chart" uri="{C3380CC4-5D6E-409C-BE32-E72D297353CC}">
+              <c16:uniqueId val="{00000000-4B7C-42BF-B9E9-8150AC312557}"/>
+            </c:ext>
+          </c:extLst>
+        </c:ser>
+        <c:ser>
+          <c:idx val="1"/>
+          <c:order val="1"/>
+          <c:spPr>
+            <a:solidFill>
+              <a:schemeClr val="accent4"/>
+            </a:solidFill>
+            <a:ln>
+              <a:noFill/>
+            </a:ln>
+            <a:effectLst/>
+          </c:spPr>
+          <c:invertIfNegative val="0"/>
+          <c:cat>
+            <c:strRef>
+              <c:f>Sheet3!$A$2:$A$15</c:f>
+              <c:strCache>
+                <c:ptCount val="14"/>
+                <c:pt idx="0">
+                  <c:v>S01</c:v>
+                </c:pt>
+                <c:pt idx="1">
+                  <c:v>S02</c:v>
+                </c:pt>
+                <c:pt idx="2">
+                  <c:v>S03</c:v>
+                </c:pt>
+                <c:pt idx="3">
+                  <c:v>S04</c:v>
+                </c:pt>
+                <c:pt idx="4">
+                  <c:v>S05</c:v>
+                </c:pt>
+                <c:pt idx="5">
+                  <c:v>S06</c:v>
+                </c:pt>
+                <c:pt idx="6">
+                  <c:v>S07</c:v>
+                </c:pt>
+                <c:pt idx="7">
+                  <c:v>S08</c:v>
+                </c:pt>
+                <c:pt idx="8">
+                  <c:v>S09</c:v>
+                </c:pt>
+                <c:pt idx="9">
+                  <c:v>S10</c:v>
+                </c:pt>
+                <c:pt idx="10">
+                  <c:v>S11</c:v>
+                </c:pt>
+                <c:pt idx="11">
+                  <c:v>S12</c:v>
+                </c:pt>
+                <c:pt idx="12">
+                  <c:v>S13</c:v>
+                </c:pt>
+                <c:pt idx="13">
+                  <c:v>S14</c:v>
+                </c:pt>
+              </c:strCache>
+            </c:strRef>
+          </c:cat>
+          <c:val>
+            <c:numRef>
+              <c:f>Sheet3!$C$2:$C$15</c:f>
+              <c:numCache>
+                <c:formatCode>General</c:formatCode>
+                <c:ptCount val="14"/>
+                <c:pt idx="0">
+                  <c:v>71.111111109999996</c:v>
+                </c:pt>
+                <c:pt idx="1">
+                  <c:v>86</c:v>
+                </c:pt>
+                <c:pt idx="2">
+                  <c:v>72.888888890000004</c:v>
+                </c:pt>
+                <c:pt idx="3">
+                  <c:v>73.111111109999996</c:v>
+                </c:pt>
+                <c:pt idx="4">
+                  <c:v>75.111111109999996</c:v>
+                </c:pt>
+                <c:pt idx="5">
+                  <c:v>65.111111109999996</c:v>
+                </c:pt>
+                <c:pt idx="6">
+                  <c:v>55.111111110000003</c:v>
+                </c:pt>
+                <c:pt idx="7">
+                  <c:v>69.333333330000002</c:v>
+                </c:pt>
+                <c:pt idx="8">
+                  <c:v>58.222222219999999</c:v>
+                </c:pt>
+                <c:pt idx="9">
+                  <c:v>56.888888889999997</c:v>
+                </c:pt>
+                <c:pt idx="10">
+                  <c:v>62.888888889999997</c:v>
+                </c:pt>
+                <c:pt idx="11">
+                  <c:v>52.222222219999999</c:v>
+                </c:pt>
+                <c:pt idx="12">
+                  <c:v>62.444444439999998</c:v>
+                </c:pt>
+                <c:pt idx="13">
+                  <c:v>65.111111109999996</c:v>
+                </c:pt>
+              </c:numCache>
+            </c:numRef>
+          </c:val>
+          <c:extLst>
+            <c:ext xmlns:c16="http://schemas.microsoft.com/office/drawing/2014/chart" uri="{C3380CC4-5D6E-409C-BE32-E72D297353CC}">
+              <c16:uniqueId val="{00000001-4B7C-42BF-B9E9-8150AC312557}"/>
+            </c:ext>
+          </c:extLst>
+        </c:ser>
+        <c:ser>
+          <c:idx val="2"/>
+          <c:order val="2"/>
+          <c:spPr>
+            <a:solidFill>
+              <a:schemeClr val="accent6"/>
+            </a:solidFill>
+            <a:ln>
+              <a:noFill/>
+            </a:ln>
+            <a:effectLst/>
+          </c:spPr>
+          <c:invertIfNegative val="0"/>
+          <c:cat>
+            <c:strRef>
+              <c:f>Sheet3!$A$2:$A$15</c:f>
+              <c:strCache>
+                <c:ptCount val="14"/>
+                <c:pt idx="0">
+                  <c:v>S01</c:v>
+                </c:pt>
+                <c:pt idx="1">
+                  <c:v>S02</c:v>
+                </c:pt>
+                <c:pt idx="2">
+                  <c:v>S03</c:v>
+                </c:pt>
+                <c:pt idx="3">
+                  <c:v>S04</c:v>
+                </c:pt>
+                <c:pt idx="4">
+                  <c:v>S05</c:v>
+                </c:pt>
+                <c:pt idx="5">
+                  <c:v>S06</c:v>
+                </c:pt>
+                <c:pt idx="6">
+                  <c:v>S07</c:v>
+                </c:pt>
+                <c:pt idx="7">
+                  <c:v>S08</c:v>
+                </c:pt>
+                <c:pt idx="8">
+                  <c:v>S09</c:v>
+                </c:pt>
+                <c:pt idx="9">
+                  <c:v>S10</c:v>
+                </c:pt>
+                <c:pt idx="10">
+                  <c:v>S11</c:v>
+                </c:pt>
+                <c:pt idx="11">
+                  <c:v>S12</c:v>
+                </c:pt>
+                <c:pt idx="12">
+                  <c:v>S13</c:v>
+                </c:pt>
+                <c:pt idx="13">
+                  <c:v>S14</c:v>
+                </c:pt>
+              </c:strCache>
+            </c:strRef>
+          </c:cat>
+          <c:val>
+            <c:numRef>
+              <c:f>Sheet3!$D$2:$D$15</c:f>
+              <c:numCache>
+                <c:formatCode>General</c:formatCode>
+                <c:ptCount val="14"/>
+                <c:pt idx="0">
+                  <c:v>66.888888890000004</c:v>
+                </c:pt>
+                <c:pt idx="1">
+                  <c:v>69.111111109999996</c:v>
+                </c:pt>
+                <c:pt idx="2">
+                  <c:v>73.333333330000002</c:v>
+                </c:pt>
+                <c:pt idx="3">
+                  <c:v>62.666666669999998</c:v>
+                </c:pt>
+                <c:pt idx="4">
+                  <c:v>68.666666669999998</c:v>
+                </c:pt>
+                <c:pt idx="5">
+                  <c:v>62.222222219999999</c:v>
+                </c:pt>
+                <c:pt idx="6">
+                  <c:v>46</c:v>
+                </c:pt>
+                <c:pt idx="7">
+                  <c:v>78</c:v>
+                </c:pt>
+                <c:pt idx="8">
+                  <c:v>56</c:v>
+                </c:pt>
+                <c:pt idx="9">
+                  <c:v>56.444444439999998</c:v>
+                </c:pt>
+                <c:pt idx="10">
+                  <c:v>67.111111109999996</c:v>
+                </c:pt>
+                <c:pt idx="11">
+                  <c:v>69.111111109999996</c:v>
+                </c:pt>
+                <c:pt idx="12">
+                  <c:v>68.888888890000004</c:v>
+                </c:pt>
+                <c:pt idx="13">
+                  <c:v>52.444444439999998</c:v>
+                </c:pt>
+              </c:numCache>
+            </c:numRef>
+          </c:val>
+          <c:extLst>
+            <c:ext xmlns:c16="http://schemas.microsoft.com/office/drawing/2014/chart" uri="{C3380CC4-5D6E-409C-BE32-E72D297353CC}">
+              <c16:uniqueId val="{00000002-4B7C-42BF-B9E9-8150AC312557}"/>
+            </c:ext>
+          </c:extLst>
+        </c:ser>
+        <c:ser>
+          <c:idx val="3"/>
+          <c:order val="3"/>
+          <c:spPr>
+            <a:solidFill>
+              <a:schemeClr val="accent2">
+                <a:lumMod val="60000"/>
+              </a:schemeClr>
+            </a:solidFill>
+            <a:ln>
+              <a:noFill/>
+            </a:ln>
+            <a:effectLst/>
+          </c:spPr>
+          <c:invertIfNegative val="0"/>
+          <c:cat>
+            <c:strRef>
+              <c:f>Sheet3!$A$2:$A$15</c:f>
+              <c:strCache>
+                <c:ptCount val="14"/>
+                <c:pt idx="0">
+                  <c:v>S01</c:v>
+                </c:pt>
+                <c:pt idx="1">
+                  <c:v>S02</c:v>
+                </c:pt>
+                <c:pt idx="2">
+                  <c:v>S03</c:v>
+                </c:pt>
+                <c:pt idx="3">
+                  <c:v>S04</c:v>
+                </c:pt>
+                <c:pt idx="4">
+                  <c:v>S05</c:v>
+                </c:pt>
+                <c:pt idx="5">
+                  <c:v>S06</c:v>
+                </c:pt>
+                <c:pt idx="6">
+                  <c:v>S07</c:v>
+                </c:pt>
+                <c:pt idx="7">
+                  <c:v>S08</c:v>
+                </c:pt>
+                <c:pt idx="8">
+                  <c:v>S09</c:v>
+                </c:pt>
+                <c:pt idx="9">
+                  <c:v>S10</c:v>
+                </c:pt>
+                <c:pt idx="10">
+                  <c:v>S11</c:v>
+                </c:pt>
+                <c:pt idx="11">
+                  <c:v>S12</c:v>
+                </c:pt>
+                <c:pt idx="12">
+                  <c:v>S13</c:v>
+                </c:pt>
+                <c:pt idx="13">
+                  <c:v>S14</c:v>
+                </c:pt>
+              </c:strCache>
+            </c:strRef>
+          </c:cat>
+          <c:val>
+            <c:numRef>
+              <c:f>Sheet3!$E$2:$E$15</c:f>
+              <c:numCache>
+                <c:formatCode>General</c:formatCode>
+                <c:ptCount val="14"/>
+                <c:pt idx="0">
+                  <c:v>56</c:v>
+                </c:pt>
+                <c:pt idx="1">
+                  <c:v>67.333333330000002</c:v>
+                </c:pt>
+                <c:pt idx="2">
+                  <c:v>79.111111109999996</c:v>
+                </c:pt>
+                <c:pt idx="3">
+                  <c:v>74.888888890000004</c:v>
+                </c:pt>
+                <c:pt idx="4">
+                  <c:v>73.555555560000002</c:v>
+                </c:pt>
+                <c:pt idx="5">
+                  <c:v>79.555555560000002</c:v>
+                </c:pt>
+                <c:pt idx="6">
+                  <c:v>54.222222219999999</c:v>
+                </c:pt>
+                <c:pt idx="7">
+                  <c:v>75.333333330000002</c:v>
+                </c:pt>
+                <c:pt idx="8">
+                  <c:v>56.222222219999999</c:v>
+                </c:pt>
+                <c:pt idx="9">
+                  <c:v>58.222222219999999</c:v>
+                </c:pt>
+                <c:pt idx="10">
+                  <c:v>54.888888889999997</c:v>
+                </c:pt>
+                <c:pt idx="11">
+                  <c:v>70.666666669999998</c:v>
+                </c:pt>
+                <c:pt idx="12">
+                  <c:v>48.222222219999999</c:v>
+                </c:pt>
+                <c:pt idx="13">
+                  <c:v>75.555555560000002</c:v>
+                </c:pt>
+              </c:numCache>
+            </c:numRef>
+          </c:val>
+          <c:extLst>
+            <c:ext xmlns:c16="http://schemas.microsoft.com/office/drawing/2014/chart" uri="{C3380CC4-5D6E-409C-BE32-E72D297353CC}">
+              <c16:uniqueId val="{00000003-4B7C-42BF-B9E9-8150AC312557}"/>
+            </c:ext>
+          </c:extLst>
+        </c:ser>
+        <c:dLbls>
+          <c:showLegendKey val="0"/>
+          <c:showVal val="0"/>
+          <c:showCatName val="0"/>
+          <c:showSerName val="0"/>
+          <c:showPercent val="0"/>
+          <c:showBubbleSize val="0"/>
+        </c:dLbls>
+        <c:gapWidth val="219"/>
+        <c:overlap val="-27"/>
+        <c:axId val="621809023"/>
+        <c:axId val="621809503"/>
+      </c:barChart>
+      <c:catAx>
+        <c:axId val="621809023"/>
+        <c:scaling>
+          <c:orientation val="minMax"/>
+        </c:scaling>
+        <c:delete val="0"/>
+        <c:axPos val="b"/>
+        <c:numFmt formatCode="General" sourceLinked="1"/>
+        <c:majorTickMark val="none"/>
+        <c:minorTickMark val="none"/>
+        <c:tickLblPos val="nextTo"/>
+        <c:spPr>
+          <a:noFill/>
+          <a:ln w="9525" cap="flat" cmpd="sng" algn="ctr">
+            <a:solidFill>
+              <a:schemeClr val="tx1">
+                <a:lumMod val="15000"/>
+                <a:lumOff val="85000"/>
+              </a:schemeClr>
+            </a:solidFill>
+            <a:round/>
+          </a:ln>
+          <a:effectLst/>
+        </c:spPr>
+        <c:txPr>
+          <a:bodyPr rot="-60000000" spcFirstLastPara="1" vertOverflow="ellipsis" vert="horz" wrap="square" anchor="ctr" anchorCtr="1"/>
+          <a:lstStyle/>
+          <a:p>
+            <a:pPr>
+              <a:defRPr sz="1200" b="0" i="0" u="none" strike="noStrike" kern="1200" baseline="0">
+                <a:solidFill>
+                  <a:schemeClr val="tx1"/>
+                </a:solidFill>
+                <a:latin typeface="Times New Roman" panose="02020603050405020304" pitchFamily="18" charset="0"/>
+                <a:ea typeface="+mn-ea"/>
+                <a:cs typeface="Times New Roman" panose="02020603050405020304" pitchFamily="18" charset="0"/>
+              </a:defRPr>
+            </a:pPr>
+            <a:endParaRPr lang="en-US"/>
+          </a:p>
+        </c:txPr>
+        <c:crossAx val="621809503"/>
+        <c:crosses val="autoZero"/>
+        <c:auto val="1"/>
+        <c:lblAlgn val="ctr"/>
+        <c:lblOffset val="100"/>
+        <c:noMultiLvlLbl val="0"/>
+      </c:catAx>
+      <c:valAx>
+        <c:axId val="621809503"/>
+        <c:scaling>
+          <c:orientation val="minMax"/>
+        </c:scaling>
+        <c:delete val="0"/>
+        <c:axPos val="l"/>
+        <c:majorGridlines>
+          <c:spPr>
+            <a:ln w="9525" cap="flat" cmpd="sng" algn="ctr">
+              <a:solidFill>
+                <a:schemeClr val="tx1">
+                  <a:lumMod val="15000"/>
+                  <a:lumOff val="85000"/>
+                </a:schemeClr>
+              </a:solidFill>
+              <a:round/>
+            </a:ln>
+            <a:effectLst/>
+          </c:spPr>
+        </c:majorGridlines>
+        <c:numFmt formatCode="General" sourceLinked="1"/>
+        <c:majorTickMark val="none"/>
+        <c:minorTickMark val="none"/>
+        <c:tickLblPos val="nextTo"/>
+        <c:spPr>
+          <a:noFill/>
+          <a:ln>
+            <a:noFill/>
+          </a:ln>
+          <a:effectLst/>
+        </c:spPr>
+        <c:txPr>
+          <a:bodyPr rot="-60000000" spcFirstLastPara="1" vertOverflow="ellipsis" vert="horz" wrap="square" anchor="ctr" anchorCtr="1"/>
+          <a:lstStyle/>
+          <a:p>
+            <a:pPr>
+              <a:defRPr sz="1200" b="0" i="0" u="none" strike="noStrike" kern="1200" baseline="0">
+                <a:solidFill>
+                  <a:schemeClr val="tx1"/>
+                </a:solidFill>
+                <a:latin typeface="Times New Roman" panose="02020603050405020304" pitchFamily="18" charset="0"/>
+                <a:ea typeface="+mn-ea"/>
+                <a:cs typeface="Times New Roman" panose="02020603050405020304" pitchFamily="18" charset="0"/>
+              </a:defRPr>
+            </a:pPr>
+            <a:endParaRPr lang="en-US"/>
+          </a:p>
+        </c:txPr>
+        <c:crossAx val="621809023"/>
+        <c:crosses val="autoZero"/>
+        <c:crossBetween val="between"/>
+      </c:valAx>
+      <c:spPr>
+        <a:noFill/>
+        <a:ln>
+          <a:noFill/>
+        </a:ln>
+        <a:effectLst/>
+      </c:spPr>
+    </c:plotArea>
+    <c:legend>
+      <c:legendPos val="b"/>
+      <c:layout>
+        <c:manualLayout>
+          <c:xMode val="edge"/>
+          <c:yMode val="edge"/>
+          <c:x val="0.67525915989331975"/>
+          <c:y val="0.13817995851784351"/>
+          <c:w val="0.29755625724449419"/>
+          <c:h val="4.7831967432642356E-2"/>
+        </c:manualLayout>
+      </c:layout>
+      <c:overlay val="0"/>
+      <c:spPr>
+        <a:noFill/>
+        <a:ln>
+          <a:noFill/>
+        </a:ln>
+        <a:effectLst/>
+      </c:spPr>
+      <c:txPr>
+        <a:bodyPr rot="0" spcFirstLastPara="1" vertOverflow="ellipsis" vert="horz" wrap="square" anchor="ctr" anchorCtr="1"/>
+        <a:lstStyle/>
+        <a:p>
+          <a:pPr>
+            <a:defRPr sz="1200" b="0" i="0" u="none" strike="noStrike" kern="1200" baseline="0">
+              <a:solidFill>
+                <a:schemeClr val="tx1"/>
+              </a:solidFill>
+              <a:latin typeface="Times New Roman" panose="02020603050405020304" pitchFamily="18" charset="0"/>
+              <a:ea typeface="+mn-ea"/>
+              <a:cs typeface="Times New Roman" panose="02020603050405020304" pitchFamily="18" charset="0"/>
+            </a:defRPr>
+          </a:pPr>
+          <a:endParaRPr lang="en-US"/>
+        </a:p>
+      </c:txPr>
+    </c:legend>
+    <c:plotVisOnly val="1"/>
+    <c:dispBlanksAs val="gap"/>
+    <c:extLst>
+      <c:ext xmlns:c16r3="http://schemas.microsoft.com/office/drawing/2017/03/chart" uri="{56B9EC1D-385E-4148-901F-78D8002777C0}">
+        <c16r3:dataDisplayOptions16>
+          <c16r3:dispNaAsBlank val="1"/>
+        </c16r3:dataDisplayOptions16>
+      </c:ext>
+    </c:extLst>
+    <c:showDLblsOverMax val="0"/>
+  </c:chart>
+  <c:spPr>
+    <a:noFill/>
+    <a:ln>
+      <a:noFill/>
+    </a:ln>
+    <a:effectLst/>
+  </c:spPr>
+  <c:txPr>
+    <a:bodyPr/>
+    <a:lstStyle/>
+    <a:p>
+      <a:pPr>
+        <a:defRPr sz="1200">
+          <a:solidFill>
+            <a:schemeClr val="tx1"/>
+          </a:solidFill>
+          <a:latin typeface="Times New Roman" panose="02020603050405020304" pitchFamily="18" charset="0"/>
+          <a:cs typeface="Times New Roman" panose="02020603050405020304" pitchFamily="18" charset="0"/>
+        </a:defRPr>
+      </a:pPr>
+      <a:endParaRPr lang="en-US"/>
+    </a:p>
+  </c:txPr>
+  <c:externalData r:id="rId3">
+    <c:autoUpdate val="0"/>
+  </c:externalData>
+</c:chartSpace>
+</file>
+
+<file path=ppt/charts/colors1.xml><?xml version="1.0" encoding="utf-8"?>
+<cs:colorStyle xmlns:cs="http://schemas.microsoft.com/office/drawing/2012/chartStyle" xmlns:a="http://schemas.openxmlformats.org/drawingml/2006/main" meth="cycle" id="12">
+  <a:schemeClr val="accent2"/>
+  <a:schemeClr val="accent4"/>
+  <a:schemeClr val="accent6"/>
+  <cs:variation/>
+  <cs:variation>
+    <a:lumMod val="60000"/>
+  </cs:variation>
+  <cs:variation>
+    <a:lumMod val="80000"/>
+    <a:lumOff val="20000"/>
+  </cs:variation>
+  <cs:variation>
+    <a:lumMod val="80000"/>
+  </cs:variation>
+  <cs:variation>
+    <a:lumMod val="60000"/>
+    <a:lumOff val="40000"/>
+  </cs:variation>
+  <cs:variation>
+    <a:lumMod val="50000"/>
+  </cs:variation>
+  <cs:variation>
+    <a:lumMod val="70000"/>
+    <a:lumOff val="30000"/>
+  </cs:variation>
+  <cs:variation>
+    <a:lumMod val="70000"/>
+  </cs:variation>
+  <cs:variation>
+    <a:lumMod val="50000"/>
+    <a:lumOff val="50000"/>
+  </cs:variation>
+</cs:colorStyle>
+</file>
+
+<file path=ppt/charts/style1.xml><?xml version="1.0" encoding="utf-8"?>
+<cs:chartStyle xmlns:cs="http://schemas.microsoft.com/office/drawing/2012/chartStyle" xmlns:a="http://schemas.openxmlformats.org/drawingml/2006/main" id="201">
+  <cs:axisTitle>
+    <cs:lnRef idx="0"/>
+    <cs:fillRef idx="0"/>
+    <cs:effectRef idx="0"/>
+    <cs:fontRef idx="minor">
+      <a:schemeClr val="tx1">
+        <a:lumMod val="65000"/>
+        <a:lumOff val="35000"/>
+      </a:schemeClr>
+    </cs:fontRef>
+    <cs:defRPr sz="1000" kern="1200"/>
+  </cs:axisTitle>
+  <cs:categoryAxis>
+    <cs:lnRef idx="0"/>
+    <cs:fillRef idx="0"/>
+    <cs:effectRef idx="0"/>
+    <cs:fontRef idx="minor">
+      <a:schemeClr val="tx1">
+        <a:lumMod val="65000"/>
+        <a:lumOff val="35000"/>
+      </a:schemeClr>
+    </cs:fontRef>
+    <cs:spPr>
+      <a:ln w="9525" cap="flat" cmpd="sng" algn="ctr">
+        <a:solidFill>
+          <a:schemeClr val="tx1">
+            <a:lumMod val="15000"/>
+            <a:lumOff val="85000"/>
+          </a:schemeClr>
+        </a:solidFill>
+        <a:round/>
+      </a:ln>
+    </cs:spPr>
+    <cs:defRPr sz="900" kern="1200"/>
+  </cs:categoryAxis>
+  <cs:chartArea mods="allowNoFillOverride allowNoLineOverride">
+    <cs:lnRef idx="0"/>
+    <cs:fillRef idx="0"/>
+    <cs:effectRef idx="0"/>
+    <cs:fontRef idx="minor">
+      <a:schemeClr val="tx1"/>
+    </cs:fontRef>
+    <cs:spPr>
+      <a:solidFill>
+        <a:schemeClr val="bg1"/>
+      </a:solidFill>
+      <a:ln w="9525" cap="flat" cmpd="sng" algn="ctr">
+        <a:solidFill>
+          <a:schemeClr val="tx1">
+            <a:lumMod val="15000"/>
+            <a:lumOff val="85000"/>
+          </a:schemeClr>
+        </a:solidFill>
+        <a:round/>
+      </a:ln>
+    </cs:spPr>
+    <cs:defRPr sz="1000" kern="1200"/>
+  </cs:chartArea>
+  <cs:dataLabel>
+    <cs:lnRef idx="0"/>
+    <cs:fillRef idx="0"/>
+    <cs:effectRef idx="0"/>
+    <cs:fontRef idx="minor">
+      <a:schemeClr val="tx1">
+        <a:lumMod val="75000"/>
+        <a:lumOff val="25000"/>
+      </a:schemeClr>
+    </cs:fontRef>
+    <cs:defRPr sz="900" kern="1200"/>
+  </cs:dataLabel>
+  <cs:dataLabelCallout>
+    <cs:lnRef idx="0"/>
+    <cs:fillRef idx="0"/>
+    <cs:effectRef idx="0"/>
+    <cs:fontRef idx="minor">
+      <a:schemeClr val="dk1">
+        <a:lumMod val="65000"/>
+        <a:lumOff val="35000"/>
+      </a:schemeClr>
+    </cs:fontRef>
+    <cs:spPr>
+      <a:solidFill>
+        <a:schemeClr val="lt1"/>
+      </a:solidFill>
+      <a:ln>
+        <a:solidFill>
+          <a:schemeClr val="dk1">
+            <a:lumMod val="25000"/>
+            <a:lumOff val="75000"/>
+          </a:schemeClr>
+        </a:solidFill>
+      </a:ln>
+    </cs:spPr>
+    <cs:defRPr sz="900" kern="1200"/>
+    <cs:bodyPr rot="0" spcFirstLastPara="1" vertOverflow="clip" horzOverflow="clip" vert="horz" wrap="square" lIns="36576" tIns="18288" rIns="36576" bIns="18288" anchor="ctr" anchorCtr="1">
+      <a:spAutoFit/>
+    </cs:bodyPr>
+  </cs:dataLabelCallout>
+  <cs:dataPoint>
+    <cs:lnRef idx="0"/>
+    <cs:fillRef idx="1">
+      <cs:styleClr val="auto"/>
+    </cs:fillRef>
+    <cs:effectRef idx="0"/>
+    <cs:fontRef idx="minor">
+      <a:schemeClr val="tx1"/>
+    </cs:fontRef>
+  </cs:dataPoint>
+  <cs:dataPoint3D>
+    <cs:lnRef idx="0"/>
+    <cs:fillRef idx="1">
+      <cs:styleClr val="auto"/>
+    </cs:fillRef>
+    <cs:effectRef idx="0"/>
+    <cs:fontRef idx="minor">
+      <a:schemeClr val="tx1"/>
+    </cs:fontRef>
+  </cs:dataPoint3D>
+  <cs:dataPointLine>
+    <cs:lnRef idx="0">
+      <cs:styleClr val="auto"/>
+    </cs:lnRef>
+    <cs:fillRef idx="1"/>
+    <cs:effectRef idx="0"/>
+    <cs:fontRef idx="minor">
+      <a:schemeClr val="tx1"/>
+    </cs:fontRef>
+    <cs:spPr>
+      <a:ln w="28575" cap="rnd">
+        <a:solidFill>
+          <a:schemeClr val="phClr"/>
+        </a:solidFill>
+        <a:round/>
+      </a:ln>
+    </cs:spPr>
+  </cs:dataPointLine>
+  <cs:dataPointMarker>
+    <cs:lnRef idx="0">
+      <cs:styleClr val="auto"/>
+    </cs:lnRef>
+    <cs:fillRef idx="1">
+      <cs:styleClr val="auto"/>
+    </cs:fillRef>
+    <cs:effectRef idx="0"/>
+    <cs:fontRef idx="minor">
+      <a:schemeClr val="tx1"/>
+    </cs:fontRef>
+    <cs:spPr>
+      <a:ln w="9525">
+        <a:solidFill>
+          <a:schemeClr val="phClr"/>
+        </a:solidFill>
+      </a:ln>
+    </cs:spPr>
+  </cs:dataPointMarker>
+  <cs:dataPointMarkerLayout symbol="circle" size="5"/>
+  <cs:dataPointWireframe>
+    <cs:lnRef idx="0">
+      <cs:styleClr val="auto"/>
+    </cs:lnRef>
+    <cs:fillRef idx="1"/>
+    <cs:effectRef idx="0"/>
+    <cs:fontRef idx="minor">
+      <a:schemeClr val="tx1"/>
+    </cs:fontRef>
+    <cs:spPr>
+      <a:ln w="9525" cap="rnd">
+        <a:solidFill>
+          <a:schemeClr val="phClr"/>
+        </a:solidFill>
+        <a:round/>
+      </a:ln>
+    </cs:spPr>
+  </cs:dataPointWireframe>
+  <cs:dataTable>
+    <cs:lnRef idx="0"/>
+    <cs:fillRef idx="0"/>
+    <cs:effectRef idx="0"/>
+    <cs:fontRef idx="minor">
+      <a:schemeClr val="tx1">
+        <a:lumMod val="65000"/>
+        <a:lumOff val="35000"/>
+      </a:schemeClr>
+    </cs:fontRef>
+    <cs:spPr>
+      <a:noFill/>
+      <a:ln w="9525" cap="flat" cmpd="sng" algn="ctr">
+        <a:solidFill>
+          <a:schemeClr val="tx1">
+            <a:lumMod val="15000"/>
+            <a:lumOff val="85000"/>
+          </a:schemeClr>
+        </a:solidFill>
+        <a:round/>
+      </a:ln>
+    </cs:spPr>
+    <cs:defRPr sz="900" kern="1200"/>
+  </cs:dataTable>
+  <cs:downBar>
+    <cs:lnRef idx="0"/>
+    <cs:fillRef idx="0"/>
+    <cs:effectRef idx="0"/>
+    <cs:fontRef idx="minor">
+      <a:schemeClr val="dk1"/>
+    </cs:fontRef>
+    <cs:spPr>
+      <a:solidFill>
+        <a:schemeClr val="dk1">
+          <a:lumMod val="65000"/>
+          <a:lumOff val="35000"/>
+        </a:schemeClr>
+      </a:solidFill>
+      <a:ln w="9525">
+        <a:solidFill>
+          <a:schemeClr val="tx1">
+            <a:lumMod val="65000"/>
+            <a:lumOff val="35000"/>
+          </a:schemeClr>
+        </a:solidFill>
+      </a:ln>
+    </cs:spPr>
+  </cs:downBar>
+  <cs:dropLine>
+    <cs:lnRef idx="0"/>
+    <cs:fillRef idx="0"/>
+    <cs:effectRef idx="0"/>
+    <cs:fontRef idx="minor">
+      <a:schemeClr val="tx1"/>
+    </cs:fontRef>
+    <cs:spPr>
+      <a:ln w="9525" cap="flat" cmpd="sng" algn="ctr">
+        <a:solidFill>
+          <a:schemeClr val="tx1">
+            <a:lumMod val="35000"/>
+            <a:lumOff val="65000"/>
+          </a:schemeClr>
+        </a:solidFill>
+        <a:round/>
+      </a:ln>
+    </cs:spPr>
+  </cs:dropLine>
+  <cs:errorBar>
+    <cs:lnRef idx="0"/>
+    <cs:fillRef idx="0"/>
+    <cs:effectRef idx="0"/>
+    <cs:fontRef idx="minor">
+      <a:schemeClr val="tx1"/>
+    </cs:fontRef>
+    <cs:spPr>
+      <a:ln w="9525" cap="flat" cmpd="sng" algn="ctr">
+        <a:solidFill>
+          <a:schemeClr val="tx1">
+            <a:lumMod val="65000"/>
+            <a:lumOff val="35000"/>
+          </a:schemeClr>
+        </a:solidFill>
+        <a:round/>
+      </a:ln>
+    </cs:spPr>
+  </cs:errorBar>
+  <cs:floor>
+    <cs:lnRef idx="0"/>
+    <cs:fillRef idx="0"/>
+    <cs:effectRef idx="0"/>
+    <cs:fontRef idx="minor">
+      <a:schemeClr val="tx1"/>
+    </cs:fontRef>
+    <cs:spPr>
+      <a:noFill/>
+      <a:ln>
+        <a:noFill/>
+      </a:ln>
+    </cs:spPr>
+  </cs:floor>
+  <cs:gridlineMajor>
+    <cs:lnRef idx="0"/>
+    <cs:fillRef idx="0"/>
+    <cs:effectRef idx="0"/>
+    <cs:fontRef idx="minor">
+      <a:schemeClr val="tx1"/>
+    </cs:fontRef>
+    <cs:spPr>
+      <a:ln w="9525" cap="flat" cmpd="sng" algn="ctr">
+        <a:solidFill>
+          <a:schemeClr val="tx1">
+            <a:lumMod val="15000"/>
+            <a:lumOff val="85000"/>
+          </a:schemeClr>
+        </a:solidFill>
+        <a:round/>
+      </a:ln>
+    </cs:spPr>
+  </cs:gridlineMajor>
+  <cs:gridlineMinor>
+    <cs:lnRef idx="0"/>
+    <cs:fillRef idx="0"/>
+    <cs:effectRef idx="0"/>
+    <cs:fontRef idx="minor">
+      <a:schemeClr val="tx1"/>
+    </cs:fontRef>
+    <cs:spPr>
+      <a:ln w="9525" cap="flat" cmpd="sng" algn="ctr">
+        <a:solidFill>
+          <a:schemeClr val="tx1">
+            <a:lumMod val="5000"/>
+            <a:lumOff val="95000"/>
+          </a:schemeClr>
+        </a:solidFill>
+        <a:round/>
+      </a:ln>
+    </cs:spPr>
+  </cs:gridlineMinor>
+  <cs:hiLoLine>
+    <cs:lnRef idx="0"/>
+    <cs:fillRef idx="0"/>
+    <cs:effectRef idx="0"/>
+    <cs:fontRef idx="minor">
+      <a:schemeClr val="tx1"/>
+    </cs:fontRef>
+    <cs:spPr>
+      <a:ln w="9525" cap="flat" cmpd="sng" algn="ctr">
+        <a:solidFill>
+          <a:schemeClr val="tx1">
+            <a:lumMod val="75000"/>
+            <a:lumOff val="25000"/>
+          </a:schemeClr>
+        </a:solidFill>
+        <a:round/>
+      </a:ln>
+    </cs:spPr>
+  </cs:hiLoLine>
+  <cs:leaderLine>
+    <cs:lnRef idx="0"/>
+    <cs:fillRef idx="0"/>
+    <cs:effectRef idx="0"/>
+    <cs:fontRef idx="minor">
+      <a:schemeClr val="tx1"/>
+    </cs:fontRef>
+    <cs:spPr>
+      <a:ln w="9525" cap="flat" cmpd="sng" algn="ctr">
+        <a:solidFill>
+          <a:schemeClr val="tx1">
+            <a:lumMod val="35000"/>
+            <a:lumOff val="65000"/>
+          </a:schemeClr>
+        </a:solidFill>
+        <a:round/>
+      </a:ln>
+    </cs:spPr>
+  </cs:leaderLine>
+  <cs:legend>
+    <cs:lnRef idx="0"/>
+    <cs:fillRef idx="0"/>
+    <cs:effectRef idx="0"/>
+    <cs:fontRef idx="minor">
+      <a:schemeClr val="tx1">
+        <a:lumMod val="65000"/>
+        <a:lumOff val="35000"/>
+      </a:schemeClr>
+    </cs:fontRef>
+    <cs:defRPr sz="900" kern="1200"/>
+  </cs:legend>
+  <cs:plotArea mods="allowNoFillOverride allowNoLineOverride">
+    <cs:lnRef idx="0"/>
+    <cs:fillRef idx="0"/>
+    <cs:effectRef idx="0"/>
+    <cs:fontRef idx="minor">
+      <a:schemeClr val="tx1"/>
+    </cs:fontRef>
+  </cs:plotArea>
+  <cs:plotArea3D mods="allowNoFillOverride allowNoLineOverride">
+    <cs:lnRef idx="0"/>
+    <cs:fillRef idx="0"/>
+    <cs:effectRef idx="0"/>
+    <cs:fontRef idx="minor">
+      <a:schemeClr val="tx1"/>
+    </cs:fontRef>
+  </cs:plotArea3D>
+  <cs:seriesAxis>
+    <cs:lnRef idx="0"/>
+    <cs:fillRef idx="0"/>
+    <cs:effectRef idx="0"/>
+    <cs:fontRef idx="minor">
+      <a:schemeClr val="tx1">
+        <a:lumMod val="65000"/>
+        <a:lumOff val="35000"/>
+      </a:schemeClr>
+    </cs:fontRef>
+    <cs:defRPr sz="900" kern="1200"/>
+  </cs:seriesAxis>
+  <cs:seriesLine>
+    <cs:lnRef idx="0"/>
+    <cs:fillRef idx="0"/>
+    <cs:effectRef idx="0"/>
+    <cs:fontRef idx="minor">
+      <a:schemeClr val="tx1"/>
+    </cs:fontRef>
+    <cs:spPr>
+      <a:ln w="9525" cap="flat" cmpd="sng" algn="ctr">
+        <a:solidFill>
+          <a:schemeClr val="tx1">
+            <a:lumMod val="35000"/>
+            <a:lumOff val="65000"/>
+          </a:schemeClr>
+        </a:solidFill>
+        <a:round/>
+      </a:ln>
+    </cs:spPr>
+  </cs:seriesLine>
+  <cs:title>
+    <cs:lnRef idx="0"/>
+    <cs:fillRef idx="0"/>
+    <cs:effectRef idx="0"/>
+    <cs:fontRef idx="minor">
+      <a:schemeClr val="tx1">
+        <a:lumMod val="65000"/>
+        <a:lumOff val="35000"/>
+      </a:schemeClr>
+    </cs:fontRef>
+    <cs:defRPr sz="1400" b="0" kern="1200" spc="0" baseline="0"/>
+  </cs:title>
+  <cs:trendline>
+    <cs:lnRef idx="0">
+      <cs:styleClr val="auto"/>
+    </cs:lnRef>
+    <cs:fillRef idx="0"/>
+    <cs:effectRef idx="0"/>
+    <cs:fontRef idx="minor">
+      <a:schemeClr val="tx1"/>
+    </cs:fontRef>
+    <cs:spPr>
+      <a:ln w="19050" cap="rnd">
+        <a:solidFill>
+          <a:schemeClr val="phClr"/>
+        </a:solidFill>
+        <a:prstDash val="sysDot"/>
+      </a:ln>
+    </cs:spPr>
+  </cs:trendline>
+  <cs:trendlineLabel>
+    <cs:lnRef idx="0"/>
+    <cs:fillRef idx="0"/>
+    <cs:effectRef idx="0"/>
+    <cs:fontRef idx="minor">
+      <a:schemeClr val="tx1">
+        <a:lumMod val="65000"/>
+        <a:lumOff val="35000"/>
+      </a:schemeClr>
+    </cs:fontRef>
+    <cs:defRPr sz="900" kern="1200"/>
+  </cs:trendlineLabel>
+  <cs:upBar>
+    <cs:lnRef idx="0"/>
+    <cs:fillRef idx="0"/>
+    <cs:effectRef idx="0"/>
+    <cs:fontRef idx="minor">
+      <a:schemeClr val="dk1"/>
+    </cs:fontRef>
+    <cs:spPr>
+      <a:solidFill>
+        <a:schemeClr val="lt1"/>
+      </a:solidFill>
+      <a:ln w="9525">
+        <a:solidFill>
+          <a:schemeClr val="tx1">
+            <a:lumMod val="15000"/>
+            <a:lumOff val="85000"/>
+          </a:schemeClr>
+        </a:solidFill>
+      </a:ln>
+    </cs:spPr>
+  </cs:upBar>
+  <cs:valueAxis>
+    <cs:lnRef idx="0"/>
+    <cs:fillRef idx="0"/>
+    <cs:effectRef idx="0"/>
+    <cs:fontRef idx="minor">
+      <a:schemeClr val="tx1">
+        <a:lumMod val="65000"/>
+        <a:lumOff val="35000"/>
+      </a:schemeClr>
+    </cs:fontRef>
+    <cs:defRPr sz="900" kern="1200"/>
+  </cs:valueAxis>
+  <cs:wall>
+    <cs:lnRef idx="0"/>
+    <cs:fillRef idx="0"/>
+    <cs:effectRef idx="0"/>
+    <cs:fontRef idx="minor">
+      <a:schemeClr val="tx1"/>
+    </cs:fontRef>
+    <cs:spPr>
+      <a:noFill/>
+      <a:ln>
+        <a:noFill/>
+      </a:ln>
+    </cs:spPr>
+  </cs:wall>
+</cs:chartStyle>
 </file>
 
 <file path=ppt/notesMasters/notesMaster1.xml><?xml version="1.0" encoding="utf-8"?>
@@ -199,7 +1459,7 @@
           <a:p>
             <a:fld id="{5C0C6918-E2B4-4C7C-A655-283027A7DE9F}" type="datetimeFigureOut">
               <a:rPr lang="en-SG" smtClean="0"/>
-              <a:t>11/12/2024</a:t>
+              <a:t>31/1/2025</a:t>
             </a:fld>
             <a:endParaRPr lang="en-SG"/>
           </a:p>
@@ -700,7 +1960,7 @@
           <a:p>
             <a:fld id="{D1981919-E591-40C2-A600-3BE047E44769}" type="datetimeFigureOut">
               <a:rPr lang="en-SG" smtClean="0"/>
-              <a:t>11/12/2024</a:t>
+              <a:t>31/1/2025</a:t>
             </a:fld>
             <a:endParaRPr lang="en-SG"/>
           </a:p>
@@ -900,7 +2160,7 @@
           <a:p>
             <a:fld id="{D1981919-E591-40C2-A600-3BE047E44769}" type="datetimeFigureOut">
               <a:rPr lang="en-SG" smtClean="0"/>
-              <a:t>11/12/2024</a:t>
+              <a:t>31/1/2025</a:t>
             </a:fld>
             <a:endParaRPr lang="en-SG"/>
           </a:p>
@@ -1110,7 +2370,7 @@
           <a:p>
             <a:fld id="{D1981919-E591-40C2-A600-3BE047E44769}" type="datetimeFigureOut">
               <a:rPr lang="en-SG" smtClean="0"/>
-              <a:t>11/12/2024</a:t>
+              <a:t>31/1/2025</a:t>
             </a:fld>
             <a:endParaRPr lang="en-SG"/>
           </a:p>
@@ -1310,7 +2570,7 @@
           <a:p>
             <a:fld id="{D1981919-E591-40C2-A600-3BE047E44769}" type="datetimeFigureOut">
               <a:rPr lang="en-SG" smtClean="0"/>
-              <a:t>11/12/2024</a:t>
+              <a:t>31/1/2025</a:t>
             </a:fld>
             <a:endParaRPr lang="en-SG"/>
           </a:p>
@@ -1586,7 +2846,7 @@
           <a:p>
             <a:fld id="{D1981919-E591-40C2-A600-3BE047E44769}" type="datetimeFigureOut">
               <a:rPr lang="en-SG" smtClean="0"/>
-              <a:t>11/12/2024</a:t>
+              <a:t>31/1/2025</a:t>
             </a:fld>
             <a:endParaRPr lang="en-SG"/>
           </a:p>
@@ -1854,7 +3114,7 @@
           <a:p>
             <a:fld id="{D1981919-E591-40C2-A600-3BE047E44769}" type="datetimeFigureOut">
               <a:rPr lang="en-SG" smtClean="0"/>
-              <a:t>11/12/2024</a:t>
+              <a:t>31/1/2025</a:t>
             </a:fld>
             <a:endParaRPr lang="en-SG"/>
           </a:p>
@@ -2269,7 +3529,7 @@
           <a:p>
             <a:fld id="{D1981919-E591-40C2-A600-3BE047E44769}" type="datetimeFigureOut">
               <a:rPr lang="en-SG" smtClean="0"/>
-              <a:t>11/12/2024</a:t>
+              <a:t>31/1/2025</a:t>
             </a:fld>
             <a:endParaRPr lang="en-SG"/>
           </a:p>
@@ -2411,7 +3671,7 @@
           <a:p>
             <a:fld id="{D1981919-E591-40C2-A600-3BE047E44769}" type="datetimeFigureOut">
               <a:rPr lang="en-SG" smtClean="0"/>
-              <a:t>11/12/2024</a:t>
+              <a:t>31/1/2025</a:t>
             </a:fld>
             <a:endParaRPr lang="en-SG"/>
           </a:p>
@@ -2524,7 +3784,7 @@
           <a:p>
             <a:fld id="{D1981919-E591-40C2-A600-3BE047E44769}" type="datetimeFigureOut">
               <a:rPr lang="en-SG" smtClean="0"/>
-              <a:t>11/12/2024</a:t>
+              <a:t>31/1/2025</a:t>
             </a:fld>
             <a:endParaRPr lang="en-SG"/>
           </a:p>
@@ -2837,7 +4097,7 @@
           <a:p>
             <a:fld id="{D1981919-E591-40C2-A600-3BE047E44769}" type="datetimeFigureOut">
               <a:rPr lang="en-SG" smtClean="0"/>
-              <a:t>11/12/2024</a:t>
+              <a:t>31/1/2025</a:t>
             </a:fld>
             <a:endParaRPr lang="en-SG"/>
           </a:p>
@@ -3126,7 +4386,7 @@
           <a:p>
             <a:fld id="{D1981919-E591-40C2-A600-3BE047E44769}" type="datetimeFigureOut">
               <a:rPr lang="en-SG" smtClean="0"/>
-              <a:t>11/12/2024</a:t>
+              <a:t>31/1/2025</a:t>
             </a:fld>
             <a:endParaRPr lang="en-SG"/>
           </a:p>
@@ -3369,7 +4629,7 @@
           <a:p>
             <a:fld id="{D1981919-E591-40C2-A600-3BE047E44769}" type="datetimeFigureOut">
               <a:rPr lang="en-SG" smtClean="0"/>
-              <a:t>11/12/2024</a:t>
+              <a:t>31/1/2025</a:t>
             </a:fld>
             <a:endParaRPr lang="en-SG"/>
           </a:p>
@@ -3897,6 +5157,66 @@
 </p:sld>
 </file>
 
+<file path=ppt/slides/slide10.xml><?xml version="1.0" encoding="utf-8"?>
+<p:sld xmlns:a="http://schemas.openxmlformats.org/drawingml/2006/main" xmlns:r="http://schemas.openxmlformats.org/officeDocument/2006/relationships" xmlns:p="http://schemas.openxmlformats.org/presentationml/2006/main">
+  <p:cSld>
+    <p:spTree>
+      <p:nvGrpSpPr>
+        <p:cNvPr id="1" name=""/>
+        <p:cNvGrpSpPr/>
+        <p:nvPr/>
+      </p:nvGrpSpPr>
+      <p:grpSpPr>
+        <a:xfrm>
+          <a:off x="0" y="0"/>
+          <a:ext cx="0" cy="0"/>
+          <a:chOff x="0" y="0"/>
+          <a:chExt cx="0" cy="0"/>
+        </a:xfrm>
+      </p:grpSpPr>
+      <p:graphicFrame>
+        <p:nvGraphicFramePr>
+          <p:cNvPr id="2" name="Chart 1">
+            <a:extLst>
+              <a:ext uri="{FF2B5EF4-FFF2-40B4-BE49-F238E27FC236}">
+                <a16:creationId xmlns:a16="http://schemas.microsoft.com/office/drawing/2014/main" id="{550EC5C9-4553-0737-5F18-2F0E5FF085BF}"/>
+              </a:ext>
+            </a:extLst>
+          </p:cNvPr>
+          <p:cNvGraphicFramePr>
+            <a:graphicFrameLocks/>
+          </p:cNvGraphicFramePr>
+          <p:nvPr>
+            <p:extLst>
+              <p:ext uri="{D42A27DB-BD31-4B8C-83A1-F6EECF244321}">
+                <p14:modId xmlns:p14="http://schemas.microsoft.com/office/powerpoint/2010/main" val="2685680798"/>
+              </p:ext>
+            </p:extLst>
+          </p:nvPr>
+        </p:nvGraphicFramePr>
+        <p:xfrm>
+          <a:off x="821267" y="719667"/>
+          <a:ext cx="10151533" cy="5621866"/>
+        </p:xfrm>
+        <a:graphic>
+          <a:graphicData uri="http://schemas.openxmlformats.org/drawingml/2006/chart">
+            <c:chart xmlns:c="http://schemas.openxmlformats.org/drawingml/2006/chart" xmlns:r="http://schemas.openxmlformats.org/officeDocument/2006/relationships" r:id="rId2"/>
+          </a:graphicData>
+        </a:graphic>
+      </p:graphicFrame>
+    </p:spTree>
+    <p:extLst>
+      <p:ext uri="{BB962C8B-B14F-4D97-AF65-F5344CB8AC3E}">
+        <p14:creationId xmlns:p14="http://schemas.microsoft.com/office/powerpoint/2010/main" val="2722004088"/>
+      </p:ext>
+    </p:extLst>
+  </p:cSld>
+  <p:clrMapOvr>
+    <a:masterClrMapping/>
+  </p:clrMapOvr>
+</p:sld>
+</file>
+
 <file path=ppt/slides/slide2.xml><?xml version="1.0" encoding="utf-8"?>
 <p:sld xmlns:a="http://schemas.openxmlformats.org/drawingml/2006/main" xmlns:r="http://schemas.openxmlformats.org/officeDocument/2006/relationships" xmlns:p="http://schemas.openxmlformats.org/presentationml/2006/main">
   <p:cSld>
@@ -4096,8 +5416,8 @@
           </a:prstGeom>
         </p:spPr>
       </p:pic>
-      <mc:AlternateContent xmlns:mc="http://schemas.openxmlformats.org/markup-compatibility/2006">
-        <mc:Choice xmlns:a14="http://schemas.microsoft.com/office/drawing/2010/main" Requires="a14">
+      <mc:AlternateContent xmlns:mc="http://schemas.openxmlformats.org/markup-compatibility/2006" xmlns:a14="http://schemas.microsoft.com/office/drawing/2010/main">
+        <mc:Choice Requires="a14">
           <p:sp>
             <p:nvSpPr>
               <p:cNvPr id="5" name="TextBox 4">
@@ -4228,7 +5548,7 @@
             </p:txBody>
           </p:sp>
         </mc:Choice>
-        <mc:Fallback>
+        <mc:Fallback xmlns="">
           <p:sp>
             <p:nvSpPr>
               <p:cNvPr id="5" name="TextBox 4">
@@ -9438,8 +10758,8 @@
             </a:fontRef>
           </p:style>
         </p:cxnSp>
-        <mc:AlternateContent xmlns:mc="http://schemas.openxmlformats.org/markup-compatibility/2006">
-          <mc:Choice xmlns:a14="http://schemas.microsoft.com/office/drawing/2010/main" Requires="a14">
+        <mc:AlternateContent xmlns:mc="http://schemas.openxmlformats.org/markup-compatibility/2006" xmlns:a14="http://schemas.microsoft.com/office/drawing/2010/main">
+          <mc:Choice Requires="a14">
             <p:sp>
               <p:nvSpPr>
                 <p:cNvPr id="57" name="TextBox 56">
@@ -9496,13 +10816,7 @@
                               <a:rPr lang="en-SG" b="0" i="1" smtClean="0">
                                 <a:latin typeface="Cambria Math" panose="02040503050406030204" pitchFamily="18" charset="0"/>
                               </a:rPr>
-                              <m:t>1</m:t>
-                            </m:r>
-                            <m:r>
-                              <a:rPr lang="en-SG" b="0" i="1" smtClean="0">
-                                <a:latin typeface="Cambria Math" panose="02040503050406030204" pitchFamily="18" charset="0"/>
-                              </a:rPr>
-                              <m:t>×</m:t>
+                              <m:t>1×</m:t>
                             </m:r>
                             <m:sSub>
                               <m:sSubPr>
@@ -9539,7 +10853,7 @@
               </p:txBody>
             </p:sp>
           </mc:Choice>
-          <mc:Fallback>
+          <mc:Fallback xmlns="">
             <p:sp>
               <p:nvSpPr>
                 <p:cNvPr id="57" name="TextBox 56">
@@ -10881,8 +12195,8 @@
                 </p:style>
               </p:cxnSp>
             </p:grpSp>
-            <mc:AlternateContent xmlns:mc="http://schemas.openxmlformats.org/markup-compatibility/2006">
-              <mc:Choice xmlns:a14="http://schemas.microsoft.com/office/drawing/2010/main" Requires="a14">
+            <mc:AlternateContent xmlns:mc="http://schemas.openxmlformats.org/markup-compatibility/2006" xmlns:a14="http://schemas.microsoft.com/office/drawing/2010/main">
+              <mc:Choice Requires="a14">
                 <p:sp>
                   <p:nvSpPr>
                     <p:cNvPr id="82" name="TextBox 81">
@@ -10951,7 +12265,7 @@
                   </p:txBody>
                 </p:sp>
               </mc:Choice>
-              <mc:Fallback>
+              <mc:Fallback xmlns="">
                 <p:sp>
                   <p:nvSpPr>
                     <p:cNvPr id="82" name="TextBox 81">
@@ -10996,8 +12310,8 @@
                 </p:sp>
               </mc:Fallback>
             </mc:AlternateContent>
-            <mc:AlternateContent xmlns:mc="http://schemas.openxmlformats.org/markup-compatibility/2006">
-              <mc:Choice xmlns:a14="http://schemas.microsoft.com/office/drawing/2010/main" Requires="a14">
+            <mc:AlternateContent xmlns:mc="http://schemas.openxmlformats.org/markup-compatibility/2006" xmlns:a14="http://schemas.microsoft.com/office/drawing/2010/main">
+              <mc:Choice Requires="a14">
                 <p:sp>
                   <p:nvSpPr>
                     <p:cNvPr id="83" name="TextBox 82">
@@ -11062,13 +12376,7 @@
                               <a:rPr lang="en-SG" b="0" i="1" smtClean="0">
                                 <a:latin typeface="Cambria Math" panose="02040503050406030204" pitchFamily="18" charset="0"/>
                               </a:rPr>
-                              <m:t>/</m:t>
-                            </m:r>
-                            <m:r>
-                              <a:rPr lang="en-SG" b="0" i="1" smtClean="0">
-                                <a:latin typeface="Cambria Math" panose="02040503050406030204" pitchFamily="18" charset="0"/>
-                              </a:rPr>
-                              <m:t>/</m:t>
+                              <m:t>//</m:t>
                             </m:r>
                             <m:r>
                               <a:rPr lang="en-SG" b="0" i="1" smtClean="0">
@@ -11084,7 +12392,7 @@
                   </p:txBody>
                 </p:sp>
               </mc:Choice>
-              <mc:Fallback>
+              <mc:Fallback xmlns="">
                 <p:sp>
                   <p:nvSpPr>
                     <p:cNvPr id="83" name="TextBox 82">
@@ -11129,8 +12437,8 @@
                 </p:sp>
               </mc:Fallback>
             </mc:AlternateContent>
-            <mc:AlternateContent xmlns:mc="http://schemas.openxmlformats.org/markup-compatibility/2006">
-              <mc:Choice xmlns:a14="http://schemas.microsoft.com/office/drawing/2010/main" Requires="a14">
+            <mc:AlternateContent xmlns:mc="http://schemas.openxmlformats.org/markup-compatibility/2006" xmlns:a14="http://schemas.microsoft.com/office/drawing/2010/main">
+              <mc:Choice Requires="a14">
                 <p:sp>
                   <p:nvSpPr>
                     <p:cNvPr id="84" name="TextBox 83">
@@ -11199,7 +12507,7 @@
                   </p:txBody>
                 </p:sp>
               </mc:Choice>
-              <mc:Fallback>
+              <mc:Fallback xmlns="">
                 <p:sp>
                   <p:nvSpPr>
                     <p:cNvPr id="84" name="TextBox 83">
@@ -11564,8 +12872,8 @@
             </a:p>
           </p:txBody>
         </p:sp>
-        <mc:AlternateContent xmlns:mc="http://schemas.openxmlformats.org/markup-compatibility/2006">
-          <mc:Choice xmlns:a14="http://schemas.microsoft.com/office/drawing/2010/main" Requires="a14">
+        <mc:AlternateContent xmlns:mc="http://schemas.openxmlformats.org/markup-compatibility/2006" xmlns:a14="http://schemas.microsoft.com/office/drawing/2010/main">
+          <mc:Choice Requires="a14">
             <p:sp>
               <p:nvSpPr>
                 <p:cNvPr id="65" name="TextBox 64">
@@ -11659,7 +12967,7 @@
               </p:txBody>
             </p:sp>
           </mc:Choice>
-          <mc:Fallback>
+          <mc:Fallback xmlns="">
             <p:sp>
               <p:nvSpPr>
                 <p:cNvPr id="65" name="TextBox 64">
@@ -12320,6 +13628,36 @@
 </p:sld>
 </file>
 
+<file path=ppt/slides/slide9.xml><?xml version="1.0" encoding="utf-8"?>
+<p:sld xmlns:a="http://schemas.openxmlformats.org/drawingml/2006/main" xmlns:r="http://schemas.openxmlformats.org/officeDocument/2006/relationships" xmlns:p="http://schemas.openxmlformats.org/presentationml/2006/main">
+  <p:cSld>
+    <p:spTree>
+      <p:nvGrpSpPr>
+        <p:cNvPr id="1" name=""/>
+        <p:cNvGrpSpPr/>
+        <p:nvPr/>
+      </p:nvGrpSpPr>
+      <p:grpSpPr>
+        <a:xfrm>
+          <a:off x="0" y="0"/>
+          <a:ext cx="0" cy="0"/>
+          <a:chOff x="0" y="0"/>
+          <a:chExt cx="0" cy="0"/>
+        </a:xfrm>
+      </p:grpSpPr>
+    </p:spTree>
+    <p:extLst>
+      <p:ext uri="{BB962C8B-B14F-4D97-AF65-F5344CB8AC3E}">
+        <p14:creationId xmlns:p14="http://schemas.microsoft.com/office/powerpoint/2010/main" val="2135828272"/>
+      </p:ext>
+    </p:extLst>
+  </p:cSld>
+  <p:clrMapOvr>
+    <a:masterClrMapping/>
+  </p:clrMapOvr>
+</p:sld>
+</file>
+
 <file path=ppt/theme/theme1.xml><?xml version="1.0" encoding="utf-8"?>
 <a:theme xmlns:a="http://schemas.openxmlformats.org/drawingml/2006/main" name="Office Theme">
   <a:themeElements>

</xml_diff>

<commit_message>
Updated documents with SMC2025
</commit_message>
<xml_diff>
--- a/document/EEGScaler.pptx
+++ b/document/EEGScaler.pptx
@@ -5,7 +5,7 @@
     <p:sldMasterId id="2147483648" r:id="rId1"/>
   </p:sldMasterIdLst>
   <p:notesMasterIdLst>
-    <p:notesMasterId r:id="rId13"/>
+    <p:notesMasterId r:id="rId15"/>
   </p:notesMasterIdLst>
   <p:sldIdLst>
     <p:sldId id="256" r:id="rId2"/>
@@ -14,11 +14,13 @@
     <p:sldId id="260" r:id="rId5"/>
     <p:sldId id="261" r:id="rId6"/>
     <p:sldId id="264" r:id="rId7"/>
-    <p:sldId id="263" r:id="rId8"/>
-    <p:sldId id="257" r:id="rId9"/>
-    <p:sldId id="266" r:id="rId10"/>
-    <p:sldId id="267" r:id="rId11"/>
-    <p:sldId id="265" r:id="rId12"/>
+    <p:sldId id="268" r:id="rId8"/>
+    <p:sldId id="263" r:id="rId9"/>
+    <p:sldId id="257" r:id="rId10"/>
+    <p:sldId id="266" r:id="rId11"/>
+    <p:sldId id="267" r:id="rId12"/>
+    <p:sldId id="265" r:id="rId13"/>
+    <p:sldId id="269" r:id="rId14"/>
   </p:sldIdLst>
   <p:sldSz cx="12192000" cy="6858000"/>
   <p:notesSz cx="6858000" cy="9144000"/>
@@ -838,6 +840,797 @@
 </c:chartSpace>
 </file>
 
+<file path=ppt/charts/chart2.xml><?xml version="1.0" encoding="utf-8"?>
+<c:chartSpace xmlns:c="http://schemas.openxmlformats.org/drawingml/2006/chart" xmlns:a="http://schemas.openxmlformats.org/drawingml/2006/main" xmlns:r="http://schemas.openxmlformats.org/officeDocument/2006/relationships" xmlns:c16r2="http://schemas.microsoft.com/office/drawing/2015/06/chart">
+  <c:date1904 val="0"/>
+  <c:lang val="en-US"/>
+  <c:roundedCorners val="0"/>
+  <mc:AlternateContent xmlns:mc="http://schemas.openxmlformats.org/markup-compatibility/2006">
+    <mc:Choice xmlns:c14="http://schemas.microsoft.com/office/drawing/2007/8/2/chart" Requires="c14">
+      <c14:style val="102"/>
+    </mc:Choice>
+    <mc:Fallback>
+      <c:style val="2"/>
+    </mc:Fallback>
+  </mc:AlternateContent>
+  <c:chart>
+    <c:autoTitleDeleted val="1"/>
+    <c:plotArea>
+      <c:layout>
+        <c:manualLayout>
+          <c:layoutTarget val="inner"/>
+          <c:xMode val="edge"/>
+          <c:yMode val="edge"/>
+          <c:x val="4.786480822961646E-2"/>
+          <c:y val="3.3152501506931886E-2"/>
+          <c:w val="0.93869433155532966"/>
+          <c:h val="0.91224150778621027"/>
+        </c:manualLayout>
+      </c:layout>
+      <c:barChart>
+        <c:barDir val="col"/>
+        <c:grouping val="clustered"/>
+        <c:varyColors val="0"/>
+        <c:ser>
+          <c:idx val="4"/>
+          <c:order val="0"/>
+          <c:spPr>
+            <a:solidFill>
+              <a:schemeClr val="accent4">
+                <a:lumMod val="60000"/>
+              </a:schemeClr>
+            </a:solidFill>
+            <a:ln>
+              <a:noFill/>
+            </a:ln>
+            <a:effectLst/>
+          </c:spPr>
+          <c:invertIfNegative val="0"/>
+          <c:cat>
+            <c:strRef>
+              <c:f>Sheet3!$A$2:$A$15</c:f>
+              <c:strCache>
+                <c:ptCount val="14"/>
+                <c:pt idx="0">
+                  <c:v>S01</c:v>
+                </c:pt>
+                <c:pt idx="1">
+                  <c:v>S02</c:v>
+                </c:pt>
+                <c:pt idx="2">
+                  <c:v>S03</c:v>
+                </c:pt>
+                <c:pt idx="3">
+                  <c:v>S04</c:v>
+                </c:pt>
+                <c:pt idx="4">
+                  <c:v>S05</c:v>
+                </c:pt>
+                <c:pt idx="5">
+                  <c:v>S06</c:v>
+                </c:pt>
+                <c:pt idx="6">
+                  <c:v>S07</c:v>
+                </c:pt>
+                <c:pt idx="7">
+                  <c:v>S08</c:v>
+                </c:pt>
+                <c:pt idx="8">
+                  <c:v>S09</c:v>
+                </c:pt>
+                <c:pt idx="9">
+                  <c:v>S10</c:v>
+                </c:pt>
+                <c:pt idx="10">
+                  <c:v>S11</c:v>
+                </c:pt>
+                <c:pt idx="11">
+                  <c:v>S12</c:v>
+                </c:pt>
+                <c:pt idx="12">
+                  <c:v>S13</c:v>
+                </c:pt>
+                <c:pt idx="13">
+                  <c:v>S14</c:v>
+                </c:pt>
+              </c:strCache>
+            </c:strRef>
+          </c:cat>
+          <c:val>
+            <c:numRef>
+              <c:f>Sheet3!$F$2:$F$15</c:f>
+              <c:numCache>
+                <c:formatCode>0.00</c:formatCode>
+                <c:ptCount val="14"/>
+                <c:pt idx="0">
+                  <c:v>50</c:v>
+                </c:pt>
+                <c:pt idx="1">
+                  <c:v>52.08</c:v>
+                </c:pt>
+                <c:pt idx="2">
+                  <c:v>54.17</c:v>
+                </c:pt>
+                <c:pt idx="3">
+                  <c:v>50</c:v>
+                </c:pt>
+                <c:pt idx="4">
+                  <c:v>50</c:v>
+                </c:pt>
+                <c:pt idx="5">
+                  <c:v>50</c:v>
+                </c:pt>
+                <c:pt idx="6">
+                  <c:v>58.33</c:v>
+                </c:pt>
+                <c:pt idx="7">
+                  <c:v>54.17</c:v>
+                </c:pt>
+                <c:pt idx="8">
+                  <c:v>62.5</c:v>
+                </c:pt>
+                <c:pt idx="9">
+                  <c:v>52.08</c:v>
+                </c:pt>
+                <c:pt idx="10">
+                  <c:v>50</c:v>
+                </c:pt>
+                <c:pt idx="11">
+                  <c:v>39.58</c:v>
+                </c:pt>
+                <c:pt idx="12">
+                  <c:v>52.08</c:v>
+                </c:pt>
+                <c:pt idx="13">
+                  <c:v>45.83</c:v>
+                </c:pt>
+              </c:numCache>
+            </c:numRef>
+          </c:val>
+          <c:extLst>
+            <c:ext xmlns:c16="http://schemas.microsoft.com/office/drawing/2014/chart" uri="{C3380CC4-5D6E-409C-BE32-E72D297353CC}">
+              <c16:uniqueId val="{00000000-1558-4331-B2F0-8A316EEDE3CA}"/>
+            </c:ext>
+          </c:extLst>
+        </c:ser>
+        <c:ser>
+          <c:idx val="0"/>
+          <c:order val="1"/>
+          <c:spPr>
+            <a:solidFill>
+              <a:schemeClr val="accent2"/>
+            </a:solidFill>
+            <a:ln>
+              <a:noFill/>
+            </a:ln>
+            <a:effectLst/>
+          </c:spPr>
+          <c:invertIfNegative val="0"/>
+          <c:cat>
+            <c:strRef>
+              <c:f>Sheet3!$A$2:$A$15</c:f>
+              <c:strCache>
+                <c:ptCount val="14"/>
+                <c:pt idx="0">
+                  <c:v>S01</c:v>
+                </c:pt>
+                <c:pt idx="1">
+                  <c:v>S02</c:v>
+                </c:pt>
+                <c:pt idx="2">
+                  <c:v>S03</c:v>
+                </c:pt>
+                <c:pt idx="3">
+                  <c:v>S04</c:v>
+                </c:pt>
+                <c:pt idx="4">
+                  <c:v>S05</c:v>
+                </c:pt>
+                <c:pt idx="5">
+                  <c:v>S06</c:v>
+                </c:pt>
+                <c:pt idx="6">
+                  <c:v>S07</c:v>
+                </c:pt>
+                <c:pt idx="7">
+                  <c:v>S08</c:v>
+                </c:pt>
+                <c:pt idx="8">
+                  <c:v>S09</c:v>
+                </c:pt>
+                <c:pt idx="9">
+                  <c:v>S10</c:v>
+                </c:pt>
+                <c:pt idx="10">
+                  <c:v>S11</c:v>
+                </c:pt>
+                <c:pt idx="11">
+                  <c:v>S12</c:v>
+                </c:pt>
+                <c:pt idx="12">
+                  <c:v>S13</c:v>
+                </c:pt>
+                <c:pt idx="13">
+                  <c:v>S14</c:v>
+                </c:pt>
+              </c:strCache>
+            </c:strRef>
+          </c:cat>
+          <c:val>
+            <c:numRef>
+              <c:f>Sheet3!$B$2:$B$15</c:f>
+              <c:numCache>
+                <c:formatCode>General</c:formatCode>
+                <c:ptCount val="14"/>
+                <c:pt idx="0">
+                  <c:v>54.17</c:v>
+                </c:pt>
+                <c:pt idx="1">
+                  <c:v>52.08</c:v>
+                </c:pt>
+                <c:pt idx="2">
+                  <c:v>64.58</c:v>
+                </c:pt>
+                <c:pt idx="3">
+                  <c:v>60.42</c:v>
+                </c:pt>
+                <c:pt idx="4">
+                  <c:v>66.67</c:v>
+                </c:pt>
+                <c:pt idx="5">
+                  <c:v>58.33</c:v>
+                </c:pt>
+                <c:pt idx="6">
+                  <c:v>52.08</c:v>
+                </c:pt>
+                <c:pt idx="7">
+                  <c:v>56.25</c:v>
+                </c:pt>
+                <c:pt idx="8">
+                  <c:v>58.33</c:v>
+                </c:pt>
+                <c:pt idx="9">
+                  <c:v>60.42</c:v>
+                </c:pt>
+                <c:pt idx="10">
+                  <c:v>68.75</c:v>
+                </c:pt>
+                <c:pt idx="11">
+                  <c:v>60.42</c:v>
+                </c:pt>
+                <c:pt idx="12">
+                  <c:v>54.17</c:v>
+                </c:pt>
+                <c:pt idx="13">
+                  <c:v>66.67</c:v>
+                </c:pt>
+              </c:numCache>
+            </c:numRef>
+          </c:val>
+          <c:extLst>
+            <c:ext xmlns:c16="http://schemas.microsoft.com/office/drawing/2014/chart" uri="{C3380CC4-5D6E-409C-BE32-E72D297353CC}">
+              <c16:uniqueId val="{00000001-1558-4331-B2F0-8A316EEDE3CA}"/>
+            </c:ext>
+          </c:extLst>
+        </c:ser>
+        <c:ser>
+          <c:idx val="1"/>
+          <c:order val="2"/>
+          <c:spPr>
+            <a:solidFill>
+              <a:schemeClr val="accent4"/>
+            </a:solidFill>
+            <a:ln>
+              <a:noFill/>
+            </a:ln>
+            <a:effectLst/>
+          </c:spPr>
+          <c:invertIfNegative val="0"/>
+          <c:cat>
+            <c:strRef>
+              <c:f>Sheet3!$A$2:$A$15</c:f>
+              <c:strCache>
+                <c:ptCount val="14"/>
+                <c:pt idx="0">
+                  <c:v>S01</c:v>
+                </c:pt>
+                <c:pt idx="1">
+                  <c:v>S02</c:v>
+                </c:pt>
+                <c:pt idx="2">
+                  <c:v>S03</c:v>
+                </c:pt>
+                <c:pt idx="3">
+                  <c:v>S04</c:v>
+                </c:pt>
+                <c:pt idx="4">
+                  <c:v>S05</c:v>
+                </c:pt>
+                <c:pt idx="5">
+                  <c:v>S06</c:v>
+                </c:pt>
+                <c:pt idx="6">
+                  <c:v>S07</c:v>
+                </c:pt>
+                <c:pt idx="7">
+                  <c:v>S08</c:v>
+                </c:pt>
+                <c:pt idx="8">
+                  <c:v>S09</c:v>
+                </c:pt>
+                <c:pt idx="9">
+                  <c:v>S10</c:v>
+                </c:pt>
+                <c:pt idx="10">
+                  <c:v>S11</c:v>
+                </c:pt>
+                <c:pt idx="11">
+                  <c:v>S12</c:v>
+                </c:pt>
+                <c:pt idx="12">
+                  <c:v>S13</c:v>
+                </c:pt>
+                <c:pt idx="13">
+                  <c:v>S14</c:v>
+                </c:pt>
+              </c:strCache>
+            </c:strRef>
+          </c:cat>
+          <c:val>
+            <c:numRef>
+              <c:f>Sheet3!$C$2:$C$15</c:f>
+              <c:numCache>
+                <c:formatCode>General</c:formatCode>
+                <c:ptCount val="14"/>
+                <c:pt idx="0">
+                  <c:v>71.111111109999996</c:v>
+                </c:pt>
+                <c:pt idx="1">
+                  <c:v>86</c:v>
+                </c:pt>
+                <c:pt idx="2">
+                  <c:v>72.888888890000004</c:v>
+                </c:pt>
+                <c:pt idx="3">
+                  <c:v>73.111111109999996</c:v>
+                </c:pt>
+                <c:pt idx="4">
+                  <c:v>75.111111109999996</c:v>
+                </c:pt>
+                <c:pt idx="5">
+                  <c:v>65.111111109999996</c:v>
+                </c:pt>
+                <c:pt idx="6">
+                  <c:v>55.111111110000003</c:v>
+                </c:pt>
+                <c:pt idx="7">
+                  <c:v>69.333333330000002</c:v>
+                </c:pt>
+                <c:pt idx="8">
+                  <c:v>58.222222219999999</c:v>
+                </c:pt>
+                <c:pt idx="9">
+                  <c:v>56.888888889999997</c:v>
+                </c:pt>
+                <c:pt idx="10">
+                  <c:v>62.888888889999997</c:v>
+                </c:pt>
+                <c:pt idx="11">
+                  <c:v>52.222222219999999</c:v>
+                </c:pt>
+                <c:pt idx="12">
+                  <c:v>62.444444439999998</c:v>
+                </c:pt>
+                <c:pt idx="13">
+                  <c:v>65.111111109999996</c:v>
+                </c:pt>
+              </c:numCache>
+            </c:numRef>
+          </c:val>
+          <c:extLst>
+            <c:ext xmlns:c16="http://schemas.microsoft.com/office/drawing/2014/chart" uri="{C3380CC4-5D6E-409C-BE32-E72D297353CC}">
+              <c16:uniqueId val="{00000002-1558-4331-B2F0-8A316EEDE3CA}"/>
+            </c:ext>
+          </c:extLst>
+        </c:ser>
+        <c:ser>
+          <c:idx val="2"/>
+          <c:order val="3"/>
+          <c:spPr>
+            <a:solidFill>
+              <a:schemeClr val="accent6"/>
+            </a:solidFill>
+            <a:ln>
+              <a:noFill/>
+            </a:ln>
+            <a:effectLst/>
+          </c:spPr>
+          <c:invertIfNegative val="0"/>
+          <c:cat>
+            <c:strRef>
+              <c:f>Sheet3!$A$2:$A$15</c:f>
+              <c:strCache>
+                <c:ptCount val="14"/>
+                <c:pt idx="0">
+                  <c:v>S01</c:v>
+                </c:pt>
+                <c:pt idx="1">
+                  <c:v>S02</c:v>
+                </c:pt>
+                <c:pt idx="2">
+                  <c:v>S03</c:v>
+                </c:pt>
+                <c:pt idx="3">
+                  <c:v>S04</c:v>
+                </c:pt>
+                <c:pt idx="4">
+                  <c:v>S05</c:v>
+                </c:pt>
+                <c:pt idx="5">
+                  <c:v>S06</c:v>
+                </c:pt>
+                <c:pt idx="6">
+                  <c:v>S07</c:v>
+                </c:pt>
+                <c:pt idx="7">
+                  <c:v>S08</c:v>
+                </c:pt>
+                <c:pt idx="8">
+                  <c:v>S09</c:v>
+                </c:pt>
+                <c:pt idx="9">
+                  <c:v>S10</c:v>
+                </c:pt>
+                <c:pt idx="10">
+                  <c:v>S11</c:v>
+                </c:pt>
+                <c:pt idx="11">
+                  <c:v>S12</c:v>
+                </c:pt>
+                <c:pt idx="12">
+                  <c:v>S13</c:v>
+                </c:pt>
+                <c:pt idx="13">
+                  <c:v>S14</c:v>
+                </c:pt>
+              </c:strCache>
+            </c:strRef>
+          </c:cat>
+          <c:val>
+            <c:numRef>
+              <c:f>Sheet3!$D$2:$D$15</c:f>
+              <c:numCache>
+                <c:formatCode>General</c:formatCode>
+                <c:ptCount val="14"/>
+                <c:pt idx="0">
+                  <c:v>66.888888890000004</c:v>
+                </c:pt>
+                <c:pt idx="1">
+                  <c:v>69.111111109999996</c:v>
+                </c:pt>
+                <c:pt idx="2">
+                  <c:v>73.333333330000002</c:v>
+                </c:pt>
+                <c:pt idx="3">
+                  <c:v>62.666666669999998</c:v>
+                </c:pt>
+                <c:pt idx="4">
+                  <c:v>68.666666669999998</c:v>
+                </c:pt>
+                <c:pt idx="5">
+                  <c:v>62.222222219999999</c:v>
+                </c:pt>
+                <c:pt idx="6">
+                  <c:v>46</c:v>
+                </c:pt>
+                <c:pt idx="7">
+                  <c:v>78</c:v>
+                </c:pt>
+                <c:pt idx="8">
+                  <c:v>56</c:v>
+                </c:pt>
+                <c:pt idx="9">
+                  <c:v>56.444444439999998</c:v>
+                </c:pt>
+                <c:pt idx="10">
+                  <c:v>67.111111109999996</c:v>
+                </c:pt>
+                <c:pt idx="11">
+                  <c:v>69.111111109999996</c:v>
+                </c:pt>
+                <c:pt idx="12">
+                  <c:v>68.888888890000004</c:v>
+                </c:pt>
+                <c:pt idx="13">
+                  <c:v>52.444444439999998</c:v>
+                </c:pt>
+              </c:numCache>
+            </c:numRef>
+          </c:val>
+          <c:extLst>
+            <c:ext xmlns:c16="http://schemas.microsoft.com/office/drawing/2014/chart" uri="{C3380CC4-5D6E-409C-BE32-E72D297353CC}">
+              <c16:uniqueId val="{00000003-1558-4331-B2F0-8A316EEDE3CA}"/>
+            </c:ext>
+          </c:extLst>
+        </c:ser>
+        <c:ser>
+          <c:idx val="3"/>
+          <c:order val="4"/>
+          <c:spPr>
+            <a:solidFill>
+              <a:schemeClr val="accent2">
+                <a:lumMod val="60000"/>
+              </a:schemeClr>
+            </a:solidFill>
+            <a:ln>
+              <a:noFill/>
+            </a:ln>
+            <a:effectLst/>
+          </c:spPr>
+          <c:invertIfNegative val="0"/>
+          <c:cat>
+            <c:strRef>
+              <c:f>Sheet3!$A$2:$A$15</c:f>
+              <c:strCache>
+                <c:ptCount val="14"/>
+                <c:pt idx="0">
+                  <c:v>S01</c:v>
+                </c:pt>
+                <c:pt idx="1">
+                  <c:v>S02</c:v>
+                </c:pt>
+                <c:pt idx="2">
+                  <c:v>S03</c:v>
+                </c:pt>
+                <c:pt idx="3">
+                  <c:v>S04</c:v>
+                </c:pt>
+                <c:pt idx="4">
+                  <c:v>S05</c:v>
+                </c:pt>
+                <c:pt idx="5">
+                  <c:v>S06</c:v>
+                </c:pt>
+                <c:pt idx="6">
+                  <c:v>S07</c:v>
+                </c:pt>
+                <c:pt idx="7">
+                  <c:v>S08</c:v>
+                </c:pt>
+                <c:pt idx="8">
+                  <c:v>S09</c:v>
+                </c:pt>
+                <c:pt idx="9">
+                  <c:v>S10</c:v>
+                </c:pt>
+                <c:pt idx="10">
+                  <c:v>S11</c:v>
+                </c:pt>
+                <c:pt idx="11">
+                  <c:v>S12</c:v>
+                </c:pt>
+                <c:pt idx="12">
+                  <c:v>S13</c:v>
+                </c:pt>
+                <c:pt idx="13">
+                  <c:v>S14</c:v>
+                </c:pt>
+              </c:strCache>
+            </c:strRef>
+          </c:cat>
+          <c:val>
+            <c:numRef>
+              <c:f>Sheet3!$E$2:$E$15</c:f>
+              <c:numCache>
+                <c:formatCode>General</c:formatCode>
+                <c:ptCount val="14"/>
+                <c:pt idx="0">
+                  <c:v>56</c:v>
+                </c:pt>
+                <c:pt idx="1">
+                  <c:v>67.333333330000002</c:v>
+                </c:pt>
+                <c:pt idx="2">
+                  <c:v>79.111111109999996</c:v>
+                </c:pt>
+                <c:pt idx="3">
+                  <c:v>74.888888890000004</c:v>
+                </c:pt>
+                <c:pt idx="4">
+                  <c:v>73.555555560000002</c:v>
+                </c:pt>
+                <c:pt idx="5">
+                  <c:v>79.555555560000002</c:v>
+                </c:pt>
+                <c:pt idx="6">
+                  <c:v>54.222222219999999</c:v>
+                </c:pt>
+                <c:pt idx="7">
+                  <c:v>75.333333330000002</c:v>
+                </c:pt>
+                <c:pt idx="8">
+                  <c:v>56.222222219999999</c:v>
+                </c:pt>
+                <c:pt idx="9">
+                  <c:v>58.222222219999999</c:v>
+                </c:pt>
+                <c:pt idx="10">
+                  <c:v>54.888888889999997</c:v>
+                </c:pt>
+                <c:pt idx="11">
+                  <c:v>70.666666669999998</c:v>
+                </c:pt>
+                <c:pt idx="12">
+                  <c:v>48.222222219999999</c:v>
+                </c:pt>
+                <c:pt idx="13">
+                  <c:v>75.555555560000002</c:v>
+                </c:pt>
+              </c:numCache>
+            </c:numRef>
+          </c:val>
+          <c:extLst>
+            <c:ext xmlns:c16="http://schemas.microsoft.com/office/drawing/2014/chart" uri="{C3380CC4-5D6E-409C-BE32-E72D297353CC}">
+              <c16:uniqueId val="{00000004-1558-4331-B2F0-8A316EEDE3CA}"/>
+            </c:ext>
+          </c:extLst>
+        </c:ser>
+        <c:dLbls>
+          <c:showLegendKey val="0"/>
+          <c:showVal val="0"/>
+          <c:showCatName val="0"/>
+          <c:showSerName val="0"/>
+          <c:showPercent val="0"/>
+          <c:showBubbleSize val="0"/>
+        </c:dLbls>
+        <c:gapWidth val="219"/>
+        <c:overlap val="-27"/>
+        <c:axId val="621809023"/>
+        <c:axId val="621809503"/>
+      </c:barChart>
+      <c:catAx>
+        <c:axId val="621809023"/>
+        <c:scaling>
+          <c:orientation val="minMax"/>
+        </c:scaling>
+        <c:delete val="0"/>
+        <c:axPos val="b"/>
+        <c:numFmt formatCode="General" sourceLinked="1"/>
+        <c:majorTickMark val="none"/>
+        <c:minorTickMark val="none"/>
+        <c:tickLblPos val="nextTo"/>
+        <c:spPr>
+          <a:noFill/>
+          <a:ln w="9525" cap="flat" cmpd="sng" algn="ctr">
+            <a:solidFill>
+              <a:schemeClr val="tx1">
+                <a:lumMod val="15000"/>
+                <a:lumOff val="85000"/>
+              </a:schemeClr>
+            </a:solidFill>
+            <a:round/>
+          </a:ln>
+          <a:effectLst/>
+        </c:spPr>
+        <c:txPr>
+          <a:bodyPr rot="-60000000" spcFirstLastPara="1" vertOverflow="ellipsis" vert="horz" wrap="square" anchor="ctr" anchorCtr="1"/>
+          <a:lstStyle/>
+          <a:p>
+            <a:pPr>
+              <a:defRPr sz="1400" b="0" i="0" u="none" strike="noStrike" kern="1200" baseline="0">
+                <a:solidFill>
+                  <a:schemeClr val="tx1"/>
+                </a:solidFill>
+                <a:latin typeface="Times New Roman" panose="02020603050405020304" pitchFamily="18" charset="0"/>
+                <a:ea typeface="+mn-ea"/>
+                <a:cs typeface="Times New Roman" panose="02020603050405020304" pitchFamily="18" charset="0"/>
+              </a:defRPr>
+            </a:pPr>
+            <a:endParaRPr lang="en-US"/>
+          </a:p>
+        </c:txPr>
+        <c:crossAx val="621809503"/>
+        <c:crosses val="autoZero"/>
+        <c:auto val="1"/>
+        <c:lblAlgn val="ctr"/>
+        <c:lblOffset val="100"/>
+        <c:noMultiLvlLbl val="0"/>
+      </c:catAx>
+      <c:valAx>
+        <c:axId val="621809503"/>
+        <c:scaling>
+          <c:orientation val="minMax"/>
+        </c:scaling>
+        <c:delete val="0"/>
+        <c:axPos val="l"/>
+        <c:majorGridlines>
+          <c:spPr>
+            <a:ln w="9525" cap="flat" cmpd="sng" algn="ctr">
+              <a:solidFill>
+                <a:schemeClr val="tx1">
+                  <a:lumMod val="15000"/>
+                  <a:lumOff val="85000"/>
+                </a:schemeClr>
+              </a:solidFill>
+              <a:round/>
+            </a:ln>
+            <a:effectLst/>
+          </c:spPr>
+        </c:majorGridlines>
+        <c:numFmt formatCode="0.00" sourceLinked="1"/>
+        <c:majorTickMark val="none"/>
+        <c:minorTickMark val="none"/>
+        <c:tickLblPos val="nextTo"/>
+        <c:spPr>
+          <a:noFill/>
+          <a:ln>
+            <a:noFill/>
+          </a:ln>
+          <a:effectLst/>
+        </c:spPr>
+        <c:txPr>
+          <a:bodyPr rot="-60000000" spcFirstLastPara="1" vertOverflow="ellipsis" vert="horz" wrap="square" anchor="ctr" anchorCtr="1"/>
+          <a:lstStyle/>
+          <a:p>
+            <a:pPr>
+              <a:defRPr sz="1400" b="0" i="0" u="none" strike="noStrike" kern="1200" baseline="0">
+                <a:solidFill>
+                  <a:schemeClr val="tx1"/>
+                </a:solidFill>
+                <a:latin typeface="Times New Roman" panose="02020603050405020304" pitchFamily="18" charset="0"/>
+                <a:ea typeface="+mn-ea"/>
+                <a:cs typeface="Times New Roman" panose="02020603050405020304" pitchFamily="18" charset="0"/>
+              </a:defRPr>
+            </a:pPr>
+            <a:endParaRPr lang="en-US"/>
+          </a:p>
+        </c:txPr>
+        <c:crossAx val="621809023"/>
+        <c:crosses val="autoZero"/>
+        <c:crossBetween val="between"/>
+      </c:valAx>
+      <c:spPr>
+        <a:noFill/>
+        <a:ln>
+          <a:noFill/>
+        </a:ln>
+        <a:effectLst/>
+      </c:spPr>
+    </c:plotArea>
+    <c:plotVisOnly val="1"/>
+    <c:dispBlanksAs val="gap"/>
+    <c:extLst>
+      <c:ext xmlns:c16r3="http://schemas.microsoft.com/office/drawing/2017/03/chart" uri="{56B9EC1D-385E-4148-901F-78D8002777C0}">
+        <c16r3:dataDisplayOptions16>
+          <c16r3:dispNaAsBlank val="1"/>
+        </c16r3:dataDisplayOptions16>
+      </c:ext>
+    </c:extLst>
+    <c:showDLblsOverMax val="0"/>
+  </c:chart>
+  <c:spPr>
+    <a:noFill/>
+    <a:ln>
+      <a:noFill/>
+    </a:ln>
+    <a:effectLst/>
+  </c:spPr>
+  <c:txPr>
+    <a:bodyPr/>
+    <a:lstStyle/>
+    <a:p>
+      <a:pPr>
+        <a:defRPr/>
+      </a:pPr>
+      <a:endParaRPr lang="en-US"/>
+    </a:p>
+  </c:txPr>
+  <c:externalData r:id="rId3">
+    <c:autoUpdate val="0"/>
+  </c:externalData>
+</c:chartSpace>
+</file>
+
 <file path=ppt/charts/colors1.xml><?xml version="1.0" encoding="utf-8"?>
 <cs:colorStyle xmlns:cs="http://schemas.microsoft.com/office/drawing/2012/chartStyle" xmlns:a="http://schemas.openxmlformats.org/drawingml/2006/main" meth="cycle" id="12">
   <a:schemeClr val="accent2"/>
@@ -875,7 +1668,547 @@
 </cs:colorStyle>
 </file>
 
+<file path=ppt/charts/colors2.xml><?xml version="1.0" encoding="utf-8"?>
+<cs:colorStyle xmlns:cs="http://schemas.microsoft.com/office/drawing/2012/chartStyle" xmlns:a="http://schemas.openxmlformats.org/drawingml/2006/main" meth="cycle" id="12">
+  <a:schemeClr val="accent2"/>
+  <a:schemeClr val="accent4"/>
+  <a:schemeClr val="accent6"/>
+  <cs:variation/>
+  <cs:variation>
+    <a:lumMod val="60000"/>
+  </cs:variation>
+  <cs:variation>
+    <a:lumMod val="80000"/>
+    <a:lumOff val="20000"/>
+  </cs:variation>
+  <cs:variation>
+    <a:lumMod val="80000"/>
+  </cs:variation>
+  <cs:variation>
+    <a:lumMod val="60000"/>
+    <a:lumOff val="40000"/>
+  </cs:variation>
+  <cs:variation>
+    <a:lumMod val="50000"/>
+  </cs:variation>
+  <cs:variation>
+    <a:lumMod val="70000"/>
+    <a:lumOff val="30000"/>
+  </cs:variation>
+  <cs:variation>
+    <a:lumMod val="70000"/>
+  </cs:variation>
+  <cs:variation>
+    <a:lumMod val="50000"/>
+    <a:lumOff val="50000"/>
+  </cs:variation>
+</cs:colorStyle>
+</file>
+
 <file path=ppt/charts/style1.xml><?xml version="1.0" encoding="utf-8"?>
+<cs:chartStyle xmlns:cs="http://schemas.microsoft.com/office/drawing/2012/chartStyle" xmlns:a="http://schemas.openxmlformats.org/drawingml/2006/main" id="201">
+  <cs:axisTitle>
+    <cs:lnRef idx="0"/>
+    <cs:fillRef idx="0"/>
+    <cs:effectRef idx="0"/>
+    <cs:fontRef idx="minor">
+      <a:schemeClr val="tx1">
+        <a:lumMod val="65000"/>
+        <a:lumOff val="35000"/>
+      </a:schemeClr>
+    </cs:fontRef>
+    <cs:defRPr sz="1000" kern="1200"/>
+  </cs:axisTitle>
+  <cs:categoryAxis>
+    <cs:lnRef idx="0"/>
+    <cs:fillRef idx="0"/>
+    <cs:effectRef idx="0"/>
+    <cs:fontRef idx="minor">
+      <a:schemeClr val="tx1">
+        <a:lumMod val="65000"/>
+        <a:lumOff val="35000"/>
+      </a:schemeClr>
+    </cs:fontRef>
+    <cs:spPr>
+      <a:ln w="9525" cap="flat" cmpd="sng" algn="ctr">
+        <a:solidFill>
+          <a:schemeClr val="tx1">
+            <a:lumMod val="15000"/>
+            <a:lumOff val="85000"/>
+          </a:schemeClr>
+        </a:solidFill>
+        <a:round/>
+      </a:ln>
+    </cs:spPr>
+    <cs:defRPr sz="900" kern="1200"/>
+  </cs:categoryAxis>
+  <cs:chartArea mods="allowNoFillOverride allowNoLineOverride">
+    <cs:lnRef idx="0"/>
+    <cs:fillRef idx="0"/>
+    <cs:effectRef idx="0"/>
+    <cs:fontRef idx="minor">
+      <a:schemeClr val="tx1"/>
+    </cs:fontRef>
+    <cs:spPr>
+      <a:solidFill>
+        <a:schemeClr val="bg1"/>
+      </a:solidFill>
+      <a:ln w="9525" cap="flat" cmpd="sng" algn="ctr">
+        <a:solidFill>
+          <a:schemeClr val="tx1">
+            <a:lumMod val="15000"/>
+            <a:lumOff val="85000"/>
+          </a:schemeClr>
+        </a:solidFill>
+        <a:round/>
+      </a:ln>
+    </cs:spPr>
+    <cs:defRPr sz="1000" kern="1200"/>
+  </cs:chartArea>
+  <cs:dataLabel>
+    <cs:lnRef idx="0"/>
+    <cs:fillRef idx="0"/>
+    <cs:effectRef idx="0"/>
+    <cs:fontRef idx="minor">
+      <a:schemeClr val="tx1">
+        <a:lumMod val="75000"/>
+        <a:lumOff val="25000"/>
+      </a:schemeClr>
+    </cs:fontRef>
+    <cs:defRPr sz="900" kern="1200"/>
+  </cs:dataLabel>
+  <cs:dataLabelCallout>
+    <cs:lnRef idx="0"/>
+    <cs:fillRef idx="0"/>
+    <cs:effectRef idx="0"/>
+    <cs:fontRef idx="minor">
+      <a:schemeClr val="dk1">
+        <a:lumMod val="65000"/>
+        <a:lumOff val="35000"/>
+      </a:schemeClr>
+    </cs:fontRef>
+    <cs:spPr>
+      <a:solidFill>
+        <a:schemeClr val="lt1"/>
+      </a:solidFill>
+      <a:ln>
+        <a:solidFill>
+          <a:schemeClr val="dk1">
+            <a:lumMod val="25000"/>
+            <a:lumOff val="75000"/>
+          </a:schemeClr>
+        </a:solidFill>
+      </a:ln>
+    </cs:spPr>
+    <cs:defRPr sz="900" kern="1200"/>
+    <cs:bodyPr rot="0" spcFirstLastPara="1" vertOverflow="clip" horzOverflow="clip" vert="horz" wrap="square" lIns="36576" tIns="18288" rIns="36576" bIns="18288" anchor="ctr" anchorCtr="1">
+      <a:spAutoFit/>
+    </cs:bodyPr>
+  </cs:dataLabelCallout>
+  <cs:dataPoint>
+    <cs:lnRef idx="0"/>
+    <cs:fillRef idx="1">
+      <cs:styleClr val="auto"/>
+    </cs:fillRef>
+    <cs:effectRef idx="0"/>
+    <cs:fontRef idx="minor">
+      <a:schemeClr val="tx1"/>
+    </cs:fontRef>
+  </cs:dataPoint>
+  <cs:dataPoint3D>
+    <cs:lnRef idx="0"/>
+    <cs:fillRef idx="1">
+      <cs:styleClr val="auto"/>
+    </cs:fillRef>
+    <cs:effectRef idx="0"/>
+    <cs:fontRef idx="minor">
+      <a:schemeClr val="tx1"/>
+    </cs:fontRef>
+  </cs:dataPoint3D>
+  <cs:dataPointLine>
+    <cs:lnRef idx="0">
+      <cs:styleClr val="auto"/>
+    </cs:lnRef>
+    <cs:fillRef idx="1"/>
+    <cs:effectRef idx="0"/>
+    <cs:fontRef idx="minor">
+      <a:schemeClr val="tx1"/>
+    </cs:fontRef>
+    <cs:spPr>
+      <a:ln w="28575" cap="rnd">
+        <a:solidFill>
+          <a:schemeClr val="phClr"/>
+        </a:solidFill>
+        <a:round/>
+      </a:ln>
+    </cs:spPr>
+  </cs:dataPointLine>
+  <cs:dataPointMarker>
+    <cs:lnRef idx="0">
+      <cs:styleClr val="auto"/>
+    </cs:lnRef>
+    <cs:fillRef idx="1">
+      <cs:styleClr val="auto"/>
+    </cs:fillRef>
+    <cs:effectRef idx="0"/>
+    <cs:fontRef idx="minor">
+      <a:schemeClr val="tx1"/>
+    </cs:fontRef>
+    <cs:spPr>
+      <a:ln w="9525">
+        <a:solidFill>
+          <a:schemeClr val="phClr"/>
+        </a:solidFill>
+      </a:ln>
+    </cs:spPr>
+  </cs:dataPointMarker>
+  <cs:dataPointMarkerLayout symbol="circle" size="5"/>
+  <cs:dataPointWireframe>
+    <cs:lnRef idx="0">
+      <cs:styleClr val="auto"/>
+    </cs:lnRef>
+    <cs:fillRef idx="1"/>
+    <cs:effectRef idx="0"/>
+    <cs:fontRef idx="minor">
+      <a:schemeClr val="tx1"/>
+    </cs:fontRef>
+    <cs:spPr>
+      <a:ln w="9525" cap="rnd">
+        <a:solidFill>
+          <a:schemeClr val="phClr"/>
+        </a:solidFill>
+        <a:round/>
+      </a:ln>
+    </cs:spPr>
+  </cs:dataPointWireframe>
+  <cs:dataTable>
+    <cs:lnRef idx="0"/>
+    <cs:fillRef idx="0"/>
+    <cs:effectRef idx="0"/>
+    <cs:fontRef idx="minor">
+      <a:schemeClr val="tx1">
+        <a:lumMod val="65000"/>
+        <a:lumOff val="35000"/>
+      </a:schemeClr>
+    </cs:fontRef>
+    <cs:spPr>
+      <a:noFill/>
+      <a:ln w="9525" cap="flat" cmpd="sng" algn="ctr">
+        <a:solidFill>
+          <a:schemeClr val="tx1">
+            <a:lumMod val="15000"/>
+            <a:lumOff val="85000"/>
+          </a:schemeClr>
+        </a:solidFill>
+        <a:round/>
+      </a:ln>
+    </cs:spPr>
+    <cs:defRPr sz="900" kern="1200"/>
+  </cs:dataTable>
+  <cs:downBar>
+    <cs:lnRef idx="0"/>
+    <cs:fillRef idx="0"/>
+    <cs:effectRef idx="0"/>
+    <cs:fontRef idx="minor">
+      <a:schemeClr val="dk1"/>
+    </cs:fontRef>
+    <cs:spPr>
+      <a:solidFill>
+        <a:schemeClr val="dk1">
+          <a:lumMod val="65000"/>
+          <a:lumOff val="35000"/>
+        </a:schemeClr>
+      </a:solidFill>
+      <a:ln w="9525">
+        <a:solidFill>
+          <a:schemeClr val="tx1">
+            <a:lumMod val="65000"/>
+            <a:lumOff val="35000"/>
+          </a:schemeClr>
+        </a:solidFill>
+      </a:ln>
+    </cs:spPr>
+  </cs:downBar>
+  <cs:dropLine>
+    <cs:lnRef idx="0"/>
+    <cs:fillRef idx="0"/>
+    <cs:effectRef idx="0"/>
+    <cs:fontRef idx="minor">
+      <a:schemeClr val="tx1"/>
+    </cs:fontRef>
+    <cs:spPr>
+      <a:ln w="9525" cap="flat" cmpd="sng" algn="ctr">
+        <a:solidFill>
+          <a:schemeClr val="tx1">
+            <a:lumMod val="35000"/>
+            <a:lumOff val="65000"/>
+          </a:schemeClr>
+        </a:solidFill>
+        <a:round/>
+      </a:ln>
+    </cs:spPr>
+  </cs:dropLine>
+  <cs:errorBar>
+    <cs:lnRef idx="0"/>
+    <cs:fillRef idx="0"/>
+    <cs:effectRef idx="0"/>
+    <cs:fontRef idx="minor">
+      <a:schemeClr val="tx1"/>
+    </cs:fontRef>
+    <cs:spPr>
+      <a:ln w="9525" cap="flat" cmpd="sng" algn="ctr">
+        <a:solidFill>
+          <a:schemeClr val="tx1">
+            <a:lumMod val="65000"/>
+            <a:lumOff val="35000"/>
+          </a:schemeClr>
+        </a:solidFill>
+        <a:round/>
+      </a:ln>
+    </cs:spPr>
+  </cs:errorBar>
+  <cs:floor>
+    <cs:lnRef idx="0"/>
+    <cs:fillRef idx="0"/>
+    <cs:effectRef idx="0"/>
+    <cs:fontRef idx="minor">
+      <a:schemeClr val="tx1"/>
+    </cs:fontRef>
+    <cs:spPr>
+      <a:noFill/>
+      <a:ln>
+        <a:noFill/>
+      </a:ln>
+    </cs:spPr>
+  </cs:floor>
+  <cs:gridlineMajor>
+    <cs:lnRef idx="0"/>
+    <cs:fillRef idx="0"/>
+    <cs:effectRef idx="0"/>
+    <cs:fontRef idx="minor">
+      <a:schemeClr val="tx1"/>
+    </cs:fontRef>
+    <cs:spPr>
+      <a:ln w="9525" cap="flat" cmpd="sng" algn="ctr">
+        <a:solidFill>
+          <a:schemeClr val="tx1">
+            <a:lumMod val="15000"/>
+            <a:lumOff val="85000"/>
+          </a:schemeClr>
+        </a:solidFill>
+        <a:round/>
+      </a:ln>
+    </cs:spPr>
+  </cs:gridlineMajor>
+  <cs:gridlineMinor>
+    <cs:lnRef idx="0"/>
+    <cs:fillRef idx="0"/>
+    <cs:effectRef idx="0"/>
+    <cs:fontRef idx="minor">
+      <a:schemeClr val="tx1"/>
+    </cs:fontRef>
+    <cs:spPr>
+      <a:ln w="9525" cap="flat" cmpd="sng" algn="ctr">
+        <a:solidFill>
+          <a:schemeClr val="tx1">
+            <a:lumMod val="5000"/>
+            <a:lumOff val="95000"/>
+          </a:schemeClr>
+        </a:solidFill>
+        <a:round/>
+      </a:ln>
+    </cs:spPr>
+  </cs:gridlineMinor>
+  <cs:hiLoLine>
+    <cs:lnRef idx="0"/>
+    <cs:fillRef idx="0"/>
+    <cs:effectRef idx="0"/>
+    <cs:fontRef idx="minor">
+      <a:schemeClr val="tx1"/>
+    </cs:fontRef>
+    <cs:spPr>
+      <a:ln w="9525" cap="flat" cmpd="sng" algn="ctr">
+        <a:solidFill>
+          <a:schemeClr val="tx1">
+            <a:lumMod val="75000"/>
+            <a:lumOff val="25000"/>
+          </a:schemeClr>
+        </a:solidFill>
+        <a:round/>
+      </a:ln>
+    </cs:spPr>
+  </cs:hiLoLine>
+  <cs:leaderLine>
+    <cs:lnRef idx="0"/>
+    <cs:fillRef idx="0"/>
+    <cs:effectRef idx="0"/>
+    <cs:fontRef idx="minor">
+      <a:schemeClr val="tx1"/>
+    </cs:fontRef>
+    <cs:spPr>
+      <a:ln w="9525" cap="flat" cmpd="sng" algn="ctr">
+        <a:solidFill>
+          <a:schemeClr val="tx1">
+            <a:lumMod val="35000"/>
+            <a:lumOff val="65000"/>
+          </a:schemeClr>
+        </a:solidFill>
+        <a:round/>
+      </a:ln>
+    </cs:spPr>
+  </cs:leaderLine>
+  <cs:legend>
+    <cs:lnRef idx="0"/>
+    <cs:fillRef idx="0"/>
+    <cs:effectRef idx="0"/>
+    <cs:fontRef idx="minor">
+      <a:schemeClr val="tx1">
+        <a:lumMod val="65000"/>
+        <a:lumOff val="35000"/>
+      </a:schemeClr>
+    </cs:fontRef>
+    <cs:defRPr sz="900" kern="1200"/>
+  </cs:legend>
+  <cs:plotArea mods="allowNoFillOverride allowNoLineOverride">
+    <cs:lnRef idx="0"/>
+    <cs:fillRef idx="0"/>
+    <cs:effectRef idx="0"/>
+    <cs:fontRef idx="minor">
+      <a:schemeClr val="tx1"/>
+    </cs:fontRef>
+  </cs:plotArea>
+  <cs:plotArea3D mods="allowNoFillOverride allowNoLineOverride">
+    <cs:lnRef idx="0"/>
+    <cs:fillRef idx="0"/>
+    <cs:effectRef idx="0"/>
+    <cs:fontRef idx="minor">
+      <a:schemeClr val="tx1"/>
+    </cs:fontRef>
+  </cs:plotArea3D>
+  <cs:seriesAxis>
+    <cs:lnRef idx="0"/>
+    <cs:fillRef idx="0"/>
+    <cs:effectRef idx="0"/>
+    <cs:fontRef idx="minor">
+      <a:schemeClr val="tx1">
+        <a:lumMod val="65000"/>
+        <a:lumOff val="35000"/>
+      </a:schemeClr>
+    </cs:fontRef>
+    <cs:defRPr sz="900" kern="1200"/>
+  </cs:seriesAxis>
+  <cs:seriesLine>
+    <cs:lnRef idx="0"/>
+    <cs:fillRef idx="0"/>
+    <cs:effectRef idx="0"/>
+    <cs:fontRef idx="minor">
+      <a:schemeClr val="tx1"/>
+    </cs:fontRef>
+    <cs:spPr>
+      <a:ln w="9525" cap="flat" cmpd="sng" algn="ctr">
+        <a:solidFill>
+          <a:schemeClr val="tx1">
+            <a:lumMod val="35000"/>
+            <a:lumOff val="65000"/>
+          </a:schemeClr>
+        </a:solidFill>
+        <a:round/>
+      </a:ln>
+    </cs:spPr>
+  </cs:seriesLine>
+  <cs:title>
+    <cs:lnRef idx="0"/>
+    <cs:fillRef idx="0"/>
+    <cs:effectRef idx="0"/>
+    <cs:fontRef idx="minor">
+      <a:schemeClr val="tx1">
+        <a:lumMod val="65000"/>
+        <a:lumOff val="35000"/>
+      </a:schemeClr>
+    </cs:fontRef>
+    <cs:defRPr sz="1400" b="0" kern="1200" spc="0" baseline="0"/>
+  </cs:title>
+  <cs:trendline>
+    <cs:lnRef idx="0">
+      <cs:styleClr val="auto"/>
+    </cs:lnRef>
+    <cs:fillRef idx="0"/>
+    <cs:effectRef idx="0"/>
+    <cs:fontRef idx="minor">
+      <a:schemeClr val="tx1"/>
+    </cs:fontRef>
+    <cs:spPr>
+      <a:ln w="19050" cap="rnd">
+        <a:solidFill>
+          <a:schemeClr val="phClr"/>
+        </a:solidFill>
+        <a:prstDash val="sysDot"/>
+      </a:ln>
+    </cs:spPr>
+  </cs:trendline>
+  <cs:trendlineLabel>
+    <cs:lnRef idx="0"/>
+    <cs:fillRef idx="0"/>
+    <cs:effectRef idx="0"/>
+    <cs:fontRef idx="minor">
+      <a:schemeClr val="tx1">
+        <a:lumMod val="65000"/>
+        <a:lumOff val="35000"/>
+      </a:schemeClr>
+    </cs:fontRef>
+    <cs:defRPr sz="900" kern="1200"/>
+  </cs:trendlineLabel>
+  <cs:upBar>
+    <cs:lnRef idx="0"/>
+    <cs:fillRef idx="0"/>
+    <cs:effectRef idx="0"/>
+    <cs:fontRef idx="minor">
+      <a:schemeClr val="dk1"/>
+    </cs:fontRef>
+    <cs:spPr>
+      <a:solidFill>
+        <a:schemeClr val="lt1"/>
+      </a:solidFill>
+      <a:ln w="9525">
+        <a:solidFill>
+          <a:schemeClr val="tx1">
+            <a:lumMod val="15000"/>
+            <a:lumOff val="85000"/>
+          </a:schemeClr>
+        </a:solidFill>
+      </a:ln>
+    </cs:spPr>
+  </cs:upBar>
+  <cs:valueAxis>
+    <cs:lnRef idx="0"/>
+    <cs:fillRef idx="0"/>
+    <cs:effectRef idx="0"/>
+    <cs:fontRef idx="minor">
+      <a:schemeClr val="tx1">
+        <a:lumMod val="65000"/>
+        <a:lumOff val="35000"/>
+      </a:schemeClr>
+    </cs:fontRef>
+    <cs:defRPr sz="900" kern="1200"/>
+  </cs:valueAxis>
+  <cs:wall>
+    <cs:lnRef idx="0"/>
+    <cs:fillRef idx="0"/>
+    <cs:effectRef idx="0"/>
+    <cs:fontRef idx="minor">
+      <a:schemeClr val="tx1"/>
+    </cs:fontRef>
+    <cs:spPr>
+      <a:noFill/>
+      <a:ln>
+        <a:noFill/>
+      </a:ln>
+    </cs:spPr>
+  </cs:wall>
+</cs:chartStyle>
+</file>
+
+<file path=ppt/charts/style2.xml><?xml version="1.0" encoding="utf-8"?>
 <cs:chartStyle xmlns:cs="http://schemas.microsoft.com/office/drawing/2012/chartStyle" xmlns:a="http://schemas.openxmlformats.org/drawingml/2006/main" id="201">
   <cs:axisTitle>
     <cs:lnRef idx="0"/>
@@ -1460,7 +2793,7 @@
           <a:p>
             <a:fld id="{5C0C6918-E2B4-4C7C-A655-283027A7DE9F}" type="datetimeFigureOut">
               <a:rPr lang="en-SG" smtClean="0"/>
-              <a:t>1/2/2025</a:t>
+              <a:t>10/4/2025</a:t>
             </a:fld>
             <a:endParaRPr lang="en-SG"/>
           </a:p>
@@ -1812,6 +3145,90 @@
 </p:notes>
 </file>
 
+<file path=ppt/notesSlides/notesSlide2.xml><?xml version="1.0" encoding="utf-8"?>
+<p:notes xmlns:a="http://schemas.openxmlformats.org/drawingml/2006/main" xmlns:r="http://schemas.openxmlformats.org/officeDocument/2006/relationships" xmlns:p="http://schemas.openxmlformats.org/presentationml/2006/main">
+  <p:cSld>
+    <p:spTree>
+      <p:nvGrpSpPr>
+        <p:cNvPr id="1" name=""/>
+        <p:cNvGrpSpPr/>
+        <p:nvPr/>
+      </p:nvGrpSpPr>
+      <p:grpSpPr>
+        <a:xfrm>
+          <a:off x="0" y="0"/>
+          <a:ext cx="0" cy="0"/>
+          <a:chOff x="0" y="0"/>
+          <a:chExt cx="0" cy="0"/>
+        </a:xfrm>
+      </p:grpSpPr>
+      <p:sp>
+        <p:nvSpPr>
+          <p:cNvPr id="2" name="Slide Image Placeholder 1"/>
+          <p:cNvSpPr>
+            <a:spLocks noGrp="1" noRot="1" noChangeAspect="1"/>
+          </p:cNvSpPr>
+          <p:nvPr>
+            <p:ph type="sldImg"/>
+          </p:nvPr>
+        </p:nvSpPr>
+        <p:spPr/>
+      </p:sp>
+      <p:sp>
+        <p:nvSpPr>
+          <p:cNvPr id="3" name="Notes Placeholder 2"/>
+          <p:cNvSpPr>
+            <a:spLocks noGrp="1"/>
+          </p:cNvSpPr>
+          <p:nvPr>
+            <p:ph type="body" idx="1"/>
+          </p:nvPr>
+        </p:nvSpPr>
+        <p:spPr/>
+        <p:txBody>
+          <a:bodyPr/>
+          <a:lstStyle/>
+          <a:p>
+            <a:endParaRPr lang="en-SG" dirty="0"/>
+          </a:p>
+        </p:txBody>
+      </p:sp>
+      <p:sp>
+        <p:nvSpPr>
+          <p:cNvPr id="4" name="Slide Number Placeholder 3"/>
+          <p:cNvSpPr>
+            <a:spLocks noGrp="1"/>
+          </p:cNvSpPr>
+          <p:nvPr>
+            <p:ph type="sldNum" sz="quarter" idx="5"/>
+          </p:nvPr>
+        </p:nvSpPr>
+        <p:spPr/>
+        <p:txBody>
+          <a:bodyPr/>
+          <a:lstStyle/>
+          <a:p>
+            <a:fld id="{496501BE-4B9D-421A-BB64-B41602BF2DE8}" type="slidenum">
+              <a:rPr lang="en-SG" smtClean="0"/>
+              <a:t>13</a:t>
+            </a:fld>
+            <a:endParaRPr lang="en-SG"/>
+          </a:p>
+        </p:txBody>
+      </p:sp>
+    </p:spTree>
+    <p:extLst>
+      <p:ext uri="{BB962C8B-B14F-4D97-AF65-F5344CB8AC3E}">
+        <p14:creationId xmlns:p14="http://schemas.microsoft.com/office/powerpoint/2010/main" val="545963683"/>
+      </p:ext>
+    </p:extLst>
+  </p:cSld>
+  <p:clrMapOvr>
+    <a:masterClrMapping/>
+  </p:clrMapOvr>
+</p:notes>
+</file>
+
 <file path=ppt/slideLayouts/slideLayout1.xml><?xml version="1.0" encoding="utf-8"?>
 <p:sldLayout xmlns:a="http://schemas.openxmlformats.org/drawingml/2006/main" xmlns:r="http://schemas.openxmlformats.org/officeDocument/2006/relationships" xmlns:p="http://schemas.openxmlformats.org/presentationml/2006/main" type="title" preserve="1">
   <p:cSld name="Title Slide">
@@ -1961,7 +3378,7 @@
           <a:p>
             <a:fld id="{D1981919-E591-40C2-A600-3BE047E44769}" type="datetimeFigureOut">
               <a:rPr lang="en-SG" smtClean="0"/>
-              <a:t>1/2/2025</a:t>
+              <a:t>10/4/2025</a:t>
             </a:fld>
             <a:endParaRPr lang="en-SG"/>
           </a:p>
@@ -2161,7 +3578,7 @@
           <a:p>
             <a:fld id="{D1981919-E591-40C2-A600-3BE047E44769}" type="datetimeFigureOut">
               <a:rPr lang="en-SG" smtClean="0"/>
-              <a:t>1/2/2025</a:t>
+              <a:t>10/4/2025</a:t>
             </a:fld>
             <a:endParaRPr lang="en-SG"/>
           </a:p>
@@ -2371,7 +3788,7 @@
           <a:p>
             <a:fld id="{D1981919-E591-40C2-A600-3BE047E44769}" type="datetimeFigureOut">
               <a:rPr lang="en-SG" smtClean="0"/>
-              <a:t>1/2/2025</a:t>
+              <a:t>10/4/2025</a:t>
             </a:fld>
             <a:endParaRPr lang="en-SG"/>
           </a:p>
@@ -2571,7 +3988,7 @@
           <a:p>
             <a:fld id="{D1981919-E591-40C2-A600-3BE047E44769}" type="datetimeFigureOut">
               <a:rPr lang="en-SG" smtClean="0"/>
-              <a:t>1/2/2025</a:t>
+              <a:t>10/4/2025</a:t>
             </a:fld>
             <a:endParaRPr lang="en-SG"/>
           </a:p>
@@ -2847,7 +4264,7 @@
           <a:p>
             <a:fld id="{D1981919-E591-40C2-A600-3BE047E44769}" type="datetimeFigureOut">
               <a:rPr lang="en-SG" smtClean="0"/>
-              <a:t>1/2/2025</a:t>
+              <a:t>10/4/2025</a:t>
             </a:fld>
             <a:endParaRPr lang="en-SG"/>
           </a:p>
@@ -3115,7 +4532,7 @@
           <a:p>
             <a:fld id="{D1981919-E591-40C2-A600-3BE047E44769}" type="datetimeFigureOut">
               <a:rPr lang="en-SG" smtClean="0"/>
-              <a:t>1/2/2025</a:t>
+              <a:t>10/4/2025</a:t>
             </a:fld>
             <a:endParaRPr lang="en-SG"/>
           </a:p>
@@ -3530,7 +4947,7 @@
           <a:p>
             <a:fld id="{D1981919-E591-40C2-A600-3BE047E44769}" type="datetimeFigureOut">
               <a:rPr lang="en-SG" smtClean="0"/>
-              <a:t>1/2/2025</a:t>
+              <a:t>10/4/2025</a:t>
             </a:fld>
             <a:endParaRPr lang="en-SG"/>
           </a:p>
@@ -3672,7 +5089,7 @@
           <a:p>
             <a:fld id="{D1981919-E591-40C2-A600-3BE047E44769}" type="datetimeFigureOut">
               <a:rPr lang="en-SG" smtClean="0"/>
-              <a:t>1/2/2025</a:t>
+              <a:t>10/4/2025</a:t>
             </a:fld>
             <a:endParaRPr lang="en-SG"/>
           </a:p>
@@ -3785,7 +5202,7 @@
           <a:p>
             <a:fld id="{D1981919-E591-40C2-A600-3BE047E44769}" type="datetimeFigureOut">
               <a:rPr lang="en-SG" smtClean="0"/>
-              <a:t>1/2/2025</a:t>
+              <a:t>10/4/2025</a:t>
             </a:fld>
             <a:endParaRPr lang="en-SG"/>
           </a:p>
@@ -4098,7 +5515,7 @@
           <a:p>
             <a:fld id="{D1981919-E591-40C2-A600-3BE047E44769}" type="datetimeFigureOut">
               <a:rPr lang="en-SG" smtClean="0"/>
-              <a:t>1/2/2025</a:t>
+              <a:t>10/4/2025</a:t>
             </a:fld>
             <a:endParaRPr lang="en-SG"/>
           </a:p>
@@ -4387,7 +5804,7 @@
           <a:p>
             <a:fld id="{D1981919-E591-40C2-A600-3BE047E44769}" type="datetimeFigureOut">
               <a:rPr lang="en-SG" smtClean="0"/>
-              <a:t>1/2/2025</a:t>
+              <a:t>10/4/2025</a:t>
             </a:fld>
             <a:endParaRPr lang="en-SG"/>
           </a:p>
@@ -4630,7 +6047,7 @@
           <a:p>
             <a:fld id="{D1981919-E591-40C2-A600-3BE047E44769}" type="datetimeFigureOut">
               <a:rPr lang="en-SG" smtClean="0"/>
-              <a:t>1/2/2025</a:t>
+              <a:t>10/4/2025</a:t>
             </a:fld>
             <a:endParaRPr lang="en-SG"/>
           </a:p>
@@ -5180,6 +6597,258 @@
           <p:cNvPr id="3" name="Graphic 2">
             <a:extLst>
               <a:ext uri="{FF2B5EF4-FFF2-40B4-BE49-F238E27FC236}">
+                <a16:creationId xmlns:a16="http://schemas.microsoft.com/office/drawing/2014/main" id="{89F2037F-5730-BC34-CFFC-1AB3F8D21508}"/>
+              </a:ext>
+            </a:extLst>
+          </p:cNvPr>
+          <p:cNvPicPr>
+            <a:picLocks noChangeAspect="1"/>
+          </p:cNvPicPr>
+          <p:nvPr/>
+        </p:nvPicPr>
+        <p:blipFill>
+          <a:blip r:embed="rId2">
+            <a:extLst>
+              <a:ext uri="{96DAC541-7B7A-43D3-8B79-37D633B846F1}">
+                <asvg:svgBlip xmlns:asvg="http://schemas.microsoft.com/office/drawing/2016/SVG/main" r:embed="rId3"/>
+              </a:ext>
+            </a:extLst>
+          </a:blip>
+          <a:stretch>
+            <a:fillRect/>
+          </a:stretch>
+        </p:blipFill>
+        <p:spPr>
+          <a:xfrm>
+            <a:off x="318655" y="785560"/>
+            <a:ext cx="5642589" cy="4042047"/>
+          </a:xfrm>
+          <a:prstGeom prst="rect">
+            <a:avLst/>
+          </a:prstGeom>
+        </p:spPr>
+      </p:pic>
+      <p:pic>
+        <p:nvPicPr>
+          <p:cNvPr id="7" name="Graphic 6">
+            <a:extLst>
+              <a:ext uri="{FF2B5EF4-FFF2-40B4-BE49-F238E27FC236}">
+                <a16:creationId xmlns:a16="http://schemas.microsoft.com/office/drawing/2014/main" id="{80239C23-81A9-B837-3BF9-78A2BCB998E9}"/>
+              </a:ext>
+            </a:extLst>
+          </p:cNvPr>
+          <p:cNvPicPr>
+            <a:picLocks noChangeAspect="1"/>
+          </p:cNvPicPr>
+          <p:nvPr/>
+        </p:nvPicPr>
+        <p:blipFill>
+          <a:blip r:embed="rId4">
+            <a:extLst>
+              <a:ext uri="{96DAC541-7B7A-43D3-8B79-37D633B846F1}">
+                <asvg:svgBlip xmlns:asvg="http://schemas.microsoft.com/office/drawing/2016/SVG/main" r:embed="rId5"/>
+              </a:ext>
+            </a:extLst>
+          </a:blip>
+          <a:stretch>
+            <a:fillRect/>
+          </a:stretch>
+        </p:blipFill>
+        <p:spPr>
+          <a:xfrm>
+            <a:off x="6230757" y="785560"/>
+            <a:ext cx="5268516" cy="1983053"/>
+          </a:xfrm>
+          <a:prstGeom prst="rect">
+            <a:avLst/>
+          </a:prstGeom>
+        </p:spPr>
+      </p:pic>
+      <p:pic>
+        <p:nvPicPr>
+          <p:cNvPr id="9" name="Graphic 8">
+            <a:extLst>
+              <a:ext uri="{FF2B5EF4-FFF2-40B4-BE49-F238E27FC236}">
+                <a16:creationId xmlns:a16="http://schemas.microsoft.com/office/drawing/2014/main" id="{EF1EA52C-33F1-F568-E5CA-95EEDFCD7843}"/>
+              </a:ext>
+            </a:extLst>
+          </p:cNvPr>
+          <p:cNvPicPr>
+            <a:picLocks noChangeAspect="1"/>
+          </p:cNvPicPr>
+          <p:nvPr/>
+        </p:nvPicPr>
+        <p:blipFill>
+          <a:blip r:embed="rId6">
+            <a:extLst>
+              <a:ext uri="{96DAC541-7B7A-43D3-8B79-37D633B846F1}">
+                <asvg:svgBlip xmlns:asvg="http://schemas.microsoft.com/office/drawing/2016/SVG/main" r:embed="rId7"/>
+              </a:ext>
+            </a:extLst>
+          </a:blip>
+          <a:stretch>
+            <a:fillRect/>
+          </a:stretch>
+        </p:blipFill>
+        <p:spPr>
+          <a:xfrm>
+            <a:off x="6230756" y="2846869"/>
+            <a:ext cx="5268517" cy="1983054"/>
+          </a:xfrm>
+          <a:prstGeom prst="rect">
+            <a:avLst/>
+          </a:prstGeom>
+        </p:spPr>
+      </p:pic>
+      <p:sp>
+        <p:nvSpPr>
+          <p:cNvPr id="24" name="TextBox 23">
+            <a:extLst>
+              <a:ext uri="{FF2B5EF4-FFF2-40B4-BE49-F238E27FC236}">
+                <a16:creationId xmlns:a16="http://schemas.microsoft.com/office/drawing/2014/main" id="{B7D1CC00-C44E-FCDE-C300-1CC34FE55E12}"/>
+              </a:ext>
+            </a:extLst>
+          </p:cNvPr>
+          <p:cNvSpPr txBox="1"/>
+          <p:nvPr/>
+        </p:nvSpPr>
+        <p:spPr>
+          <a:xfrm>
+            <a:off x="318655" y="846428"/>
+            <a:ext cx="374071" cy="369332"/>
+          </a:xfrm>
+          <a:prstGeom prst="rect">
+            <a:avLst/>
+          </a:prstGeom>
+          <a:noFill/>
+        </p:spPr>
+        <p:txBody>
+          <a:bodyPr wrap="square" rtlCol="0">
+            <a:spAutoFit/>
+          </a:bodyPr>
+          <a:lstStyle/>
+          <a:p>
+            <a:r>
+              <a:rPr lang="en-SG" dirty="0">
+                <a:latin typeface="Times New Roman" panose="02020603050405020304" pitchFamily="18" charset="0"/>
+                <a:cs typeface="Times New Roman" panose="02020603050405020304" pitchFamily="18" charset="0"/>
+              </a:rPr>
+              <a:t>a)</a:t>
+            </a:r>
+          </a:p>
+        </p:txBody>
+      </p:sp>
+      <p:sp>
+        <p:nvSpPr>
+          <p:cNvPr id="25" name="TextBox 24">
+            <a:extLst>
+              <a:ext uri="{FF2B5EF4-FFF2-40B4-BE49-F238E27FC236}">
+                <a16:creationId xmlns:a16="http://schemas.microsoft.com/office/drawing/2014/main" id="{80362C28-9BB5-780C-6E9C-4DC684CDEBF6}"/>
+              </a:ext>
+            </a:extLst>
+          </p:cNvPr>
+          <p:cNvSpPr txBox="1"/>
+          <p:nvPr/>
+        </p:nvSpPr>
+        <p:spPr>
+          <a:xfrm>
+            <a:off x="6087533" y="846428"/>
+            <a:ext cx="381000" cy="369332"/>
+          </a:xfrm>
+          <a:prstGeom prst="rect">
+            <a:avLst/>
+          </a:prstGeom>
+          <a:noFill/>
+        </p:spPr>
+        <p:txBody>
+          <a:bodyPr wrap="square" rtlCol="0">
+            <a:spAutoFit/>
+          </a:bodyPr>
+          <a:lstStyle/>
+          <a:p>
+            <a:r>
+              <a:rPr lang="en-SG" dirty="0">
+                <a:latin typeface="Times New Roman" panose="02020603050405020304" pitchFamily="18" charset="0"/>
+                <a:cs typeface="Times New Roman" panose="02020603050405020304" pitchFamily="18" charset="0"/>
+              </a:rPr>
+              <a:t>b)</a:t>
+            </a:r>
+          </a:p>
+        </p:txBody>
+      </p:sp>
+      <p:sp>
+        <p:nvSpPr>
+          <p:cNvPr id="26" name="TextBox 25">
+            <a:extLst>
+              <a:ext uri="{FF2B5EF4-FFF2-40B4-BE49-F238E27FC236}">
+                <a16:creationId xmlns:a16="http://schemas.microsoft.com/office/drawing/2014/main" id="{CC5E5F31-F427-17C4-7EC3-1D9D548B093D}"/>
+              </a:ext>
+            </a:extLst>
+          </p:cNvPr>
+          <p:cNvSpPr txBox="1"/>
+          <p:nvPr/>
+        </p:nvSpPr>
+        <p:spPr>
+          <a:xfrm>
+            <a:off x="6096000" y="2846869"/>
+            <a:ext cx="506172" cy="369332"/>
+          </a:xfrm>
+          <a:prstGeom prst="rect">
+            <a:avLst/>
+          </a:prstGeom>
+          <a:noFill/>
+        </p:spPr>
+        <p:txBody>
+          <a:bodyPr wrap="square" rtlCol="0">
+            <a:spAutoFit/>
+          </a:bodyPr>
+          <a:lstStyle/>
+          <a:p>
+            <a:r>
+              <a:rPr lang="en-SG" dirty="0">
+                <a:latin typeface="Times New Roman" panose="02020603050405020304" pitchFamily="18" charset="0"/>
+                <a:cs typeface="Times New Roman" panose="02020603050405020304" pitchFamily="18" charset="0"/>
+              </a:rPr>
+              <a:t>c)</a:t>
+            </a:r>
+          </a:p>
+        </p:txBody>
+      </p:sp>
+    </p:spTree>
+    <p:extLst>
+      <p:ext uri="{BB962C8B-B14F-4D97-AF65-F5344CB8AC3E}">
+        <p14:creationId xmlns:p14="http://schemas.microsoft.com/office/powerpoint/2010/main" val="2135828272"/>
+      </p:ext>
+    </p:extLst>
+  </p:cSld>
+  <p:clrMapOvr>
+    <a:masterClrMapping/>
+  </p:clrMapOvr>
+</p:sld>
+</file>
+
+<file path=ppt/slides/slide11.xml><?xml version="1.0" encoding="utf-8"?>
+<p:sld xmlns:a="http://schemas.openxmlformats.org/drawingml/2006/main" xmlns:r="http://schemas.openxmlformats.org/officeDocument/2006/relationships" xmlns:p="http://schemas.openxmlformats.org/presentationml/2006/main">
+  <p:cSld>
+    <p:spTree>
+      <p:nvGrpSpPr>
+        <p:cNvPr id="1" name=""/>
+        <p:cNvGrpSpPr/>
+        <p:nvPr/>
+      </p:nvGrpSpPr>
+      <p:grpSpPr>
+        <a:xfrm>
+          <a:off x="0" y="0"/>
+          <a:ext cx="0" cy="0"/>
+          <a:chOff x="0" y="0"/>
+          <a:chExt cx="0" cy="0"/>
+        </a:xfrm>
+      </p:grpSpPr>
+      <p:pic>
+        <p:nvPicPr>
+          <p:cNvPr id="3" name="Graphic 2">
+            <a:extLst>
+              <a:ext uri="{FF2B5EF4-FFF2-40B4-BE49-F238E27FC236}">
                 <a16:creationId xmlns:a16="http://schemas.microsoft.com/office/drawing/2014/main" id="{F6164927-2780-E762-68B9-A3FD69A3E430}"/>
               </a:ext>
             </a:extLst>
@@ -5224,7 +6893,7 @@
 </p:sld>
 </file>
 
-<file path=ppt/slides/slide11.xml><?xml version="1.0" encoding="utf-8"?>
+<file path=ppt/slides/slide12.xml><?xml version="1.0" encoding="utf-8"?>
 <p:sld xmlns:a="http://schemas.openxmlformats.org/drawingml/2006/main" xmlns:r="http://schemas.openxmlformats.org/officeDocument/2006/relationships" xmlns:p="http://schemas.openxmlformats.org/presentationml/2006/main">
   <p:cSld>
     <p:spTree>
@@ -5275,6 +6944,708 @@
     <p:extLst>
       <p:ext uri="{BB962C8B-B14F-4D97-AF65-F5344CB8AC3E}">
         <p14:creationId xmlns:p14="http://schemas.microsoft.com/office/powerpoint/2010/main" val="2722004088"/>
+      </p:ext>
+    </p:extLst>
+  </p:cSld>
+  <p:clrMapOvr>
+    <a:masterClrMapping/>
+  </p:clrMapOvr>
+</p:sld>
+</file>
+
+<file path=ppt/slides/slide13.xml><?xml version="1.0" encoding="utf-8"?>
+<p:sld xmlns:a="http://schemas.openxmlformats.org/drawingml/2006/main" xmlns:r="http://schemas.openxmlformats.org/officeDocument/2006/relationships" xmlns:p="http://schemas.openxmlformats.org/presentationml/2006/main">
+  <p:cSld>
+    <p:spTree>
+      <p:nvGrpSpPr>
+        <p:cNvPr id="1" name=""/>
+        <p:cNvGrpSpPr/>
+        <p:nvPr/>
+      </p:nvGrpSpPr>
+      <p:grpSpPr>
+        <a:xfrm>
+          <a:off x="0" y="0"/>
+          <a:ext cx="0" cy="0"/>
+          <a:chOff x="0" y="0"/>
+          <a:chExt cx="0" cy="0"/>
+        </a:xfrm>
+      </p:grpSpPr>
+      <p:grpSp>
+        <p:nvGrpSpPr>
+          <p:cNvPr id="26" name="Group 25">
+            <a:extLst>
+              <a:ext uri="{FF2B5EF4-FFF2-40B4-BE49-F238E27FC236}">
+                <a16:creationId xmlns:a16="http://schemas.microsoft.com/office/drawing/2014/main" id="{1163231C-1E69-6ABC-6810-16F40360B6E8}"/>
+              </a:ext>
+            </a:extLst>
+          </p:cNvPr>
+          <p:cNvGrpSpPr/>
+          <p:nvPr/>
+        </p:nvGrpSpPr>
+        <p:grpSpPr>
+          <a:xfrm>
+            <a:off x="191124" y="228599"/>
+            <a:ext cx="11806143" cy="6571624"/>
+            <a:chOff x="191124" y="228599"/>
+            <a:chExt cx="11806143" cy="6571624"/>
+          </a:xfrm>
+        </p:grpSpPr>
+        <p:graphicFrame>
+          <p:nvGraphicFramePr>
+            <p:cNvPr id="2" name="Chart 1">
+              <a:extLst>
+                <a:ext uri="{FF2B5EF4-FFF2-40B4-BE49-F238E27FC236}">
+                  <a16:creationId xmlns:a16="http://schemas.microsoft.com/office/drawing/2014/main" id="{550EC5C9-4553-0737-5F18-2F0E5FF085BF}"/>
+                </a:ext>
+              </a:extLst>
+            </p:cNvPr>
+            <p:cNvGraphicFramePr>
+              <a:graphicFrameLocks/>
+            </p:cNvGraphicFramePr>
+            <p:nvPr>
+              <p:extLst>
+                <p:ext uri="{D42A27DB-BD31-4B8C-83A1-F6EECF244321}">
+                  <p14:modId xmlns:p14="http://schemas.microsoft.com/office/powerpoint/2010/main" val="1864750746"/>
+                </p:ext>
+              </p:extLst>
+            </p:nvPr>
+          </p:nvGraphicFramePr>
+          <p:xfrm>
+            <a:off x="414867" y="228599"/>
+            <a:ext cx="11582400" cy="6366933"/>
+          </p:xfrm>
+          <a:graphic>
+            <a:graphicData uri="http://schemas.openxmlformats.org/drawingml/2006/chart">
+              <c:chart xmlns:c="http://schemas.openxmlformats.org/drawingml/2006/chart" xmlns:r="http://schemas.openxmlformats.org/officeDocument/2006/relationships" r:id="rId3"/>
+            </a:graphicData>
+          </a:graphic>
+        </p:graphicFrame>
+        <p:sp>
+          <p:nvSpPr>
+            <p:cNvPr id="3" name="TextBox 2">
+              <a:extLst>
+                <a:ext uri="{FF2B5EF4-FFF2-40B4-BE49-F238E27FC236}">
+                  <a16:creationId xmlns:a16="http://schemas.microsoft.com/office/drawing/2014/main" id="{62E6C3F7-EF02-6313-2832-C56F5DEBEBF1}"/>
+                </a:ext>
+              </a:extLst>
+            </p:cNvPr>
+            <p:cNvSpPr txBox="1"/>
+            <p:nvPr/>
+          </p:nvSpPr>
+          <p:spPr>
+            <a:xfrm>
+              <a:off x="6028268" y="6492446"/>
+              <a:ext cx="1007534" cy="307777"/>
+            </a:xfrm>
+            <a:prstGeom prst="rect">
+              <a:avLst/>
+            </a:prstGeom>
+            <a:noFill/>
+          </p:spPr>
+          <p:txBody>
+            <a:bodyPr wrap="square" rtlCol="0">
+              <a:spAutoFit/>
+            </a:bodyPr>
+            <a:lstStyle/>
+            <a:p>
+              <a:r>
+                <a:rPr lang="en-SG" sz="1400" dirty="0">
+                  <a:latin typeface="Times New Roman" panose="02020603050405020304" pitchFamily="18" charset="0"/>
+                  <a:cs typeface="Times New Roman" panose="02020603050405020304" pitchFamily="18" charset="0"/>
+                </a:rPr>
+                <a:t>Subject ID</a:t>
+              </a:r>
+            </a:p>
+          </p:txBody>
+        </p:sp>
+        <p:sp>
+          <p:nvSpPr>
+            <p:cNvPr id="4" name="TextBox 3">
+              <a:extLst>
+                <a:ext uri="{FF2B5EF4-FFF2-40B4-BE49-F238E27FC236}">
+                  <a16:creationId xmlns:a16="http://schemas.microsoft.com/office/drawing/2014/main" id="{749509A4-FADC-C6AB-4456-7EB287222E25}"/>
+                </a:ext>
+              </a:extLst>
+            </p:cNvPr>
+            <p:cNvSpPr txBox="1"/>
+            <p:nvPr/>
+          </p:nvSpPr>
+          <p:spPr>
+            <a:xfrm rot="16200000">
+              <a:off x="-1460504" y="2877180"/>
+              <a:ext cx="3611034" cy="307777"/>
+            </a:xfrm>
+            <a:prstGeom prst="rect">
+              <a:avLst/>
+            </a:prstGeom>
+            <a:noFill/>
+          </p:spPr>
+          <p:txBody>
+            <a:bodyPr wrap="square" rtlCol="0">
+              <a:spAutoFit/>
+            </a:bodyPr>
+            <a:lstStyle/>
+            <a:p>
+              <a:r>
+                <a:rPr lang="en-SG" sz="1400" dirty="0">
+                  <a:latin typeface="Times New Roman" panose="02020603050405020304" pitchFamily="18" charset="0"/>
+                  <a:cs typeface="Times New Roman" panose="02020603050405020304" pitchFamily="18" charset="0"/>
+                </a:rPr>
+                <a:t>Cross-Validated Classification Accuracy (%)</a:t>
+              </a:r>
+            </a:p>
+          </p:txBody>
+        </p:sp>
+        <p:sp>
+          <p:nvSpPr>
+            <p:cNvPr id="6" name="Rectangle 5">
+              <a:extLst>
+                <a:ext uri="{FF2B5EF4-FFF2-40B4-BE49-F238E27FC236}">
+                  <a16:creationId xmlns:a16="http://schemas.microsoft.com/office/drawing/2014/main" id="{66B9CE56-AE09-4A5E-9700-7585C78843E0}"/>
+                </a:ext>
+              </a:extLst>
+            </p:cNvPr>
+            <p:cNvSpPr/>
+            <p:nvPr/>
+          </p:nvSpPr>
+          <p:spPr>
+            <a:xfrm>
+              <a:off x="5371478" y="491067"/>
+              <a:ext cx="118533" cy="143933"/>
+            </a:xfrm>
+            <a:prstGeom prst="rect">
+              <a:avLst/>
+            </a:prstGeom>
+            <a:solidFill>
+              <a:schemeClr val="accent2"/>
+            </a:solidFill>
+            <a:ln>
+              <a:noFill/>
+            </a:ln>
+          </p:spPr>
+          <p:style>
+            <a:lnRef idx="2">
+              <a:schemeClr val="accent1">
+                <a:shade val="15000"/>
+              </a:schemeClr>
+            </a:lnRef>
+            <a:fillRef idx="1">
+              <a:schemeClr val="accent1"/>
+            </a:fillRef>
+            <a:effectRef idx="0">
+              <a:schemeClr val="accent1"/>
+            </a:effectRef>
+            <a:fontRef idx="minor">
+              <a:schemeClr val="lt1"/>
+            </a:fontRef>
+          </p:style>
+          <p:txBody>
+            <a:bodyPr rtlCol="0" anchor="ctr"/>
+            <a:lstStyle/>
+            <a:p>
+              <a:pPr algn="ctr"/>
+              <a:endParaRPr lang="en-SG"/>
+            </a:p>
+          </p:txBody>
+        </p:sp>
+        <p:grpSp>
+          <p:nvGrpSpPr>
+            <p:cNvPr id="11" name="Group 10">
+              <a:extLst>
+                <a:ext uri="{FF2B5EF4-FFF2-40B4-BE49-F238E27FC236}">
+                  <a16:creationId xmlns:a16="http://schemas.microsoft.com/office/drawing/2014/main" id="{032D986B-898E-1FE3-8644-EFBC5222CA54}"/>
+                </a:ext>
+              </a:extLst>
+            </p:cNvPr>
+            <p:cNvGrpSpPr/>
+            <p:nvPr/>
+          </p:nvGrpSpPr>
+          <p:grpSpPr>
+            <a:xfrm>
+              <a:off x="4216400" y="424532"/>
+              <a:ext cx="1049868" cy="276999"/>
+              <a:chOff x="4216400" y="424532"/>
+              <a:chExt cx="1049868" cy="276999"/>
+            </a:xfrm>
+          </p:grpSpPr>
+          <p:sp>
+            <p:nvSpPr>
+              <p:cNvPr id="5" name="Rectangle 4">
+                <a:extLst>
+                  <a:ext uri="{FF2B5EF4-FFF2-40B4-BE49-F238E27FC236}">
+                    <a16:creationId xmlns:a16="http://schemas.microsoft.com/office/drawing/2014/main" id="{C3303D3F-AA81-2071-A267-29B88EF83036}"/>
+                  </a:ext>
+                </a:extLst>
+              </p:cNvPr>
+              <p:cNvSpPr/>
+              <p:nvPr/>
+            </p:nvSpPr>
+            <p:spPr>
+              <a:xfrm>
+                <a:off x="4216400" y="491066"/>
+                <a:ext cx="118533" cy="143933"/>
+              </a:xfrm>
+              <a:prstGeom prst="rect">
+                <a:avLst/>
+              </a:prstGeom>
+              <a:solidFill>
+                <a:schemeClr val="accent1">
+                  <a:lumMod val="75000"/>
+                </a:schemeClr>
+              </a:solidFill>
+              <a:ln>
+                <a:noFill/>
+              </a:ln>
+            </p:spPr>
+            <p:style>
+              <a:lnRef idx="2">
+                <a:schemeClr val="accent1">
+                  <a:shade val="15000"/>
+                </a:schemeClr>
+              </a:lnRef>
+              <a:fillRef idx="1">
+                <a:schemeClr val="accent1"/>
+              </a:fillRef>
+              <a:effectRef idx="0">
+                <a:schemeClr val="accent1"/>
+              </a:effectRef>
+              <a:fontRef idx="minor">
+                <a:schemeClr val="lt1"/>
+              </a:fontRef>
+            </p:style>
+            <p:txBody>
+              <a:bodyPr rtlCol="0" anchor="ctr"/>
+              <a:lstStyle/>
+              <a:p>
+                <a:pPr algn="ctr"/>
+                <a:endParaRPr lang="en-SG"/>
+              </a:p>
+            </p:txBody>
+          </p:sp>
+          <p:sp>
+            <p:nvSpPr>
+              <p:cNvPr id="10" name="TextBox 9">
+                <a:extLst>
+                  <a:ext uri="{FF2B5EF4-FFF2-40B4-BE49-F238E27FC236}">
+                    <a16:creationId xmlns:a16="http://schemas.microsoft.com/office/drawing/2014/main" id="{2F05F797-3142-DAA5-B309-C617D4EB4230}"/>
+                  </a:ext>
+                </a:extLst>
+              </p:cNvPr>
+              <p:cNvSpPr txBox="1"/>
+              <p:nvPr/>
+            </p:nvSpPr>
+            <p:spPr>
+              <a:xfrm>
+                <a:off x="4334934" y="424532"/>
+                <a:ext cx="931334" cy="276999"/>
+              </a:xfrm>
+              <a:prstGeom prst="rect">
+                <a:avLst/>
+              </a:prstGeom>
+              <a:noFill/>
+            </p:spPr>
+            <p:txBody>
+              <a:bodyPr wrap="square" rtlCol="0">
+                <a:spAutoFit/>
+              </a:bodyPr>
+              <a:lstStyle/>
+              <a:p>
+                <a:r>
+                  <a:rPr lang="en-SG" sz="1200" dirty="0" err="1">
+                    <a:latin typeface="Times New Roman" panose="02020603050405020304" pitchFamily="18" charset="0"/>
+                    <a:cs typeface="Times New Roman" panose="02020603050405020304" pitchFamily="18" charset="0"/>
+                  </a:rPr>
+                  <a:t>EEGNet</a:t>
+                </a:r>
+                <a:r>
+                  <a:rPr lang="en-SG" sz="1200" dirty="0">
+                    <a:latin typeface="Times New Roman" panose="02020603050405020304" pitchFamily="18" charset="0"/>
+                    <a:cs typeface="Times New Roman" panose="02020603050405020304" pitchFamily="18" charset="0"/>
+                  </a:rPr>
+                  <a:t> [3]</a:t>
+                </a:r>
+              </a:p>
+            </p:txBody>
+          </p:sp>
+        </p:grpSp>
+        <p:sp>
+          <p:nvSpPr>
+            <p:cNvPr id="12" name="TextBox 11">
+              <a:extLst>
+                <a:ext uri="{FF2B5EF4-FFF2-40B4-BE49-F238E27FC236}">
+                  <a16:creationId xmlns:a16="http://schemas.microsoft.com/office/drawing/2014/main" id="{0EB291EE-6E55-8C6F-1558-22E11F9BF60D}"/>
+                </a:ext>
+              </a:extLst>
+            </p:cNvPr>
+            <p:cNvSpPr txBox="1"/>
+            <p:nvPr/>
+          </p:nvSpPr>
+          <p:spPr>
+            <a:xfrm>
+              <a:off x="5490010" y="424531"/>
+              <a:ext cx="1748990" cy="276999"/>
+            </a:xfrm>
+            <a:prstGeom prst="rect">
+              <a:avLst/>
+            </a:prstGeom>
+            <a:noFill/>
+          </p:spPr>
+          <p:txBody>
+            <a:bodyPr wrap="square" rtlCol="0">
+              <a:spAutoFit/>
+            </a:bodyPr>
+            <a:lstStyle/>
+            <a:p>
+              <a:r>
+                <a:rPr lang="en-SG" sz="1200" dirty="0">
+                  <a:latin typeface="Times New Roman" panose="02020603050405020304" pitchFamily="18" charset="0"/>
+                  <a:cs typeface="Times New Roman" panose="02020603050405020304" pitchFamily="18" charset="0"/>
+                </a:rPr>
+                <a:t>W-CSP and MRSP [10]</a:t>
+              </a:r>
+            </a:p>
+          </p:txBody>
+        </p:sp>
+        <p:grpSp>
+          <p:nvGrpSpPr>
+            <p:cNvPr id="25" name="Group 24">
+              <a:extLst>
+                <a:ext uri="{FF2B5EF4-FFF2-40B4-BE49-F238E27FC236}">
+                  <a16:creationId xmlns:a16="http://schemas.microsoft.com/office/drawing/2014/main" id="{0A1D673B-2F47-1FBE-0C2A-D2FC5D22444D}"/>
+                </a:ext>
+              </a:extLst>
+            </p:cNvPr>
+            <p:cNvGrpSpPr/>
+            <p:nvPr/>
+          </p:nvGrpSpPr>
+          <p:grpSpPr>
+            <a:xfrm>
+              <a:off x="4216400" y="768064"/>
+              <a:ext cx="1670292" cy="276999"/>
+              <a:chOff x="7486894" y="837024"/>
+              <a:chExt cx="1670292" cy="276999"/>
+            </a:xfrm>
+          </p:grpSpPr>
+          <p:sp>
+            <p:nvSpPr>
+              <p:cNvPr id="8" name="Rectangle 7">
+                <a:extLst>
+                  <a:ext uri="{FF2B5EF4-FFF2-40B4-BE49-F238E27FC236}">
+                    <a16:creationId xmlns:a16="http://schemas.microsoft.com/office/drawing/2014/main" id="{515FC422-6105-4527-6BC4-33633E1E456B}"/>
+                  </a:ext>
+                </a:extLst>
+              </p:cNvPr>
+              <p:cNvSpPr/>
+              <p:nvPr/>
+            </p:nvSpPr>
+            <p:spPr>
+              <a:xfrm>
+                <a:off x="7486894" y="913434"/>
+                <a:ext cx="118533" cy="143933"/>
+              </a:xfrm>
+              <a:prstGeom prst="rect">
+                <a:avLst/>
+              </a:prstGeom>
+              <a:solidFill>
+                <a:schemeClr val="accent6"/>
+              </a:solidFill>
+              <a:ln>
+                <a:noFill/>
+              </a:ln>
+            </p:spPr>
+            <p:style>
+              <a:lnRef idx="2">
+                <a:schemeClr val="accent1">
+                  <a:shade val="15000"/>
+                </a:schemeClr>
+              </a:lnRef>
+              <a:fillRef idx="1">
+                <a:schemeClr val="accent1"/>
+              </a:fillRef>
+              <a:effectRef idx="0">
+                <a:schemeClr val="accent1"/>
+              </a:effectRef>
+              <a:fontRef idx="minor">
+                <a:schemeClr val="lt1"/>
+              </a:fontRef>
+            </p:style>
+            <p:txBody>
+              <a:bodyPr rtlCol="0" anchor="ctr"/>
+              <a:lstStyle/>
+              <a:p>
+                <a:pPr algn="ctr"/>
+                <a:endParaRPr lang="en-SG"/>
+              </a:p>
+            </p:txBody>
+          </p:sp>
+          <p:sp>
+            <p:nvSpPr>
+              <p:cNvPr id="18" name="TextBox 17">
+                <a:extLst>
+                  <a:ext uri="{FF2B5EF4-FFF2-40B4-BE49-F238E27FC236}">
+                    <a16:creationId xmlns:a16="http://schemas.microsoft.com/office/drawing/2014/main" id="{BE8F6DDA-53BD-9C51-176E-828CCD3B4A61}"/>
+                  </a:ext>
+                </a:extLst>
+              </p:cNvPr>
+              <p:cNvSpPr txBox="1"/>
+              <p:nvPr/>
+            </p:nvSpPr>
+            <p:spPr>
+              <a:xfrm>
+                <a:off x="7586132" y="837024"/>
+                <a:ext cx="1571054" cy="276999"/>
+              </a:xfrm>
+              <a:prstGeom prst="rect">
+                <a:avLst/>
+              </a:prstGeom>
+              <a:noFill/>
+            </p:spPr>
+            <p:txBody>
+              <a:bodyPr wrap="square" rtlCol="0">
+                <a:spAutoFit/>
+              </a:bodyPr>
+              <a:lstStyle/>
+              <a:p>
+                <a:r>
+                  <a:rPr lang="en-SG" sz="1200" dirty="0">
+                    <a:latin typeface="Times New Roman" panose="02020603050405020304" pitchFamily="18" charset="0"/>
+                    <a:cs typeface="Times New Roman" panose="02020603050405020304" pitchFamily="18" charset="0"/>
+                  </a:rPr>
+                  <a:t>Sample-Scaling Only</a:t>
+                </a:r>
+              </a:p>
+            </p:txBody>
+          </p:sp>
+        </p:grpSp>
+        <p:grpSp>
+          <p:nvGrpSpPr>
+            <p:cNvPr id="24" name="Group 23">
+              <a:extLst>
+                <a:ext uri="{FF2B5EF4-FFF2-40B4-BE49-F238E27FC236}">
+                  <a16:creationId xmlns:a16="http://schemas.microsoft.com/office/drawing/2014/main" id="{3869E320-90A3-31BD-931A-DD291B9F4D46}"/>
+                </a:ext>
+              </a:extLst>
+            </p:cNvPr>
+            <p:cNvGrpSpPr/>
+            <p:nvPr/>
+          </p:nvGrpSpPr>
+          <p:grpSpPr>
+            <a:xfrm>
+              <a:off x="5886692" y="746326"/>
+              <a:ext cx="2685183" cy="276999"/>
+              <a:chOff x="6684992" y="768065"/>
+              <a:chExt cx="2685183" cy="276999"/>
+            </a:xfrm>
+          </p:grpSpPr>
+          <p:sp>
+            <p:nvSpPr>
+              <p:cNvPr id="9" name="Rectangle 8">
+                <a:extLst>
+                  <a:ext uri="{FF2B5EF4-FFF2-40B4-BE49-F238E27FC236}">
+                    <a16:creationId xmlns:a16="http://schemas.microsoft.com/office/drawing/2014/main" id="{158D9521-6B5A-D14C-153C-9D2FF3E5A0AC}"/>
+                  </a:ext>
+                </a:extLst>
+              </p:cNvPr>
+              <p:cNvSpPr/>
+              <p:nvPr/>
+            </p:nvSpPr>
+            <p:spPr>
+              <a:xfrm>
+                <a:off x="6684992" y="839475"/>
+                <a:ext cx="118533" cy="143933"/>
+              </a:xfrm>
+              <a:prstGeom prst="rect">
+                <a:avLst/>
+              </a:prstGeom>
+              <a:solidFill>
+                <a:schemeClr val="accent2">
+                  <a:lumMod val="50000"/>
+                </a:schemeClr>
+              </a:solidFill>
+              <a:ln>
+                <a:noFill/>
+              </a:ln>
+            </p:spPr>
+            <p:style>
+              <a:lnRef idx="2">
+                <a:schemeClr val="accent1">
+                  <a:shade val="15000"/>
+                </a:schemeClr>
+              </a:lnRef>
+              <a:fillRef idx="1">
+                <a:schemeClr val="accent1"/>
+              </a:fillRef>
+              <a:effectRef idx="0">
+                <a:schemeClr val="accent1"/>
+              </a:effectRef>
+              <a:fontRef idx="minor">
+                <a:schemeClr val="lt1"/>
+              </a:fontRef>
+            </p:style>
+            <p:txBody>
+              <a:bodyPr rtlCol="0" anchor="ctr"/>
+              <a:lstStyle/>
+              <a:p>
+                <a:pPr algn="ctr"/>
+                <a:endParaRPr lang="en-SG"/>
+              </a:p>
+            </p:txBody>
+          </p:sp>
+          <p:sp>
+            <p:nvSpPr>
+              <p:cNvPr id="21" name="TextBox 20">
+                <a:extLst>
+                  <a:ext uri="{FF2B5EF4-FFF2-40B4-BE49-F238E27FC236}">
+                    <a16:creationId xmlns:a16="http://schemas.microsoft.com/office/drawing/2014/main" id="{47A23DEF-3A02-DF1C-EC4E-7B6CB6066843}"/>
+                  </a:ext>
+                </a:extLst>
+              </p:cNvPr>
+              <p:cNvSpPr txBox="1"/>
+              <p:nvPr/>
+            </p:nvSpPr>
+            <p:spPr>
+              <a:xfrm>
+                <a:off x="6803525" y="768065"/>
+                <a:ext cx="2566650" cy="276999"/>
+              </a:xfrm>
+              <a:prstGeom prst="rect">
+                <a:avLst/>
+              </a:prstGeom>
+              <a:noFill/>
+            </p:spPr>
+            <p:txBody>
+              <a:bodyPr wrap="square" rtlCol="0">
+                <a:spAutoFit/>
+              </a:bodyPr>
+              <a:lstStyle/>
+              <a:p>
+                <a:r>
+                  <a:rPr lang="en-SG" sz="1200" dirty="0">
+                    <a:latin typeface="Times New Roman" panose="02020603050405020304" pitchFamily="18" charset="0"/>
+                    <a:cs typeface="Times New Roman" panose="02020603050405020304" pitchFamily="18" charset="0"/>
+                  </a:rPr>
+                  <a:t>Both Electrode and Sample Scaling</a:t>
+                </a:r>
+              </a:p>
+            </p:txBody>
+          </p:sp>
+        </p:grpSp>
+        <p:grpSp>
+          <p:nvGrpSpPr>
+            <p:cNvPr id="23" name="Group 22">
+              <a:extLst>
+                <a:ext uri="{FF2B5EF4-FFF2-40B4-BE49-F238E27FC236}">
+                  <a16:creationId xmlns:a16="http://schemas.microsoft.com/office/drawing/2014/main" id="{033DA662-4277-9F7E-0964-02533971E235}"/>
+                </a:ext>
+              </a:extLst>
+            </p:cNvPr>
+            <p:cNvGrpSpPr/>
+            <p:nvPr/>
+          </p:nvGrpSpPr>
+          <p:grpSpPr>
+            <a:xfrm>
+              <a:off x="7234145" y="424531"/>
+              <a:ext cx="1718735" cy="276999"/>
+              <a:chOff x="4250265" y="735684"/>
+              <a:chExt cx="1718735" cy="276999"/>
+            </a:xfrm>
+          </p:grpSpPr>
+          <p:sp>
+            <p:nvSpPr>
+              <p:cNvPr id="15" name="TextBox 14">
+                <a:extLst>
+                  <a:ext uri="{FF2B5EF4-FFF2-40B4-BE49-F238E27FC236}">
+                    <a16:creationId xmlns:a16="http://schemas.microsoft.com/office/drawing/2014/main" id="{04780188-16F8-CB95-D257-CC13BAD88668}"/>
+                  </a:ext>
+                </a:extLst>
+              </p:cNvPr>
+              <p:cNvSpPr txBox="1"/>
+              <p:nvPr/>
+            </p:nvSpPr>
+            <p:spPr>
+              <a:xfrm>
+                <a:off x="4334934" y="735684"/>
+                <a:ext cx="1634066" cy="276999"/>
+              </a:xfrm>
+              <a:prstGeom prst="rect">
+                <a:avLst/>
+              </a:prstGeom>
+              <a:noFill/>
+            </p:spPr>
+            <p:txBody>
+              <a:bodyPr wrap="square" rtlCol="0">
+                <a:spAutoFit/>
+              </a:bodyPr>
+              <a:lstStyle/>
+              <a:p>
+                <a:r>
+                  <a:rPr lang="en-SG" sz="1200" dirty="0">
+                    <a:latin typeface="Times New Roman" panose="02020603050405020304" pitchFamily="18" charset="0"/>
+                    <a:cs typeface="Times New Roman" panose="02020603050405020304" pitchFamily="18" charset="0"/>
+                  </a:rPr>
+                  <a:t>Electrode-Scaling Only </a:t>
+                </a:r>
+              </a:p>
+            </p:txBody>
+          </p:sp>
+          <p:sp>
+            <p:nvSpPr>
+              <p:cNvPr id="22" name="Rectangle 21">
+                <a:extLst>
+                  <a:ext uri="{FF2B5EF4-FFF2-40B4-BE49-F238E27FC236}">
+                    <a16:creationId xmlns:a16="http://schemas.microsoft.com/office/drawing/2014/main" id="{789DA4B2-DD9E-EEC9-2FAB-E9C018E71181}"/>
+                  </a:ext>
+                </a:extLst>
+              </p:cNvPr>
+              <p:cNvSpPr/>
+              <p:nvPr/>
+            </p:nvSpPr>
+            <p:spPr>
+              <a:xfrm>
+                <a:off x="4250265" y="809202"/>
+                <a:ext cx="118533" cy="143933"/>
+              </a:xfrm>
+              <a:prstGeom prst="rect">
+                <a:avLst/>
+              </a:prstGeom>
+              <a:solidFill>
+                <a:schemeClr val="accent4"/>
+              </a:solidFill>
+              <a:ln>
+                <a:noFill/>
+              </a:ln>
+            </p:spPr>
+            <p:style>
+              <a:lnRef idx="2">
+                <a:schemeClr val="accent1">
+                  <a:shade val="15000"/>
+                </a:schemeClr>
+              </a:lnRef>
+              <a:fillRef idx="1">
+                <a:schemeClr val="accent1"/>
+              </a:fillRef>
+              <a:effectRef idx="0">
+                <a:schemeClr val="accent1"/>
+              </a:effectRef>
+              <a:fontRef idx="minor">
+                <a:schemeClr val="lt1"/>
+              </a:fontRef>
+            </p:style>
+            <p:txBody>
+              <a:bodyPr rtlCol="0" anchor="ctr"/>
+              <a:lstStyle/>
+              <a:p>
+                <a:pPr algn="ctr"/>
+                <a:endParaRPr lang="en-SG"/>
+              </a:p>
+            </p:txBody>
+          </p:sp>
+        </p:grpSp>
+      </p:grpSp>
+    </p:spTree>
+    <p:extLst>
+      <p:ext uri="{BB962C8B-B14F-4D97-AF65-F5344CB8AC3E}">
+        <p14:creationId xmlns:p14="http://schemas.microsoft.com/office/powerpoint/2010/main" val="2806218985"/>
       </p:ext>
     </p:extLst>
   </p:cSld>
@@ -6214,7 +8585,10 @@
               <a:avLst/>
             </a:prstGeom>
             <a:solidFill>
-              <a:schemeClr val="bg1"/>
+              <a:schemeClr val="tx2">
+                <a:lumMod val="10000"/>
+                <a:lumOff val="90000"/>
+              </a:schemeClr>
             </a:solidFill>
             <a:ln>
               <a:solidFill>
@@ -6333,7 +8707,7 @@
                   <a:latin typeface="Times New Roman" panose="02020603050405020304" pitchFamily="18" charset="0"/>
                   <a:cs typeface="Times New Roman" panose="02020603050405020304" pitchFamily="18" charset="0"/>
                 </a:rPr>
-                <a:t>Electrode Scaling</a:t>
+                <a:t>Electrode-Scaling Block</a:t>
               </a:r>
             </a:p>
           </p:txBody>
@@ -6396,7 +8770,7 @@
                   <a:latin typeface="Times New Roman" panose="02020603050405020304" pitchFamily="18" charset="0"/>
                   <a:cs typeface="Times New Roman" panose="02020603050405020304" pitchFamily="18" charset="0"/>
                 </a:rPr>
-                <a:t>Sample Scaling</a:t>
+                <a:t>Sample-Scaling Block</a:t>
               </a:r>
             </a:p>
           </p:txBody>
@@ -7086,7 +9460,10 @@
               <a:avLst/>
             </a:prstGeom>
             <a:solidFill>
-              <a:schemeClr val="bg1"/>
+              <a:schemeClr val="accent2">
+                <a:lumMod val="20000"/>
+                <a:lumOff val="80000"/>
+              </a:schemeClr>
             </a:solidFill>
             <a:ln>
               <a:solidFill>
@@ -7192,7 +9569,10 @@
               <a:avLst/>
             </a:prstGeom>
             <a:solidFill>
-              <a:schemeClr val="bg1"/>
+              <a:schemeClr val="tx2">
+                <a:lumMod val="10000"/>
+                <a:lumOff val="90000"/>
+              </a:schemeClr>
             </a:solidFill>
             <a:ln>
               <a:solidFill>
@@ -7274,7 +9654,10 @@
               <a:avLst/>
             </a:prstGeom>
             <a:solidFill>
-              <a:schemeClr val="bg1"/>
+              <a:schemeClr val="accent2">
+                <a:lumMod val="20000"/>
+                <a:lumOff val="80000"/>
+              </a:schemeClr>
             </a:solidFill>
             <a:ln>
               <a:solidFill>
@@ -7380,7 +9763,10 @@
               <a:avLst/>
             </a:prstGeom>
             <a:solidFill>
-              <a:schemeClr val="bg1"/>
+              <a:schemeClr val="accent3">
+                <a:lumMod val="20000"/>
+                <a:lumOff val="80000"/>
+              </a:schemeClr>
             </a:solidFill>
             <a:ln>
               <a:solidFill>
@@ -8106,7 +10492,7 @@
             </a:prstGeom>
             <a:solidFill>
               <a:schemeClr val="bg1">
-                <a:lumMod val="95000"/>
+                <a:lumMod val="85000"/>
               </a:schemeClr>
             </a:solidFill>
           </p:spPr>
@@ -8257,7 +10643,7 @@
               <a:avLst/>
             </a:prstGeom>
             <a:solidFill>
-              <a:schemeClr val="accent5">
+              <a:schemeClr val="accent2">
                 <a:lumMod val="20000"/>
                 <a:lumOff val="80000"/>
               </a:schemeClr>
@@ -8318,7 +10704,7 @@
               <a:avLst/>
             </a:prstGeom>
             <a:solidFill>
-              <a:schemeClr val="accent6">
+              <a:schemeClr val="accent3">
                 <a:lumMod val="20000"/>
                 <a:lumOff val="80000"/>
               </a:schemeClr>
@@ -8380,7 +10766,7 @@
             </a:prstGeom>
             <a:solidFill>
               <a:schemeClr val="bg1">
-                <a:lumMod val="95000"/>
+                <a:lumMod val="85000"/>
               </a:schemeClr>
             </a:solidFill>
           </p:spPr>
@@ -9002,6 +11388,631 @@
 </file>
 
 <file path=ppt/slides/slide7.xml><?xml version="1.0" encoding="utf-8"?>
+<p:sld xmlns:a="http://schemas.openxmlformats.org/drawingml/2006/main" xmlns:r="http://schemas.openxmlformats.org/officeDocument/2006/relationships" xmlns:p="http://schemas.openxmlformats.org/presentationml/2006/main">
+  <p:cSld>
+    <p:spTree>
+      <p:nvGrpSpPr>
+        <p:cNvPr id="1" name=""/>
+        <p:cNvGrpSpPr/>
+        <p:nvPr/>
+      </p:nvGrpSpPr>
+      <p:grpSpPr>
+        <a:xfrm>
+          <a:off x="0" y="0"/>
+          <a:ext cx="0" cy="0"/>
+          <a:chOff x="0" y="0"/>
+          <a:chExt cx="0" cy="0"/>
+        </a:xfrm>
+      </p:grpSpPr>
+      <p:grpSp>
+        <p:nvGrpSpPr>
+          <p:cNvPr id="12" name="Group 11">
+            <a:extLst>
+              <a:ext uri="{FF2B5EF4-FFF2-40B4-BE49-F238E27FC236}">
+                <a16:creationId xmlns:a16="http://schemas.microsoft.com/office/drawing/2014/main" id="{CC5807EC-6AF0-299C-4820-81FE9E96409B}"/>
+              </a:ext>
+            </a:extLst>
+          </p:cNvPr>
+          <p:cNvGrpSpPr/>
+          <p:nvPr/>
+        </p:nvGrpSpPr>
+        <p:grpSpPr>
+          <a:xfrm>
+            <a:off x="-4021621" y="955040"/>
+            <a:ext cx="19413895" cy="4216619"/>
+            <a:chOff x="-4021621" y="955040"/>
+            <a:chExt cx="19413895" cy="4216619"/>
+          </a:xfrm>
+        </p:grpSpPr>
+        <p:grpSp>
+          <p:nvGrpSpPr>
+            <p:cNvPr id="6" name="Group 5">
+              <a:extLst>
+                <a:ext uri="{FF2B5EF4-FFF2-40B4-BE49-F238E27FC236}">
+                  <a16:creationId xmlns:a16="http://schemas.microsoft.com/office/drawing/2014/main" id="{97576E7C-530B-681D-1260-95DF1193BE97}"/>
+                </a:ext>
+              </a:extLst>
+            </p:cNvPr>
+            <p:cNvGrpSpPr/>
+            <p:nvPr/>
+          </p:nvGrpSpPr>
+          <p:grpSpPr>
+            <a:xfrm>
+              <a:off x="-4021621" y="955040"/>
+              <a:ext cx="9545995" cy="4159469"/>
+              <a:chOff x="287156" y="310930"/>
+              <a:chExt cx="9545995" cy="4159469"/>
+            </a:xfrm>
+          </p:grpSpPr>
+          <p:pic>
+            <p:nvPicPr>
+              <p:cNvPr id="2" name="Graphic 1">
+                <a:extLst>
+                  <a:ext uri="{FF2B5EF4-FFF2-40B4-BE49-F238E27FC236}">
+                    <a16:creationId xmlns:a16="http://schemas.microsoft.com/office/drawing/2014/main" id="{F344DB15-AEEB-FC2F-4281-5FED25BD4132}"/>
+                  </a:ext>
+                </a:extLst>
+              </p:cNvPr>
+              <p:cNvPicPr>
+                <a:picLocks noChangeAspect="1"/>
+              </p:cNvPicPr>
+              <p:nvPr/>
+            </p:nvPicPr>
+            <p:blipFill>
+              <a:blip r:embed="rId2">
+                <a:extLst>
+                  <a:ext uri="{96DAC541-7B7A-43D3-8B79-37D633B846F1}">
+                    <asvg:svgBlip xmlns:asvg="http://schemas.microsoft.com/office/drawing/2016/SVG/main" r:embed="rId3"/>
+                  </a:ext>
+                </a:extLst>
+              </a:blip>
+              <a:stretch>
+                <a:fillRect/>
+              </a:stretch>
+            </p:blipFill>
+            <p:spPr>
+              <a:xfrm>
+                <a:off x="287156" y="310930"/>
+                <a:ext cx="9545995" cy="4159469"/>
+              </a:xfrm>
+              <a:prstGeom prst="rect">
+                <a:avLst/>
+              </a:prstGeom>
+            </p:spPr>
+          </p:pic>
+          <mc:AlternateContent xmlns:mc="http://schemas.openxmlformats.org/markup-compatibility/2006" xmlns:a14="http://schemas.microsoft.com/office/drawing/2010/main">
+            <mc:Choice Requires="a14">
+              <p:sp>
+                <p:nvSpPr>
+                  <p:cNvPr id="4" name="TextBox 3">
+                    <a:extLst>
+                      <a:ext uri="{FF2B5EF4-FFF2-40B4-BE49-F238E27FC236}">
+                        <a16:creationId xmlns:a16="http://schemas.microsoft.com/office/drawing/2014/main" id="{1ABA69B4-C418-CED3-28C8-470CEB9FA7C0}"/>
+                      </a:ext>
+                    </a:extLst>
+                  </p:cNvPr>
+                  <p:cNvSpPr txBox="1"/>
+                  <p:nvPr/>
+                </p:nvSpPr>
+                <p:spPr>
+                  <a:xfrm>
+                    <a:off x="7945120" y="3992880"/>
+                    <a:ext cx="609600" cy="369332"/>
+                  </a:xfrm>
+                  <a:prstGeom prst="rect">
+                    <a:avLst/>
+                  </a:prstGeom>
+                  <a:noFill/>
+                </p:spPr>
+                <p:txBody>
+                  <a:bodyPr wrap="square" rtlCol="0">
+                    <a:spAutoFit/>
+                  </a:bodyPr>
+                  <a:lstStyle/>
+                  <a:p>
+                    <a:pPr/>
+                    <a14:m>
+                      <m:oMathPara xmlns:m="http://schemas.openxmlformats.org/officeDocument/2006/math">
+                        <m:oMathParaPr>
+                          <m:jc m:val="centerGroup"/>
+                        </m:oMathParaPr>
+                        <m:oMath xmlns:m="http://schemas.openxmlformats.org/officeDocument/2006/math">
+                          <m:r>
+                            <a:rPr lang="en-SG" b="0" i="1" smtClean="0">
+                              <a:latin typeface="Cambria Math" panose="02040503050406030204" pitchFamily="18" charset="0"/>
+                            </a:rPr>
+                            <m:t>𝑒</m:t>
+                          </m:r>
+                        </m:oMath>
+                      </m:oMathPara>
+                    </a14:m>
+                    <a:endParaRPr lang="en-SG" dirty="0"/>
+                  </a:p>
+                </p:txBody>
+              </p:sp>
+            </mc:Choice>
+            <mc:Fallback xmlns="">
+              <p:sp>
+                <p:nvSpPr>
+                  <p:cNvPr id="4" name="TextBox 3">
+                    <a:extLst>
+                      <a:ext uri="{FF2B5EF4-FFF2-40B4-BE49-F238E27FC236}">
+                        <a16:creationId xmlns:a16="http://schemas.microsoft.com/office/drawing/2014/main" id="{1ABA69B4-C418-CED3-28C8-470CEB9FA7C0}"/>
+                      </a:ext>
+                    </a:extLst>
+                  </p:cNvPr>
+                  <p:cNvSpPr txBox="1">
+                    <a:spLocks noRot="1" noChangeAspect="1" noMove="1" noResize="1" noEditPoints="1" noAdjustHandles="1" noChangeArrowheads="1" noChangeShapeType="1" noTextEdit="1"/>
+                  </p:cNvSpPr>
+                  <p:nvPr/>
+                </p:nvSpPr>
+                <p:spPr>
+                  <a:xfrm>
+                    <a:off x="7945120" y="3992880"/>
+                    <a:ext cx="609600" cy="369332"/>
+                  </a:xfrm>
+                  <a:prstGeom prst="rect">
+                    <a:avLst/>
+                  </a:prstGeom>
+                  <a:blipFill>
+                    <a:blip r:embed="rId4"/>
+                    <a:stretch>
+                      <a:fillRect/>
+                    </a:stretch>
+                  </a:blipFill>
+                </p:spPr>
+                <p:txBody>
+                  <a:bodyPr/>
+                  <a:lstStyle/>
+                  <a:p>
+                    <a:r>
+                      <a:rPr lang="en-SG">
+                        <a:noFill/>
+                      </a:rPr>
+                      <a:t> </a:t>
+                    </a:r>
+                  </a:p>
+                </p:txBody>
+              </p:sp>
+            </mc:Fallback>
+          </mc:AlternateContent>
+          <mc:AlternateContent xmlns:mc="http://schemas.openxmlformats.org/markup-compatibility/2006" xmlns:a14="http://schemas.microsoft.com/office/drawing/2010/main">
+            <mc:Choice Requires="a14">
+              <p:sp>
+                <p:nvSpPr>
+                  <p:cNvPr id="5" name="TextBox 4">
+                    <a:extLst>
+                      <a:ext uri="{FF2B5EF4-FFF2-40B4-BE49-F238E27FC236}">
+                        <a16:creationId xmlns:a16="http://schemas.microsoft.com/office/drawing/2014/main" id="{AE37E998-ACDB-877E-5F05-53275B68FF73}"/>
+                      </a:ext>
+                    </a:extLst>
+                  </p:cNvPr>
+                  <p:cNvSpPr txBox="1"/>
+                  <p:nvPr/>
+                </p:nvSpPr>
+                <p:spPr>
+                  <a:xfrm>
+                    <a:off x="6858000" y="2631440"/>
+                    <a:ext cx="325120" cy="400110"/>
+                  </a:xfrm>
+                  <a:prstGeom prst="rect">
+                    <a:avLst/>
+                  </a:prstGeom>
+                  <a:noFill/>
+                </p:spPr>
+                <p:txBody>
+                  <a:bodyPr wrap="square" rtlCol="0">
+                    <a:spAutoFit/>
+                  </a:bodyPr>
+                  <a:lstStyle/>
+                  <a:p>
+                    <a:pPr/>
+                    <a14:m>
+                      <m:oMathPara xmlns:m="http://schemas.openxmlformats.org/officeDocument/2006/math">
+                        <m:oMathParaPr>
+                          <m:jc m:val="centerGroup"/>
+                        </m:oMathParaPr>
+                        <m:oMath xmlns:m="http://schemas.openxmlformats.org/officeDocument/2006/math">
+                          <m:r>
+                            <a:rPr lang="en-SG" sz="2000" b="0" i="1" smtClean="0">
+                              <a:latin typeface="Cambria Math" panose="02040503050406030204" pitchFamily="18" charset="0"/>
+                            </a:rPr>
+                            <m:t>𝐴</m:t>
+                          </m:r>
+                        </m:oMath>
+                      </m:oMathPara>
+                    </a14:m>
+                    <a:endParaRPr lang="en-SG" sz="2000" dirty="0"/>
+                  </a:p>
+                </p:txBody>
+              </p:sp>
+            </mc:Choice>
+            <mc:Fallback xmlns="">
+              <p:sp>
+                <p:nvSpPr>
+                  <p:cNvPr id="5" name="TextBox 4">
+                    <a:extLst>
+                      <a:ext uri="{FF2B5EF4-FFF2-40B4-BE49-F238E27FC236}">
+                        <a16:creationId xmlns:a16="http://schemas.microsoft.com/office/drawing/2014/main" id="{AE37E998-ACDB-877E-5F05-53275B68FF73}"/>
+                      </a:ext>
+                    </a:extLst>
+                  </p:cNvPr>
+                  <p:cNvSpPr txBox="1">
+                    <a:spLocks noRot="1" noChangeAspect="1" noMove="1" noResize="1" noEditPoints="1" noAdjustHandles="1" noChangeArrowheads="1" noChangeShapeType="1" noTextEdit="1"/>
+                  </p:cNvSpPr>
+                  <p:nvPr/>
+                </p:nvSpPr>
+                <p:spPr>
+                  <a:xfrm>
+                    <a:off x="6858000" y="2631440"/>
+                    <a:ext cx="325120" cy="400110"/>
+                  </a:xfrm>
+                  <a:prstGeom prst="rect">
+                    <a:avLst/>
+                  </a:prstGeom>
+                  <a:blipFill>
+                    <a:blip r:embed="rId5"/>
+                    <a:stretch>
+                      <a:fillRect r="-5556"/>
+                    </a:stretch>
+                  </a:blipFill>
+                </p:spPr>
+                <p:txBody>
+                  <a:bodyPr/>
+                  <a:lstStyle/>
+                  <a:p>
+                    <a:r>
+                      <a:rPr lang="en-SG">
+                        <a:noFill/>
+                      </a:rPr>
+                      <a:t> </a:t>
+                    </a:r>
+                  </a:p>
+                </p:txBody>
+              </p:sp>
+            </mc:Fallback>
+          </mc:AlternateContent>
+        </p:grpSp>
+        <p:grpSp>
+          <p:nvGrpSpPr>
+            <p:cNvPr id="9" name="Group 8">
+              <a:extLst>
+                <a:ext uri="{FF2B5EF4-FFF2-40B4-BE49-F238E27FC236}">
+                  <a16:creationId xmlns:a16="http://schemas.microsoft.com/office/drawing/2014/main" id="{04D42380-10D8-7FD6-B614-06A7488581D8}"/>
+                </a:ext>
+              </a:extLst>
+            </p:cNvPr>
+            <p:cNvGrpSpPr/>
+            <p:nvPr/>
+          </p:nvGrpSpPr>
+          <p:grpSpPr>
+            <a:xfrm>
+              <a:off x="5846279" y="1012191"/>
+              <a:ext cx="9545995" cy="4159468"/>
+              <a:chOff x="5846279" y="1012191"/>
+              <a:chExt cx="9545995" cy="4159468"/>
+            </a:xfrm>
+          </p:grpSpPr>
+          <p:pic>
+            <p:nvPicPr>
+              <p:cNvPr id="3" name="Graphic 2">
+                <a:extLst>
+                  <a:ext uri="{FF2B5EF4-FFF2-40B4-BE49-F238E27FC236}">
+                    <a16:creationId xmlns:a16="http://schemas.microsoft.com/office/drawing/2014/main" id="{86D0C2F2-B0DD-F7F3-1906-AF50C8857161}"/>
+                  </a:ext>
+                </a:extLst>
+              </p:cNvPr>
+              <p:cNvPicPr>
+                <a:picLocks noChangeAspect="1"/>
+              </p:cNvPicPr>
+              <p:nvPr/>
+            </p:nvPicPr>
+            <p:blipFill>
+              <a:blip r:embed="rId6">
+                <a:extLst>
+                  <a:ext uri="{96DAC541-7B7A-43D3-8B79-37D633B846F1}">
+                    <asvg:svgBlip xmlns:asvg="http://schemas.microsoft.com/office/drawing/2016/SVG/main" r:embed="rId7"/>
+                  </a:ext>
+                </a:extLst>
+              </a:blip>
+              <a:stretch>
+                <a:fillRect/>
+              </a:stretch>
+            </p:blipFill>
+            <p:spPr>
+              <a:xfrm>
+                <a:off x="5846279" y="1012191"/>
+                <a:ext cx="9545995" cy="4159468"/>
+              </a:xfrm>
+              <a:prstGeom prst="rect">
+                <a:avLst/>
+              </a:prstGeom>
+            </p:spPr>
+          </p:pic>
+          <mc:AlternateContent xmlns:mc="http://schemas.openxmlformats.org/markup-compatibility/2006" xmlns:a14="http://schemas.microsoft.com/office/drawing/2010/main">
+            <mc:Choice Requires="a14">
+              <p:sp>
+                <p:nvSpPr>
+                  <p:cNvPr id="7" name="TextBox 6">
+                    <a:extLst>
+                      <a:ext uri="{FF2B5EF4-FFF2-40B4-BE49-F238E27FC236}">
+                        <a16:creationId xmlns:a16="http://schemas.microsoft.com/office/drawing/2014/main" id="{A584515E-4927-E822-54E2-C6491AAC2C12}"/>
+                      </a:ext>
+                    </a:extLst>
+                  </p:cNvPr>
+                  <p:cNvSpPr txBox="1"/>
+                  <p:nvPr/>
+                </p:nvSpPr>
+                <p:spPr>
+                  <a:xfrm>
+                    <a:off x="12359973" y="3201356"/>
+                    <a:ext cx="325120" cy="400110"/>
+                  </a:xfrm>
+                  <a:prstGeom prst="rect">
+                    <a:avLst/>
+                  </a:prstGeom>
+                  <a:noFill/>
+                </p:spPr>
+                <p:txBody>
+                  <a:bodyPr wrap="square" rtlCol="0">
+                    <a:spAutoFit/>
+                  </a:bodyPr>
+                  <a:lstStyle/>
+                  <a:p>
+                    <a:pPr/>
+                    <a14:m>
+                      <m:oMathPara xmlns:m="http://schemas.openxmlformats.org/officeDocument/2006/math">
+                        <m:oMathParaPr>
+                          <m:jc m:val="centerGroup"/>
+                        </m:oMathParaPr>
+                        <m:oMath xmlns:m="http://schemas.openxmlformats.org/officeDocument/2006/math">
+                          <m:r>
+                            <a:rPr lang="en-SG" sz="2000" b="0" i="1" smtClean="0">
+                              <a:latin typeface="Cambria Math" panose="02040503050406030204" pitchFamily="18" charset="0"/>
+                            </a:rPr>
+                            <m:t>𝐵</m:t>
+                          </m:r>
+                        </m:oMath>
+                      </m:oMathPara>
+                    </a14:m>
+                    <a:endParaRPr lang="en-SG" sz="2000" dirty="0"/>
+                  </a:p>
+                </p:txBody>
+              </p:sp>
+            </mc:Choice>
+            <mc:Fallback xmlns="">
+              <p:sp>
+                <p:nvSpPr>
+                  <p:cNvPr id="7" name="TextBox 6">
+                    <a:extLst>
+                      <a:ext uri="{FF2B5EF4-FFF2-40B4-BE49-F238E27FC236}">
+                        <a16:creationId xmlns:a16="http://schemas.microsoft.com/office/drawing/2014/main" id="{A584515E-4927-E822-54E2-C6491AAC2C12}"/>
+                      </a:ext>
+                    </a:extLst>
+                  </p:cNvPr>
+                  <p:cNvSpPr txBox="1">
+                    <a:spLocks noRot="1" noChangeAspect="1" noMove="1" noResize="1" noEditPoints="1" noAdjustHandles="1" noChangeArrowheads="1" noChangeShapeType="1" noTextEdit="1"/>
+                  </p:cNvSpPr>
+                  <p:nvPr/>
+                </p:nvSpPr>
+                <p:spPr>
+                  <a:xfrm>
+                    <a:off x="12359973" y="3201356"/>
+                    <a:ext cx="325120" cy="400110"/>
+                  </a:xfrm>
+                  <a:prstGeom prst="rect">
+                    <a:avLst/>
+                  </a:prstGeom>
+                  <a:blipFill>
+                    <a:blip r:embed="rId8"/>
+                    <a:stretch>
+                      <a:fillRect r="-7547"/>
+                    </a:stretch>
+                  </a:blipFill>
+                </p:spPr>
+                <p:txBody>
+                  <a:bodyPr/>
+                  <a:lstStyle/>
+                  <a:p>
+                    <a:r>
+                      <a:rPr lang="en-SG">
+                        <a:noFill/>
+                      </a:rPr>
+                      <a:t> </a:t>
+                    </a:r>
+                  </a:p>
+                </p:txBody>
+              </p:sp>
+            </mc:Fallback>
+          </mc:AlternateContent>
+          <mc:AlternateContent xmlns:mc="http://schemas.openxmlformats.org/markup-compatibility/2006" xmlns:a14="http://schemas.microsoft.com/office/drawing/2010/main">
+            <mc:Choice Requires="a14">
+              <p:sp>
+                <p:nvSpPr>
+                  <p:cNvPr id="8" name="TextBox 7">
+                    <a:extLst>
+                      <a:ext uri="{FF2B5EF4-FFF2-40B4-BE49-F238E27FC236}">
+                        <a16:creationId xmlns:a16="http://schemas.microsoft.com/office/drawing/2014/main" id="{8FE1536D-75EA-0A9A-E050-13616A984E08}"/>
+                      </a:ext>
+                    </a:extLst>
+                  </p:cNvPr>
+                  <p:cNvSpPr txBox="1"/>
+                  <p:nvPr/>
+                </p:nvSpPr>
+                <p:spPr>
+                  <a:xfrm>
+                    <a:off x="13561393" y="4726127"/>
+                    <a:ext cx="609600" cy="369332"/>
+                  </a:xfrm>
+                  <a:prstGeom prst="rect">
+                    <a:avLst/>
+                  </a:prstGeom>
+                  <a:noFill/>
+                </p:spPr>
+                <p:txBody>
+                  <a:bodyPr wrap="square" rtlCol="0">
+                    <a:spAutoFit/>
+                  </a:bodyPr>
+                  <a:lstStyle/>
+                  <a:p>
+                    <a:pPr/>
+                    <a14:m>
+                      <m:oMathPara xmlns:m="http://schemas.openxmlformats.org/officeDocument/2006/math">
+                        <m:oMathParaPr>
+                          <m:jc m:val="centerGroup"/>
+                        </m:oMathParaPr>
+                        <m:oMath xmlns:m="http://schemas.openxmlformats.org/officeDocument/2006/math">
+                          <m:r>
+                            <a:rPr lang="en-SG" b="0" i="1" smtClean="0">
+                              <a:latin typeface="Cambria Math" panose="02040503050406030204" pitchFamily="18" charset="0"/>
+                            </a:rPr>
+                            <m:t>𝑠</m:t>
+                          </m:r>
+                        </m:oMath>
+                      </m:oMathPara>
+                    </a14:m>
+                    <a:endParaRPr lang="en-SG" dirty="0"/>
+                  </a:p>
+                </p:txBody>
+              </p:sp>
+            </mc:Choice>
+            <mc:Fallback xmlns="">
+              <p:sp>
+                <p:nvSpPr>
+                  <p:cNvPr id="8" name="TextBox 7">
+                    <a:extLst>
+                      <a:ext uri="{FF2B5EF4-FFF2-40B4-BE49-F238E27FC236}">
+                        <a16:creationId xmlns:a16="http://schemas.microsoft.com/office/drawing/2014/main" id="{8FE1536D-75EA-0A9A-E050-13616A984E08}"/>
+                      </a:ext>
+                    </a:extLst>
+                  </p:cNvPr>
+                  <p:cNvSpPr txBox="1">
+                    <a:spLocks noRot="1" noChangeAspect="1" noMove="1" noResize="1" noEditPoints="1" noAdjustHandles="1" noChangeArrowheads="1" noChangeShapeType="1" noTextEdit="1"/>
+                  </p:cNvSpPr>
+                  <p:nvPr/>
+                </p:nvSpPr>
+                <p:spPr>
+                  <a:xfrm>
+                    <a:off x="13561393" y="4726127"/>
+                    <a:ext cx="609600" cy="369332"/>
+                  </a:xfrm>
+                  <a:prstGeom prst="rect">
+                    <a:avLst/>
+                  </a:prstGeom>
+                  <a:blipFill>
+                    <a:blip r:embed="rId9"/>
+                    <a:stretch>
+                      <a:fillRect/>
+                    </a:stretch>
+                  </a:blipFill>
+                </p:spPr>
+                <p:txBody>
+                  <a:bodyPr/>
+                  <a:lstStyle/>
+                  <a:p>
+                    <a:r>
+                      <a:rPr lang="en-SG">
+                        <a:noFill/>
+                      </a:rPr>
+                      <a:t> </a:t>
+                    </a:r>
+                  </a:p>
+                </p:txBody>
+              </p:sp>
+            </mc:Fallback>
+          </mc:AlternateContent>
+        </p:grpSp>
+        <p:sp>
+          <p:nvSpPr>
+            <p:cNvPr id="10" name="TextBox 9">
+              <a:extLst>
+                <a:ext uri="{FF2B5EF4-FFF2-40B4-BE49-F238E27FC236}">
+                  <a16:creationId xmlns:a16="http://schemas.microsoft.com/office/drawing/2014/main" id="{562CA9E2-8170-72FE-6BBB-FA673D186E7C}"/>
+                </a:ext>
+              </a:extLst>
+            </p:cNvPr>
+            <p:cNvSpPr txBox="1"/>
+            <p:nvPr/>
+          </p:nvSpPr>
+          <p:spPr>
+            <a:xfrm>
+              <a:off x="-4021621" y="1012191"/>
+              <a:ext cx="1539573" cy="461665"/>
+            </a:xfrm>
+            <a:prstGeom prst="rect">
+              <a:avLst/>
+            </a:prstGeom>
+            <a:noFill/>
+          </p:spPr>
+          <p:txBody>
+            <a:bodyPr wrap="square" rtlCol="0">
+              <a:spAutoFit/>
+            </a:bodyPr>
+            <a:lstStyle/>
+            <a:p>
+              <a:r>
+                <a:rPr lang="en-SG" sz="2400" dirty="0">
+                  <a:latin typeface="Times New Roman" panose="02020603050405020304" pitchFamily="18" charset="0"/>
+                  <a:cs typeface="Times New Roman" panose="02020603050405020304" pitchFamily="18" charset="0"/>
+                </a:rPr>
+                <a:t>A)</a:t>
+              </a:r>
+            </a:p>
+          </p:txBody>
+        </p:sp>
+        <p:sp>
+          <p:nvSpPr>
+            <p:cNvPr id="11" name="TextBox 10">
+              <a:extLst>
+                <a:ext uri="{FF2B5EF4-FFF2-40B4-BE49-F238E27FC236}">
+                  <a16:creationId xmlns:a16="http://schemas.microsoft.com/office/drawing/2014/main" id="{094FA967-5DD3-86FC-5E88-69662498C389}"/>
+                </a:ext>
+              </a:extLst>
+            </p:cNvPr>
+            <p:cNvSpPr txBox="1"/>
+            <p:nvPr/>
+          </p:nvSpPr>
+          <p:spPr>
+            <a:xfrm>
+              <a:off x="5846279" y="955040"/>
+              <a:ext cx="1539573" cy="461665"/>
+            </a:xfrm>
+            <a:prstGeom prst="rect">
+              <a:avLst/>
+            </a:prstGeom>
+            <a:noFill/>
+          </p:spPr>
+          <p:txBody>
+            <a:bodyPr wrap="square" rtlCol="0">
+              <a:spAutoFit/>
+            </a:bodyPr>
+            <a:lstStyle/>
+            <a:p>
+              <a:r>
+                <a:rPr lang="en-SG" sz="2400" dirty="0">
+                  <a:latin typeface="Times New Roman" panose="02020603050405020304" pitchFamily="18" charset="0"/>
+                  <a:cs typeface="Times New Roman" panose="02020603050405020304" pitchFamily="18" charset="0"/>
+                </a:rPr>
+                <a:t>B)</a:t>
+              </a:r>
+            </a:p>
+          </p:txBody>
+        </p:sp>
+      </p:grpSp>
+    </p:spTree>
+    <p:extLst>
+      <p:ext uri="{BB962C8B-B14F-4D97-AF65-F5344CB8AC3E}">
+        <p14:creationId xmlns:p14="http://schemas.microsoft.com/office/powerpoint/2010/main" val="1675342367"/>
+      </p:ext>
+    </p:extLst>
+  </p:cSld>
+  <p:clrMapOvr>
+    <a:masterClrMapping/>
+  </p:clrMapOvr>
+</p:sld>
+</file>
+
+<file path=ppt/slides/slide8.xml><?xml version="1.0" encoding="utf-8"?>
 <p:sld xmlns:a="http://schemas.openxmlformats.org/drawingml/2006/main" xmlns:r="http://schemas.openxmlformats.org/officeDocument/2006/relationships" xmlns:p="http://schemas.openxmlformats.org/presentationml/2006/main">
   <p:cSld>
     <p:spTree>
@@ -10407,7 +13418,7 @@
 </p:sld>
 </file>
 
-<file path=ppt/slides/slide8.xml><?xml version="1.0" encoding="utf-8"?>
+<file path=ppt/slides/slide9.xml><?xml version="1.0" encoding="utf-8"?>
 <p:sld xmlns:a="http://schemas.openxmlformats.org/drawingml/2006/main" xmlns:r="http://schemas.openxmlformats.org/officeDocument/2006/relationships" xmlns:p="http://schemas.openxmlformats.org/presentationml/2006/main">
   <p:cSld>
     <p:spTree>
@@ -13695,279 +16706,6 @@
 </p:sld>
 </file>
 
-<file path=ppt/slides/slide9.xml><?xml version="1.0" encoding="utf-8"?>
-<p:sld xmlns:a="http://schemas.openxmlformats.org/drawingml/2006/main" xmlns:r="http://schemas.openxmlformats.org/officeDocument/2006/relationships" xmlns:p="http://schemas.openxmlformats.org/presentationml/2006/main">
-  <p:cSld>
-    <p:spTree>
-      <p:nvGrpSpPr>
-        <p:cNvPr id="1" name=""/>
-        <p:cNvGrpSpPr/>
-        <p:nvPr/>
-      </p:nvGrpSpPr>
-      <p:grpSpPr>
-        <a:xfrm>
-          <a:off x="0" y="0"/>
-          <a:ext cx="0" cy="0"/>
-          <a:chOff x="0" y="0"/>
-          <a:chExt cx="0" cy="0"/>
-        </a:xfrm>
-      </p:grpSpPr>
-      <p:grpSp>
-        <p:nvGrpSpPr>
-          <p:cNvPr id="27" name="Group 26">
-            <a:extLst>
-              <a:ext uri="{FF2B5EF4-FFF2-40B4-BE49-F238E27FC236}">
-                <a16:creationId xmlns:a16="http://schemas.microsoft.com/office/drawing/2014/main" id="{2EF56692-F76F-CF57-3AC0-5A8BBFEBA8C6}"/>
-              </a:ext>
-            </a:extLst>
-          </p:cNvPr>
-          <p:cNvGrpSpPr/>
-          <p:nvPr/>
-        </p:nvGrpSpPr>
-        <p:grpSpPr>
-          <a:xfrm>
-            <a:off x="318655" y="785560"/>
-            <a:ext cx="11180618" cy="4044363"/>
-            <a:chOff x="318655" y="785560"/>
-            <a:chExt cx="11180618" cy="4044363"/>
-          </a:xfrm>
-        </p:grpSpPr>
-        <p:pic>
-          <p:nvPicPr>
-            <p:cNvPr id="3" name="Graphic 2">
-              <a:extLst>
-                <a:ext uri="{FF2B5EF4-FFF2-40B4-BE49-F238E27FC236}">
-                  <a16:creationId xmlns:a16="http://schemas.microsoft.com/office/drawing/2014/main" id="{89F2037F-5730-BC34-CFFC-1AB3F8D21508}"/>
-                </a:ext>
-              </a:extLst>
-            </p:cNvPr>
-            <p:cNvPicPr>
-              <a:picLocks noChangeAspect="1"/>
-            </p:cNvPicPr>
-            <p:nvPr/>
-          </p:nvPicPr>
-          <p:blipFill>
-            <a:blip r:embed="rId2">
-              <a:extLst>
-                <a:ext uri="{96DAC541-7B7A-43D3-8B79-37D633B846F1}">
-                  <asvg:svgBlip xmlns:asvg="http://schemas.microsoft.com/office/drawing/2016/SVG/main" r:embed="rId3"/>
-                </a:ext>
-              </a:extLst>
-            </a:blip>
-            <a:stretch>
-              <a:fillRect/>
-            </a:stretch>
-          </p:blipFill>
-          <p:spPr>
-            <a:xfrm>
-              <a:off x="318655" y="785560"/>
-              <a:ext cx="5642589" cy="4042047"/>
-            </a:xfrm>
-            <a:prstGeom prst="rect">
-              <a:avLst/>
-            </a:prstGeom>
-          </p:spPr>
-        </p:pic>
-        <p:pic>
-          <p:nvPicPr>
-            <p:cNvPr id="7" name="Graphic 6">
-              <a:extLst>
-                <a:ext uri="{FF2B5EF4-FFF2-40B4-BE49-F238E27FC236}">
-                  <a16:creationId xmlns:a16="http://schemas.microsoft.com/office/drawing/2014/main" id="{80239C23-81A9-B837-3BF9-78A2BCB998E9}"/>
-                </a:ext>
-              </a:extLst>
-            </p:cNvPr>
-            <p:cNvPicPr>
-              <a:picLocks noChangeAspect="1"/>
-            </p:cNvPicPr>
-            <p:nvPr/>
-          </p:nvPicPr>
-          <p:blipFill>
-            <a:blip r:embed="rId4">
-              <a:extLst>
-                <a:ext uri="{96DAC541-7B7A-43D3-8B79-37D633B846F1}">
-                  <asvg:svgBlip xmlns:asvg="http://schemas.microsoft.com/office/drawing/2016/SVG/main" r:embed="rId5"/>
-                </a:ext>
-              </a:extLst>
-            </a:blip>
-            <a:stretch>
-              <a:fillRect/>
-            </a:stretch>
-          </p:blipFill>
-          <p:spPr>
-            <a:xfrm>
-              <a:off x="6230757" y="785560"/>
-              <a:ext cx="5268516" cy="1983053"/>
-            </a:xfrm>
-            <a:prstGeom prst="rect">
-              <a:avLst/>
-            </a:prstGeom>
-          </p:spPr>
-        </p:pic>
-        <p:pic>
-          <p:nvPicPr>
-            <p:cNvPr id="9" name="Graphic 8">
-              <a:extLst>
-                <a:ext uri="{FF2B5EF4-FFF2-40B4-BE49-F238E27FC236}">
-                  <a16:creationId xmlns:a16="http://schemas.microsoft.com/office/drawing/2014/main" id="{EF1EA52C-33F1-F568-E5CA-95EEDFCD7843}"/>
-                </a:ext>
-              </a:extLst>
-            </p:cNvPr>
-            <p:cNvPicPr>
-              <a:picLocks noChangeAspect="1"/>
-            </p:cNvPicPr>
-            <p:nvPr/>
-          </p:nvPicPr>
-          <p:blipFill>
-            <a:blip r:embed="rId6">
-              <a:extLst>
-                <a:ext uri="{96DAC541-7B7A-43D3-8B79-37D633B846F1}">
-                  <asvg:svgBlip xmlns:asvg="http://schemas.microsoft.com/office/drawing/2016/SVG/main" r:embed="rId7"/>
-                </a:ext>
-              </a:extLst>
-            </a:blip>
-            <a:stretch>
-              <a:fillRect/>
-            </a:stretch>
-          </p:blipFill>
-          <p:spPr>
-            <a:xfrm>
-              <a:off x="6230756" y="2846869"/>
-              <a:ext cx="5268517" cy="1983054"/>
-            </a:xfrm>
-            <a:prstGeom prst="rect">
-              <a:avLst/>
-            </a:prstGeom>
-          </p:spPr>
-        </p:pic>
-        <p:sp>
-          <p:nvSpPr>
-            <p:cNvPr id="24" name="TextBox 23">
-              <a:extLst>
-                <a:ext uri="{FF2B5EF4-FFF2-40B4-BE49-F238E27FC236}">
-                  <a16:creationId xmlns:a16="http://schemas.microsoft.com/office/drawing/2014/main" id="{B7D1CC00-C44E-FCDE-C300-1CC34FE55E12}"/>
-                </a:ext>
-              </a:extLst>
-            </p:cNvPr>
-            <p:cNvSpPr txBox="1"/>
-            <p:nvPr/>
-          </p:nvSpPr>
-          <p:spPr>
-            <a:xfrm>
-              <a:off x="318655" y="846428"/>
-              <a:ext cx="374071" cy="369332"/>
-            </a:xfrm>
-            <a:prstGeom prst="rect">
-              <a:avLst/>
-            </a:prstGeom>
-            <a:noFill/>
-          </p:spPr>
-          <p:txBody>
-            <a:bodyPr wrap="square" rtlCol="0">
-              <a:spAutoFit/>
-            </a:bodyPr>
-            <a:lstStyle/>
-            <a:p>
-              <a:r>
-                <a:rPr lang="en-SG" dirty="0">
-                  <a:latin typeface="Times New Roman" panose="02020603050405020304" pitchFamily="18" charset="0"/>
-                  <a:cs typeface="Times New Roman" panose="02020603050405020304" pitchFamily="18" charset="0"/>
-                </a:rPr>
-                <a:t>a)</a:t>
-              </a:r>
-            </a:p>
-          </p:txBody>
-        </p:sp>
-        <p:sp>
-          <p:nvSpPr>
-            <p:cNvPr id="25" name="TextBox 24">
-              <a:extLst>
-                <a:ext uri="{FF2B5EF4-FFF2-40B4-BE49-F238E27FC236}">
-                  <a16:creationId xmlns:a16="http://schemas.microsoft.com/office/drawing/2014/main" id="{80362C28-9BB5-780C-6E9C-4DC684CDEBF6}"/>
-                </a:ext>
-              </a:extLst>
-            </p:cNvPr>
-            <p:cNvSpPr txBox="1"/>
-            <p:nvPr/>
-          </p:nvSpPr>
-          <p:spPr>
-            <a:xfrm>
-              <a:off x="6087533" y="846428"/>
-              <a:ext cx="381000" cy="369332"/>
-            </a:xfrm>
-            <a:prstGeom prst="rect">
-              <a:avLst/>
-            </a:prstGeom>
-            <a:noFill/>
-          </p:spPr>
-          <p:txBody>
-            <a:bodyPr wrap="square" rtlCol="0">
-              <a:spAutoFit/>
-            </a:bodyPr>
-            <a:lstStyle/>
-            <a:p>
-              <a:r>
-                <a:rPr lang="en-SG" dirty="0">
-                  <a:latin typeface="Times New Roman" panose="02020603050405020304" pitchFamily="18" charset="0"/>
-                  <a:cs typeface="Times New Roman" panose="02020603050405020304" pitchFamily="18" charset="0"/>
-                </a:rPr>
-                <a:t>b)</a:t>
-              </a:r>
-            </a:p>
-          </p:txBody>
-        </p:sp>
-        <p:sp>
-          <p:nvSpPr>
-            <p:cNvPr id="26" name="TextBox 25">
-              <a:extLst>
-                <a:ext uri="{FF2B5EF4-FFF2-40B4-BE49-F238E27FC236}">
-                  <a16:creationId xmlns:a16="http://schemas.microsoft.com/office/drawing/2014/main" id="{CC5E5F31-F427-17C4-7EC3-1D9D548B093D}"/>
-                </a:ext>
-              </a:extLst>
-            </p:cNvPr>
-            <p:cNvSpPr txBox="1"/>
-            <p:nvPr/>
-          </p:nvSpPr>
-          <p:spPr>
-            <a:xfrm>
-              <a:off x="6096000" y="2846869"/>
-              <a:ext cx="506172" cy="369332"/>
-            </a:xfrm>
-            <a:prstGeom prst="rect">
-              <a:avLst/>
-            </a:prstGeom>
-            <a:noFill/>
-          </p:spPr>
-          <p:txBody>
-            <a:bodyPr wrap="square" rtlCol="0">
-              <a:spAutoFit/>
-            </a:bodyPr>
-            <a:lstStyle/>
-            <a:p>
-              <a:r>
-                <a:rPr lang="en-SG" dirty="0">
-                  <a:latin typeface="Times New Roman" panose="02020603050405020304" pitchFamily="18" charset="0"/>
-                  <a:cs typeface="Times New Roman" panose="02020603050405020304" pitchFamily="18" charset="0"/>
-                </a:rPr>
-                <a:t>c)</a:t>
-              </a:r>
-            </a:p>
-          </p:txBody>
-        </p:sp>
-      </p:grpSp>
-    </p:spTree>
-    <p:extLst>
-      <p:ext uri="{BB962C8B-B14F-4D97-AF65-F5344CB8AC3E}">
-        <p14:creationId xmlns:p14="http://schemas.microsoft.com/office/powerpoint/2010/main" val="2135828272"/>
-      </p:ext>
-    </p:extLst>
-  </p:cSld>
-  <p:clrMapOvr>
-    <a:masterClrMapping/>
-  </p:clrMapOvr>
-</p:sld>
-</file>
-
 <file path=ppt/theme/theme1.xml><?xml version="1.0" encoding="utf-8"?>
 <a:theme xmlns:a="http://schemas.openxmlformats.org/drawingml/2006/main" name="Office Theme">
   <a:themeElements>

</xml_diff>